<commit_message>
current updated PPT slides WIP
</commit_message>
<xml_diff>
--- a/Final_Presentation_Project4.pptx
+++ b/Final_Presentation_Project4.pptx
@@ -5,10 +5,10 @@
     <p:sldMasterId id="2147483669" r:id="rId4"/>
   </p:sldMasterIdLst>
   <p:notesMasterIdLst>
-    <p:notesMasterId r:id="rId14"/>
+    <p:notesMasterId r:id="rId18"/>
   </p:notesMasterIdLst>
   <p:handoutMasterIdLst>
-    <p:handoutMasterId r:id="rId15"/>
+    <p:handoutMasterId r:id="rId19"/>
   </p:handoutMasterIdLst>
   <p:sldIdLst>
     <p:sldId id="256" r:id="rId5"/>
@@ -18,8 +18,12 @@
     <p:sldId id="268" r:id="rId9"/>
     <p:sldId id="260" r:id="rId10"/>
     <p:sldId id="261" r:id="rId11"/>
-    <p:sldId id="267" r:id="rId12"/>
-    <p:sldId id="269" r:id="rId13"/>
+    <p:sldId id="271" r:id="rId12"/>
+    <p:sldId id="272" r:id="rId13"/>
+    <p:sldId id="273" r:id="rId14"/>
+    <p:sldId id="270" r:id="rId15"/>
+    <p:sldId id="267" r:id="rId16"/>
+    <p:sldId id="269" r:id="rId17"/>
   </p:sldIdLst>
   <p:sldSz cx="12192000" cy="6858000"/>
   <p:notesSz cx="6858000" cy="9144000"/>
@@ -132,7 +136,7 @@
 <file path=ppt/revisionInfo.xml><?xml version="1.0" encoding="utf-8"?>
 <p1510:revInfo xmlns:a="http://schemas.openxmlformats.org/drawingml/2006/main" xmlns:r="http://schemas.openxmlformats.org/officeDocument/2006/relationships" xmlns:p1510="http://schemas.microsoft.com/office/powerpoint/2015/10/main">
   <p1510:revLst>
-    <p1510:client id="{A6DBD36F-B9CF-47F1-B8C7-704C28E5541B}" v="292" dt="2021-10-28T02:26:08.076"/>
+    <p1510:client id="{A6DBD36F-B9CF-47F1-B8C7-704C28E5541B}" v="348" dt="2021-10-28T04:29:23.306"/>
   </p1510:revLst>
 </p1510:revInfo>
 </file>
@@ -141,11 +145,26 @@
 <pc:chgInfo xmlns:a="http://schemas.openxmlformats.org/drawingml/2006/main" xmlns:r="http://schemas.openxmlformats.org/officeDocument/2006/relationships" xmlns:ac="http://schemas.microsoft.com/office/drawing/2013/main/command" xmlns:pc="http://schemas.microsoft.com/office/powerpoint/2013/main/command">
   <pc:docChgLst>
     <pc:chgData name="Amelia Corea" userId="0f927ba03023ffb6" providerId="LiveId" clId="{A6DBD36F-B9CF-47F1-B8C7-704C28E5541B}"/>
-    <pc:docChg chg="custSel delSld modSld">
-      <pc:chgData name="Amelia Corea" userId="0f927ba03023ffb6" providerId="LiveId" clId="{A6DBD36F-B9CF-47F1-B8C7-704C28E5541B}" dt="2021-10-28T02:26:08.075" v="394" actId="20577"/>
+    <pc:docChg chg="undo custSel addSld delSld modSld sldOrd">
+      <pc:chgData name="Amelia Corea" userId="0f927ba03023ffb6" providerId="LiveId" clId="{A6DBD36F-B9CF-47F1-B8C7-704C28E5541B}" dt="2021-10-28T04:34:01.836" v="1424" actId="255"/>
       <pc:docMkLst>
         <pc:docMk/>
       </pc:docMkLst>
+      <pc:sldChg chg="modSp mod">
+        <pc:chgData name="Amelia Corea" userId="0f927ba03023ffb6" providerId="LiveId" clId="{A6DBD36F-B9CF-47F1-B8C7-704C28E5541B}" dt="2021-10-28T02:39:45.134" v="409" actId="20577"/>
+        <pc:sldMkLst>
+          <pc:docMk/>
+          <pc:sldMk cId="1819359268" sldId="256"/>
+        </pc:sldMkLst>
+        <pc:spChg chg="mod">
+          <ac:chgData name="Amelia Corea" userId="0f927ba03023ffb6" providerId="LiveId" clId="{A6DBD36F-B9CF-47F1-B8C7-704C28E5541B}" dt="2021-10-28T02:39:45.134" v="409" actId="20577"/>
+          <ac:spMkLst>
+            <pc:docMk/>
+            <pc:sldMk cId="1819359268" sldId="256"/>
+            <ac:spMk id="3" creationId="{2E78725B-6E40-4D82-B375-7831D81C29EE}"/>
+          </ac:spMkLst>
+        </pc:spChg>
+      </pc:sldChg>
       <pc:sldChg chg="modSp">
         <pc:chgData name="Amelia Corea" userId="0f927ba03023ffb6" providerId="LiveId" clId="{A6DBD36F-B9CF-47F1-B8C7-704C28E5541B}" dt="2021-10-28T01:48:35.771" v="0" actId="20577"/>
         <pc:sldMkLst>
@@ -162,7 +181,7 @@
         </pc:graphicFrameChg>
       </pc:sldChg>
       <pc:sldChg chg="modSp mod">
-        <pc:chgData name="Amelia Corea" userId="0f927ba03023ffb6" providerId="LiveId" clId="{A6DBD36F-B9CF-47F1-B8C7-704C28E5541B}" dt="2021-10-28T02:26:08.075" v="394" actId="20577"/>
+        <pc:chgData name="Amelia Corea" userId="0f927ba03023ffb6" providerId="LiveId" clId="{A6DBD36F-B9CF-47F1-B8C7-704C28E5541B}" dt="2021-10-28T03:18:57.185" v="756" actId="20577"/>
         <pc:sldMkLst>
           <pc:docMk/>
           <pc:sldMk cId="1193417028" sldId="259"/>
@@ -176,7 +195,7 @@
           </ac:spMkLst>
         </pc:spChg>
         <pc:graphicFrameChg chg="mod">
-          <ac:chgData name="Amelia Corea" userId="0f927ba03023ffb6" providerId="LiveId" clId="{A6DBD36F-B9CF-47F1-B8C7-704C28E5541B}" dt="2021-10-28T02:26:08.075" v="394" actId="20577"/>
+          <ac:chgData name="Amelia Corea" userId="0f927ba03023ffb6" providerId="LiveId" clId="{A6DBD36F-B9CF-47F1-B8C7-704C28E5541B}" dt="2021-10-28T03:18:57.185" v="756" actId="20577"/>
           <ac:graphicFrameMkLst>
             <pc:docMk/>
             <pc:sldMk cId="1193417028" sldId="259"/>
@@ -207,8 +226,8 @@
           </ac:spMkLst>
         </pc:spChg>
       </pc:sldChg>
-      <pc:sldChg chg="delSp modSp mod">
-        <pc:chgData name="Amelia Corea" userId="0f927ba03023ffb6" providerId="LiveId" clId="{A6DBD36F-B9CF-47F1-B8C7-704C28E5541B}" dt="2021-10-28T01:50:03.264" v="51" actId="20577"/>
+      <pc:sldChg chg="addSp delSp modSp mod">
+        <pc:chgData name="Amelia Corea" userId="0f927ba03023ffb6" providerId="LiveId" clId="{A6DBD36F-B9CF-47F1-B8C7-704C28E5541B}" dt="2021-10-28T04:03:21.474" v="1012"/>
         <pc:sldMkLst>
           <pc:docMk/>
           <pc:sldMk cId="1348318116" sldId="261"/>
@@ -221,6 +240,30 @@
             <ac:spMk id="2" creationId="{34DB6CE4-2B13-4715-B5B2-615A55922CA1}"/>
           </ac:spMkLst>
         </pc:spChg>
+        <pc:spChg chg="add mod">
+          <ac:chgData name="Amelia Corea" userId="0f927ba03023ffb6" providerId="LiveId" clId="{A6DBD36F-B9CF-47F1-B8C7-704C28E5541B}" dt="2021-10-28T03:42:41.791" v="919" actId="20577"/>
+          <ac:spMkLst>
+            <pc:docMk/>
+            <pc:sldMk cId="1348318116" sldId="261"/>
+            <ac:spMk id="4" creationId="{5CC53A53-4F41-4B49-82F2-85D40E3A76A3}"/>
+          </ac:spMkLst>
+        </pc:spChg>
+        <pc:spChg chg="add del">
+          <ac:chgData name="Amelia Corea" userId="0f927ba03023ffb6" providerId="LiveId" clId="{A6DBD36F-B9CF-47F1-B8C7-704C28E5541B}" dt="2021-10-28T03:40:12.003" v="890"/>
+          <ac:spMkLst>
+            <pc:docMk/>
+            <pc:sldMk cId="1348318116" sldId="261"/>
+            <ac:spMk id="5" creationId="{6ABE0D4A-AC09-49B4-BFD7-DC8D9AD5B3DE}"/>
+          </ac:spMkLst>
+        </pc:spChg>
+        <pc:graphicFrameChg chg="add mod modGraphic">
+          <ac:chgData name="Amelia Corea" userId="0f927ba03023ffb6" providerId="LiveId" clId="{A6DBD36F-B9CF-47F1-B8C7-704C28E5541B}" dt="2021-10-28T04:03:21.474" v="1012"/>
+          <ac:graphicFrameMkLst>
+            <pc:docMk/>
+            <pc:sldMk cId="1348318116" sldId="261"/>
+            <ac:graphicFrameMk id="3" creationId="{E9360718-F9A4-4A8A-A2A3-AFFD9EB61D23}"/>
+          </ac:graphicFrameMkLst>
+        </pc:graphicFrameChg>
         <pc:picChg chg="del">
           <ac:chgData name="Amelia Corea" userId="0f927ba03023ffb6" providerId="LiveId" clId="{A6DBD36F-B9CF-47F1-B8C7-704C28E5541B}" dt="2021-10-28T01:49:57.236" v="50" actId="478"/>
           <ac:picMkLst>
@@ -290,6 +333,138 @@
             <ac:spMk id="3" creationId="{143F5361-68C0-4BF5-80C8-F1E7BF92B2DB}"/>
           </ac:spMkLst>
         </pc:spChg>
+      </pc:sldChg>
+      <pc:sldChg chg="modSp new mod">
+        <pc:chgData name="Amelia Corea" userId="0f927ba03023ffb6" providerId="LiveId" clId="{A6DBD36F-B9CF-47F1-B8C7-704C28E5541B}" dt="2021-10-28T04:34:01.836" v="1424" actId="255"/>
+        <pc:sldMkLst>
+          <pc:docMk/>
+          <pc:sldMk cId="3405949825" sldId="270"/>
+        </pc:sldMkLst>
+        <pc:spChg chg="mod">
+          <ac:chgData name="Amelia Corea" userId="0f927ba03023ffb6" providerId="LiveId" clId="{A6DBD36F-B9CF-47F1-B8C7-704C28E5541B}" dt="2021-10-28T04:34:01.836" v="1424" actId="255"/>
+          <ac:spMkLst>
+            <pc:docMk/>
+            <pc:sldMk cId="3405949825" sldId="270"/>
+            <ac:spMk id="2" creationId="{50F0DA21-CC99-4C3A-A5AB-D57045F893EA}"/>
+          </ac:spMkLst>
+        </pc:spChg>
+      </pc:sldChg>
+      <pc:sldChg chg="addSp modSp add mod">
+        <pc:chgData name="Amelia Corea" userId="0f927ba03023ffb6" providerId="LiveId" clId="{A6DBD36F-B9CF-47F1-B8C7-704C28E5541B}" dt="2021-10-28T03:49:43.309" v="971" actId="14100"/>
+        <pc:sldMkLst>
+          <pc:docMk/>
+          <pc:sldMk cId="3983383762" sldId="271"/>
+        </pc:sldMkLst>
+        <pc:spChg chg="mod">
+          <ac:chgData name="Amelia Corea" userId="0f927ba03023ffb6" providerId="LiveId" clId="{A6DBD36F-B9CF-47F1-B8C7-704C28E5541B}" dt="2021-10-28T03:44:17.747" v="946" actId="20577"/>
+          <ac:spMkLst>
+            <pc:docMk/>
+            <pc:sldMk cId="3983383762" sldId="271"/>
+            <ac:spMk id="2" creationId="{34DB6CE4-2B13-4715-B5B2-615A55922CA1}"/>
+          </ac:spMkLst>
+        </pc:spChg>
+        <pc:spChg chg="mod">
+          <ac:chgData name="Amelia Corea" userId="0f927ba03023ffb6" providerId="LiveId" clId="{A6DBD36F-B9CF-47F1-B8C7-704C28E5541B}" dt="2021-10-28T03:49:43.309" v="971" actId="14100"/>
+          <ac:spMkLst>
+            <pc:docMk/>
+            <pc:sldMk cId="3983383762" sldId="271"/>
+            <ac:spMk id="3" creationId="{143F5361-68C0-4BF5-80C8-F1E7BF92B2DB}"/>
+          </ac:spMkLst>
+        </pc:spChg>
+        <pc:picChg chg="add mod">
+          <ac:chgData name="Amelia Corea" userId="0f927ba03023ffb6" providerId="LiveId" clId="{A6DBD36F-B9CF-47F1-B8C7-704C28E5541B}" dt="2021-10-28T03:49:09.143" v="955" actId="14100"/>
+          <ac:picMkLst>
+            <pc:docMk/>
+            <pc:sldMk cId="3983383762" sldId="271"/>
+            <ac:picMk id="5" creationId="{9E98EE5D-FB7D-4216-885C-0A6E70068147}"/>
+          </ac:picMkLst>
+        </pc:picChg>
+      </pc:sldChg>
+      <pc:sldChg chg="addSp delSp modSp add mod ord modClrScheme chgLayout">
+        <pc:chgData name="Amelia Corea" userId="0f927ba03023ffb6" providerId="LiveId" clId="{A6DBD36F-B9CF-47F1-B8C7-704C28E5541B}" dt="2021-10-28T04:27:02.716" v="1300" actId="20577"/>
+        <pc:sldMkLst>
+          <pc:docMk/>
+          <pc:sldMk cId="3365853074" sldId="272"/>
+        </pc:sldMkLst>
+        <pc:spChg chg="mod">
+          <ac:chgData name="Amelia Corea" userId="0f927ba03023ffb6" providerId="LiveId" clId="{A6DBD36F-B9CF-47F1-B8C7-704C28E5541B}" dt="2021-10-28T04:21:18.152" v="1295" actId="2711"/>
+          <ac:spMkLst>
+            <pc:docMk/>
+            <pc:sldMk cId="3365853074" sldId="272"/>
+            <ac:spMk id="2" creationId="{34DB6CE4-2B13-4715-B5B2-615A55922CA1}"/>
+          </ac:spMkLst>
+        </pc:spChg>
+        <pc:spChg chg="mod ord">
+          <ac:chgData name="Amelia Corea" userId="0f927ba03023ffb6" providerId="LiveId" clId="{A6DBD36F-B9CF-47F1-B8C7-704C28E5541B}" dt="2021-10-28T04:08:59.746" v="1034" actId="26606"/>
+          <ac:spMkLst>
+            <pc:docMk/>
+            <pc:sldMk cId="3365853074" sldId="272"/>
+            <ac:spMk id="3" creationId="{143F5361-68C0-4BF5-80C8-F1E7BF92B2DB}"/>
+          </ac:spMkLst>
+        </pc:spChg>
+        <pc:spChg chg="add mod">
+          <ac:chgData name="Amelia Corea" userId="0f927ba03023ffb6" providerId="LiveId" clId="{A6DBD36F-B9CF-47F1-B8C7-704C28E5541B}" dt="2021-10-28T04:27:02.716" v="1300" actId="20577"/>
+          <ac:spMkLst>
+            <pc:docMk/>
+            <pc:sldMk cId="3365853074" sldId="272"/>
+            <ac:spMk id="7" creationId="{62E16E35-EFD3-4F41-97E0-BFBBC5B849BD}"/>
+          </ac:spMkLst>
+        </pc:spChg>
+        <pc:picChg chg="del">
+          <ac:chgData name="Amelia Corea" userId="0f927ba03023ffb6" providerId="LiveId" clId="{A6DBD36F-B9CF-47F1-B8C7-704C28E5541B}" dt="2021-10-28T04:07:36.211" v="1014" actId="478"/>
+          <ac:picMkLst>
+            <pc:docMk/>
+            <pc:sldMk cId="3365853074" sldId="272"/>
+            <ac:picMk id="5" creationId="{9E98EE5D-FB7D-4216-885C-0A6E70068147}"/>
+          </ac:picMkLst>
+        </pc:picChg>
+        <pc:picChg chg="add mod">
+          <ac:chgData name="Amelia Corea" userId="0f927ba03023ffb6" providerId="LiveId" clId="{A6DBD36F-B9CF-47F1-B8C7-704C28E5541B}" dt="2021-10-28T04:09:43.339" v="1076" actId="1037"/>
+          <ac:picMkLst>
+            <pc:docMk/>
+            <pc:sldMk cId="3365853074" sldId="272"/>
+            <ac:picMk id="6" creationId="{4C6DC59D-F715-4430-9D6A-93E036888EB4}"/>
+          </ac:picMkLst>
+        </pc:picChg>
+      </pc:sldChg>
+      <pc:sldChg chg="addSp delSp modSp add mod ord">
+        <pc:chgData name="Amelia Corea" userId="0f927ba03023ffb6" providerId="LiveId" clId="{A6DBD36F-B9CF-47F1-B8C7-704C28E5541B}" dt="2021-10-28T04:33:04.773" v="1399" actId="20577"/>
+        <pc:sldMkLst>
+          <pc:docMk/>
+          <pc:sldMk cId="3103998298" sldId="273"/>
+        </pc:sldMkLst>
+        <pc:spChg chg="mod">
+          <ac:chgData name="Amelia Corea" userId="0f927ba03023ffb6" providerId="LiveId" clId="{A6DBD36F-B9CF-47F1-B8C7-704C28E5541B}" dt="2021-10-28T04:27:47.519" v="1331" actId="20577"/>
+          <ac:spMkLst>
+            <pc:docMk/>
+            <pc:sldMk cId="3103998298" sldId="273"/>
+            <ac:spMk id="2" creationId="{34DB6CE4-2B13-4715-B5B2-615A55922CA1}"/>
+          </ac:spMkLst>
+        </pc:spChg>
+        <pc:spChg chg="mod">
+          <ac:chgData name="Amelia Corea" userId="0f927ba03023ffb6" providerId="LiveId" clId="{A6DBD36F-B9CF-47F1-B8C7-704C28E5541B}" dt="2021-10-28T04:33:04.773" v="1399" actId="20577"/>
+          <ac:spMkLst>
+            <pc:docMk/>
+            <pc:sldMk cId="3103998298" sldId="273"/>
+            <ac:spMk id="7" creationId="{62E16E35-EFD3-4F41-97E0-BFBBC5B849BD}"/>
+          </ac:spMkLst>
+        </pc:spChg>
+        <pc:picChg chg="add mod">
+          <ac:chgData name="Amelia Corea" userId="0f927ba03023ffb6" providerId="LiveId" clId="{A6DBD36F-B9CF-47F1-B8C7-704C28E5541B}" dt="2021-10-28T04:29:46.134" v="1339" actId="14100"/>
+          <ac:picMkLst>
+            <pc:docMk/>
+            <pc:sldMk cId="3103998298" sldId="273"/>
+            <ac:picMk id="5" creationId="{1D6FD02E-2F6B-42F3-A070-5C769C852277}"/>
+          </ac:picMkLst>
+        </pc:picChg>
+        <pc:picChg chg="del">
+          <ac:chgData name="Amelia Corea" userId="0f927ba03023ffb6" providerId="LiveId" clId="{A6DBD36F-B9CF-47F1-B8C7-704C28E5541B}" dt="2021-10-28T04:29:26.629" v="1335" actId="478"/>
+          <ac:picMkLst>
+            <pc:docMk/>
+            <pc:sldMk cId="3103998298" sldId="273"/>
+            <ac:picMk id="6" creationId="{4C6DC59D-F715-4430-9D6A-93E036888EB4}"/>
+          </ac:picMkLst>
+        </pc:picChg>
       </pc:sldChg>
     </pc:docChg>
   </pc:docChgLst>
@@ -3014,10 +3189,24 @@
     <dgm:pt modelId="{710904E6-3B09-497C-982D-6E974045EC45}" type="parTrans" cxnId="{9E265D9F-1436-4FEB-9477-8C7CAD0B4B62}">
       <dgm:prSet/>
       <dgm:spPr/>
+      <dgm:t>
+        <a:bodyPr/>
+        <a:lstStyle/>
+        <a:p>
+          <a:endParaRPr lang="en-US"/>
+        </a:p>
+      </dgm:t>
     </dgm:pt>
     <dgm:pt modelId="{BA5EF7C2-6909-4504-8620-F5DB7DE7E099}" type="sibTrans" cxnId="{9E265D9F-1436-4FEB-9477-8C7CAD0B4B62}">
       <dgm:prSet/>
       <dgm:spPr/>
+      <dgm:t>
+        <a:bodyPr/>
+        <a:lstStyle/>
+        <a:p>
+          <a:endParaRPr lang="en-US"/>
+        </a:p>
+      </dgm:t>
     </dgm:pt>
     <dgm:pt modelId="{2F60EAC5-6FD4-4BEF-BDD9-FDB6679C289F}">
       <dgm:prSet phldrT="[Text]"/>
@@ -3044,10 +3233,24 @@
     <dgm:pt modelId="{20D31ADA-66D8-41E9-8FE2-C11B0DBC6437}" type="parTrans" cxnId="{51E9F5C9-CB9B-4256-8C0A-5C44B575C0D8}">
       <dgm:prSet/>
       <dgm:spPr/>
+      <dgm:t>
+        <a:bodyPr/>
+        <a:lstStyle/>
+        <a:p>
+          <a:endParaRPr lang="en-US"/>
+        </a:p>
+      </dgm:t>
     </dgm:pt>
     <dgm:pt modelId="{D0CED008-9504-4BEA-92F4-16C826541117}" type="sibTrans" cxnId="{51E9F5C9-CB9B-4256-8C0A-5C44B575C0D8}">
       <dgm:prSet/>
       <dgm:spPr/>
+      <dgm:t>
+        <a:bodyPr/>
+        <a:lstStyle/>
+        <a:p>
+          <a:endParaRPr lang="en-US"/>
+        </a:p>
+      </dgm:t>
     </dgm:pt>
     <dgm:pt modelId="{CB2ED894-EA78-4ADA-989E-53760C9E8D8B}">
       <dgm:prSet phldrT="[Text]"/>
@@ -3074,10 +3277,24 @@
     <dgm:pt modelId="{7ADF8406-B31C-4892-A444-F22D8AC412F8}" type="parTrans" cxnId="{16DF51F3-0A09-49DE-925C-03278AE9CD0E}">
       <dgm:prSet/>
       <dgm:spPr/>
+      <dgm:t>
+        <a:bodyPr/>
+        <a:lstStyle/>
+        <a:p>
+          <a:endParaRPr lang="en-US"/>
+        </a:p>
+      </dgm:t>
     </dgm:pt>
     <dgm:pt modelId="{14C28DF8-E8F7-4670-B352-3A86137AD91C}" type="sibTrans" cxnId="{16DF51F3-0A09-49DE-925C-03278AE9CD0E}">
       <dgm:prSet/>
       <dgm:spPr/>
+      <dgm:t>
+        <a:bodyPr/>
+        <a:lstStyle/>
+        <a:p>
+          <a:endParaRPr lang="en-US"/>
+        </a:p>
+      </dgm:t>
     </dgm:pt>
     <dgm:pt modelId="{DCA9B665-D854-45CA-B3EB-F8806A002D9A}">
       <dgm:prSet phldrT="[Text]"/>
@@ -3104,10 +3321,24 @@
     <dgm:pt modelId="{7C675B52-C964-48EC-8FF9-B52CF7AFE30B}" type="parTrans" cxnId="{AA027375-CDBC-4C6A-9C86-9F783B47207F}">
       <dgm:prSet/>
       <dgm:spPr/>
+      <dgm:t>
+        <a:bodyPr/>
+        <a:lstStyle/>
+        <a:p>
+          <a:endParaRPr lang="en-US"/>
+        </a:p>
+      </dgm:t>
     </dgm:pt>
     <dgm:pt modelId="{B4A37C19-0DAA-4E65-9851-42B233A92F89}" type="sibTrans" cxnId="{AA027375-CDBC-4C6A-9C86-9F783B47207F}">
       <dgm:prSet/>
       <dgm:spPr/>
+      <dgm:t>
+        <a:bodyPr/>
+        <a:lstStyle/>
+        <a:p>
+          <a:endParaRPr lang="en-US"/>
+        </a:p>
+      </dgm:t>
     </dgm:pt>
     <dgm:pt modelId="{13A96DEB-B718-4CAD-A365-5A669C1B5767}">
       <dgm:prSet phldrT="[Text]"/>
@@ -3134,10 +3365,24 @@
     <dgm:pt modelId="{9478F3F5-FD99-4353-BC0C-3F21605D59FC}" type="parTrans" cxnId="{617D1F62-E7D2-4F50-9F9B-0D6408668A76}">
       <dgm:prSet/>
       <dgm:spPr/>
+      <dgm:t>
+        <a:bodyPr/>
+        <a:lstStyle/>
+        <a:p>
+          <a:endParaRPr lang="en-US"/>
+        </a:p>
+      </dgm:t>
     </dgm:pt>
     <dgm:pt modelId="{5F9C800F-FC6D-4E27-BD0C-95B74658D226}" type="sibTrans" cxnId="{617D1F62-E7D2-4F50-9F9B-0D6408668A76}">
       <dgm:prSet/>
       <dgm:spPr/>
+      <dgm:t>
+        <a:bodyPr/>
+        <a:lstStyle/>
+        <a:p>
+          <a:endParaRPr lang="en-US"/>
+        </a:p>
+      </dgm:t>
     </dgm:pt>
     <dgm:pt modelId="{3AE54233-9B91-43EE-972D-726141A367FB}">
       <dgm:prSet phldrT="[Text]"/>
@@ -3164,10 +3409,24 @@
     <dgm:pt modelId="{F1FDBDE0-B091-454A-BFA6-4255703D04F2}" type="parTrans" cxnId="{8CA602A7-2740-420C-969E-A88C2E388817}">
       <dgm:prSet/>
       <dgm:spPr/>
+      <dgm:t>
+        <a:bodyPr/>
+        <a:lstStyle/>
+        <a:p>
+          <a:endParaRPr lang="en-US"/>
+        </a:p>
+      </dgm:t>
     </dgm:pt>
     <dgm:pt modelId="{662170A1-04DA-4048-A815-659CA8DAFA60}" type="sibTrans" cxnId="{8CA602A7-2740-420C-969E-A88C2E388817}">
       <dgm:prSet/>
       <dgm:spPr/>
+      <dgm:t>
+        <a:bodyPr/>
+        <a:lstStyle/>
+        <a:p>
+          <a:endParaRPr lang="en-US"/>
+        </a:p>
+      </dgm:t>
     </dgm:pt>
     <dgm:pt modelId="{0FF8A949-AA9D-41E6-BB0B-B9E6D7031565}">
       <dgm:prSet phldrT="[Text]"/>
@@ -3194,10 +3453,24 @@
     <dgm:pt modelId="{0987C1EE-7374-43E9-A3AE-48FE30B4C098}" type="parTrans" cxnId="{1F05D431-7385-48BB-A276-D5ABBF0A9E97}">
       <dgm:prSet/>
       <dgm:spPr/>
+      <dgm:t>
+        <a:bodyPr/>
+        <a:lstStyle/>
+        <a:p>
+          <a:endParaRPr lang="en-US"/>
+        </a:p>
+      </dgm:t>
     </dgm:pt>
     <dgm:pt modelId="{DCF2A86D-7A68-412A-9925-0EB1FC2AF555}" type="sibTrans" cxnId="{1F05D431-7385-48BB-A276-D5ABBF0A9E97}">
       <dgm:prSet/>
       <dgm:spPr/>
+      <dgm:t>
+        <a:bodyPr/>
+        <a:lstStyle/>
+        <a:p>
+          <a:endParaRPr lang="en-US"/>
+        </a:p>
+      </dgm:t>
     </dgm:pt>
     <dgm:pt modelId="{59C74700-7058-4FEE-A9CC-4C1A323F036B}">
       <dgm:prSet phldrT="[Text]"/>
@@ -3224,10 +3497,24 @@
     <dgm:pt modelId="{C681F319-1622-4FAE-9C51-67F878C80232}" type="parTrans" cxnId="{B5C777E0-3DD1-4E9B-A160-E272AB3B001B}">
       <dgm:prSet/>
       <dgm:spPr/>
+      <dgm:t>
+        <a:bodyPr/>
+        <a:lstStyle/>
+        <a:p>
+          <a:endParaRPr lang="en-US"/>
+        </a:p>
+      </dgm:t>
     </dgm:pt>
     <dgm:pt modelId="{FEF43A6E-B933-4E07-88C0-F40C32DF5CAD}" type="sibTrans" cxnId="{B5C777E0-3DD1-4E9B-A160-E272AB3B001B}">
       <dgm:prSet/>
       <dgm:spPr/>
+      <dgm:t>
+        <a:bodyPr/>
+        <a:lstStyle/>
+        <a:p>
+          <a:endParaRPr lang="en-US"/>
+        </a:p>
+      </dgm:t>
     </dgm:pt>
     <dgm:pt modelId="{1004CC15-A022-49D3-ADA3-5F59CC69F1C9}">
       <dgm:prSet phldrT="[Text]"/>
@@ -3251,10 +3538,24 @@
     <dgm:pt modelId="{836E658F-0BBE-4667-B125-98DFD6DAD62F}" type="parTrans" cxnId="{63ADF855-874E-4ED8-AE0A-6EA2A7D9D57C}">
       <dgm:prSet/>
       <dgm:spPr/>
+      <dgm:t>
+        <a:bodyPr/>
+        <a:lstStyle/>
+        <a:p>
+          <a:endParaRPr lang="en-US"/>
+        </a:p>
+      </dgm:t>
     </dgm:pt>
     <dgm:pt modelId="{D194E600-E6AD-4FBC-B512-DF328FBF7987}" type="sibTrans" cxnId="{63ADF855-874E-4ED8-AE0A-6EA2A7D9D57C}">
       <dgm:prSet/>
       <dgm:spPr/>
+      <dgm:t>
+        <a:bodyPr/>
+        <a:lstStyle/>
+        <a:p>
+          <a:endParaRPr lang="en-US"/>
+        </a:p>
+      </dgm:t>
     </dgm:pt>
     <dgm:pt modelId="{77893CAB-E6A4-481C-A464-9FC5B5917853}">
       <dgm:prSet phldrT="[Text]"/>
@@ -3286,10 +3587,156 @@
     <dgm:pt modelId="{2E35248E-DBE4-4228-830E-A28FBAF7CBCC}" type="parTrans" cxnId="{7A4FB68D-298C-4344-BBDC-B1D0C26B68F7}">
       <dgm:prSet/>
       <dgm:spPr/>
+      <dgm:t>
+        <a:bodyPr/>
+        <a:lstStyle/>
+        <a:p>
+          <a:endParaRPr lang="en-US"/>
+        </a:p>
+      </dgm:t>
     </dgm:pt>
     <dgm:pt modelId="{D10328EA-009D-41F7-9B92-F7D416FF302F}" type="sibTrans" cxnId="{7A4FB68D-298C-4344-BBDC-B1D0C26B68F7}">
       <dgm:prSet/>
       <dgm:spPr/>
+      <dgm:t>
+        <a:bodyPr/>
+        <a:lstStyle/>
+        <a:p>
+          <a:endParaRPr lang="en-US"/>
+        </a:p>
+      </dgm:t>
+    </dgm:pt>
+    <dgm:pt modelId="{9C5B5E31-3266-401D-AD43-074714A6B83F}">
+      <dgm:prSet phldrT="[Text]"/>
+      <dgm:spPr/>
+      <dgm:t>
+        <a:bodyPr/>
+        <a:lstStyle/>
+        <a:p>
+          <a:pPr>
+            <a:buFont typeface="Wingdings" panose="05000000000000000000" pitchFamily="2" charset="2"/>
+            <a:buChar char="§"/>
+          </a:pPr>
+          <a:r>
+            <a:rPr lang="en-US" sz="2000" dirty="0">
+              <a:latin typeface="Tahoma" panose="020B0604030504040204" pitchFamily="34" charset="0"/>
+              <a:ea typeface="Tahoma" panose="020B0604030504040204" pitchFamily="34" charset="0"/>
+              <a:cs typeface="Tahoma" panose="020B0604030504040204" pitchFamily="34" charset="0"/>
+            </a:rPr>
+            <a:t>Deep Learning</a:t>
+          </a:r>
+        </a:p>
+      </dgm:t>
+    </dgm:pt>
+    <dgm:pt modelId="{B1A4C8B8-2F9F-4913-BC1D-B17283FFB586}" type="parTrans" cxnId="{29ED4B08-1A97-4038-B618-89A95050E3A6}">
+      <dgm:prSet/>
+      <dgm:spPr/>
+      <dgm:t>
+        <a:bodyPr/>
+        <a:lstStyle/>
+        <a:p>
+          <a:endParaRPr lang="en-US"/>
+        </a:p>
+      </dgm:t>
+    </dgm:pt>
+    <dgm:pt modelId="{613C7389-5A27-4197-8AAE-EF312987B696}" type="sibTrans" cxnId="{29ED4B08-1A97-4038-B618-89A95050E3A6}">
+      <dgm:prSet/>
+      <dgm:spPr/>
+      <dgm:t>
+        <a:bodyPr/>
+        <a:lstStyle/>
+        <a:p>
+          <a:endParaRPr lang="en-US"/>
+        </a:p>
+      </dgm:t>
+    </dgm:pt>
+    <dgm:pt modelId="{C8F2F8B1-D5E4-47FC-A482-E15642E97ADF}">
+      <dgm:prSet phldrT="[Text]"/>
+      <dgm:spPr/>
+      <dgm:t>
+        <a:bodyPr/>
+        <a:lstStyle/>
+        <a:p>
+          <a:pPr>
+            <a:buFont typeface="Wingdings" panose="05000000000000000000" pitchFamily="2" charset="2"/>
+            <a:buChar char="§"/>
+          </a:pPr>
+          <a:r>
+            <a:rPr lang="en-US" sz="2000" dirty="0">
+              <a:latin typeface="Tahoma" panose="020B0604030504040204" pitchFamily="34" charset="0"/>
+              <a:ea typeface="Tahoma" panose="020B0604030504040204" pitchFamily="34" charset="0"/>
+              <a:cs typeface="Tahoma" panose="020B0604030504040204" pitchFamily="34" charset="0"/>
+            </a:rPr>
+            <a:t>K-means Clustering</a:t>
+          </a:r>
+        </a:p>
+      </dgm:t>
+    </dgm:pt>
+    <dgm:pt modelId="{FCEF5A4B-83C0-4F75-B4E3-FFC063837600}" type="parTrans" cxnId="{16DFCB42-6A02-4755-BADE-0FD730DD15CA}">
+      <dgm:prSet/>
+      <dgm:spPr/>
+      <dgm:t>
+        <a:bodyPr/>
+        <a:lstStyle/>
+        <a:p>
+          <a:endParaRPr lang="en-US"/>
+        </a:p>
+      </dgm:t>
+    </dgm:pt>
+    <dgm:pt modelId="{F83B466D-4F65-44D0-97F0-D6D5BA54BA32}" type="sibTrans" cxnId="{16DFCB42-6A02-4755-BADE-0FD730DD15CA}">
+      <dgm:prSet/>
+      <dgm:spPr/>
+      <dgm:t>
+        <a:bodyPr/>
+        <a:lstStyle/>
+        <a:p>
+          <a:endParaRPr lang="en-US"/>
+        </a:p>
+      </dgm:t>
+    </dgm:pt>
+    <dgm:pt modelId="{5E9A4EC2-4EDE-4E07-B692-46D6739EE230}">
+      <dgm:prSet phldrT="[Text]"/>
+      <dgm:spPr/>
+      <dgm:t>
+        <a:bodyPr/>
+        <a:lstStyle/>
+        <a:p>
+          <a:pPr>
+            <a:buFont typeface="Wingdings" panose="05000000000000000000" pitchFamily="2" charset="2"/>
+            <a:buChar char="§"/>
+          </a:pPr>
+          <a:r>
+            <a:rPr lang="en-US" sz="2000" dirty="0">
+              <a:latin typeface="Tahoma" panose="020B0604030504040204" pitchFamily="34" charset="0"/>
+              <a:ea typeface="Tahoma" panose="020B0604030504040204" pitchFamily="34" charset="0"/>
+              <a:cs typeface="Tahoma" panose="020B0604030504040204" pitchFamily="34" charset="0"/>
+            </a:rPr>
+            <a:t>Tableau</a:t>
+          </a:r>
+        </a:p>
+      </dgm:t>
+    </dgm:pt>
+    <dgm:pt modelId="{BC0EC666-DAFE-4339-921A-C82E4A290B19}" type="parTrans" cxnId="{D3F9ACEC-EC06-4AA9-A11B-A4C93AD7379D}">
+      <dgm:prSet/>
+      <dgm:spPr/>
+      <dgm:t>
+        <a:bodyPr/>
+        <a:lstStyle/>
+        <a:p>
+          <a:endParaRPr lang="en-US"/>
+        </a:p>
+      </dgm:t>
+    </dgm:pt>
+    <dgm:pt modelId="{61778957-840E-489C-8E30-135D6863ECA3}" type="sibTrans" cxnId="{D3F9ACEC-EC06-4AA9-A11B-A4C93AD7379D}">
+      <dgm:prSet/>
+      <dgm:spPr/>
+      <dgm:t>
+        <a:bodyPr/>
+        <a:lstStyle/>
+        <a:p>
+          <a:endParaRPr lang="en-US"/>
+        </a:p>
+      </dgm:t>
     </dgm:pt>
     <dgm:pt modelId="{DE3F77CF-6A8C-4783-A2CE-00E88C4199CB}" type="pres">
       <dgm:prSet presAssocID="{CF9FC193-7A05-4631-B681-B56EAB543D38}" presName="Name0" presStyleCnt="0">
@@ -3380,24 +3827,28 @@
     <dgm:cxn modelId="{2AAD6B00-C9ED-4240-BB38-D9654C23638C}" type="presOf" srcId="{0FF8A949-AA9D-41E6-BB0B-B9E6D7031565}" destId="{EA81ED6A-A7EA-4137-A3DC-D16E79F1B938}" srcOrd="0" destOrd="6" presId="urn:microsoft.com/office/officeart/2005/8/layout/hList1"/>
     <dgm:cxn modelId="{AD3A2602-5136-49F1-9BB9-099C0157C7BF}" type="presOf" srcId="{6121824F-16C4-4C65-97D4-AE31C568557E}" destId="{17CA1487-CDD9-4364-92F6-A11DBDAFE16C}" srcOrd="0" destOrd="5" presId="urn:microsoft.com/office/officeart/2005/8/layout/hList1"/>
     <dgm:cxn modelId="{B12F0503-977A-4B5D-8CB7-420B041FF863}" srcId="{CF9FC193-7A05-4631-B681-B56EAB543D38}" destId="{6857B86A-DEC1-407C-A1BB-5BF9ACCBCA6A}" srcOrd="0" destOrd="0" parTransId="{8CA7BF9B-8199-4683-AD57-CB0086659013}" sibTransId="{F087F24E-A7D7-4DCE-B2A7-9B941289621A}"/>
+    <dgm:cxn modelId="{29ED4B08-1A97-4038-B618-89A95050E3A6}" srcId="{2F60EAC5-6FD4-4BEF-BDD9-FDB6679C289F}" destId="{9C5B5E31-3266-401D-AD43-074714A6B83F}" srcOrd="7" destOrd="0" parTransId="{B1A4C8B8-2F9F-4913-BC1D-B17283FFB586}" sibTransId="{613C7389-5A27-4197-8AAE-EF312987B696}"/>
     <dgm:cxn modelId="{F4D0330E-DBB7-43A5-886D-CD4722AAB39F}" type="presOf" srcId="{F4E5C8CA-D853-4B86-A230-410812094866}" destId="{E4FD5043-5612-43C5-B6AE-CCD431549399}" srcOrd="0" destOrd="2" presId="urn:microsoft.com/office/officeart/2005/8/layout/hList1"/>
     <dgm:cxn modelId="{8C3FF810-F688-40B6-A642-160CE9E9AA9B}" type="presOf" srcId="{2F60EAC5-6FD4-4BEF-BDD9-FDB6679C289F}" destId="{EA81ED6A-A7EA-4137-A3DC-D16E79F1B938}" srcOrd="0" destOrd="1" presId="urn:microsoft.com/office/officeart/2005/8/layout/hList1"/>
+    <dgm:cxn modelId="{E135A01E-FA33-45B6-BEF8-62C68741D801}" type="presOf" srcId="{9C5B5E31-3266-401D-AD43-074714A6B83F}" destId="{EA81ED6A-A7EA-4137-A3DC-D16E79F1B938}" srcOrd="0" destOrd="9" presId="urn:microsoft.com/office/officeart/2005/8/layout/hList1"/>
     <dgm:cxn modelId="{9BB72F2A-D365-40E5-A614-9C39D2A3D616}" type="presOf" srcId="{2326EA86-5B01-448D-B7F1-3E265923EA6A}" destId="{17CA1487-CDD9-4364-92F6-A11DBDAFE16C}" srcOrd="0" destOrd="3" presId="urn:microsoft.com/office/officeart/2005/8/layout/hList1"/>
     <dgm:cxn modelId="{9B14062E-D54C-460B-8ACF-1EAC88128A75}" type="presOf" srcId="{59C74700-7058-4FEE-A9CC-4C1A323F036B}" destId="{EA81ED6A-A7EA-4137-A3DC-D16E79F1B938}" srcOrd="0" destOrd="7" presId="urn:microsoft.com/office/officeart/2005/8/layout/hList1"/>
-    <dgm:cxn modelId="{421AFE2F-F0E0-44B8-AF49-E7C71B40EBDF}" srcId="{DA5DFAD8-E443-4F53-9341-A0903BBBD378}" destId="{5D85A349-16C5-4D47-B7B5-2EC1073D2661}" srcOrd="2" destOrd="0" parTransId="{94A7A624-8812-4345-B05A-7BEDFCD5C156}" sibTransId="{C4112652-278C-4FBE-A3A5-1CDEE1E544E2}"/>
+    <dgm:cxn modelId="{421AFE2F-F0E0-44B8-AF49-E7C71B40EBDF}" srcId="{DA5DFAD8-E443-4F53-9341-A0903BBBD378}" destId="{5D85A349-16C5-4D47-B7B5-2EC1073D2661}" srcOrd="3" destOrd="0" parTransId="{94A7A624-8812-4345-B05A-7BEDFCD5C156}" sibTransId="{C4112652-278C-4FBE-A3A5-1CDEE1E544E2}"/>
     <dgm:cxn modelId="{1F05D431-7385-48BB-A276-D5ABBF0A9E97}" srcId="{2F60EAC5-6FD4-4BEF-BDD9-FDB6679C289F}" destId="{0FF8A949-AA9D-41E6-BB0B-B9E6D7031565}" srcOrd="4" destOrd="0" parTransId="{0987C1EE-7374-43E9-A3AE-48FE30B4C098}" sibTransId="{DCF2A86D-7A68-412A-9925-0EB1FC2AF555}"/>
-    <dgm:cxn modelId="{8E7CA135-4783-4350-8601-1267AF2BA9BB}" type="presOf" srcId="{5D85A349-16C5-4D47-B7B5-2EC1073D2661}" destId="{EA81ED6A-A7EA-4137-A3DC-D16E79F1B938}" srcOrd="0" destOrd="11" presId="urn:microsoft.com/office/officeart/2005/8/layout/hList1"/>
+    <dgm:cxn modelId="{8E7CA135-4783-4350-8601-1267AF2BA9BB}" type="presOf" srcId="{5D85A349-16C5-4D47-B7B5-2EC1073D2661}" destId="{EA81ED6A-A7EA-4137-A3DC-D16E79F1B938}" srcOrd="0" destOrd="14" presId="urn:microsoft.com/office/officeart/2005/8/layout/hList1"/>
     <dgm:cxn modelId="{ED725E3E-F0E3-4177-86AE-5ECE4371903C}" type="presOf" srcId="{13A96DEB-B718-4CAD-A365-5A669C1B5767}" destId="{EA81ED6A-A7EA-4137-A3DC-D16E79F1B938}" srcOrd="0" destOrd="4" presId="urn:microsoft.com/office/officeart/2005/8/layout/hList1"/>
     <dgm:cxn modelId="{4A53605E-BF09-4751-86C8-19A28F4EFD0D}" srcId="{ABA77F75-8642-4931-8D7E-BE6C6DB9940D}" destId="{F4E5C8CA-D853-4B86-A230-410812094866}" srcOrd="2" destOrd="0" parTransId="{005594CA-99F2-432B-BF91-C42D348C511A}" sibTransId="{FDA1AF4B-23A8-4C87-945B-517631227F52}"/>
     <dgm:cxn modelId="{CA949A5F-9945-4C59-A233-D70AFFF70BDA}" srcId="{DA5DFAD8-E443-4F53-9341-A0903BBBD378}" destId="{6EE89B4E-BAED-4A90-B29D-70AF11256801}" srcOrd="0" destOrd="0" parTransId="{39BF20C7-31E5-452B-8EA2-17224A13C7FB}" sibTransId="{E71503C3-CFB7-4144-AD9F-7A42A87A3A6B}"/>
     <dgm:cxn modelId="{617D1F62-E7D2-4F50-9F9B-0D6408668A76}" srcId="{2F60EAC5-6FD4-4BEF-BDD9-FDB6679C289F}" destId="{13A96DEB-B718-4CAD-A365-5A669C1B5767}" srcOrd="2" destOrd="0" parTransId="{9478F3F5-FD99-4353-BC0C-3F21605D59FC}" sibTransId="{5F9C800F-FC6D-4E27-BD0C-95B74658D226}"/>
+    <dgm:cxn modelId="{16DFCB42-6A02-4755-BADE-0FD730DD15CA}" srcId="{2F60EAC5-6FD4-4BEF-BDD9-FDB6679C289F}" destId="{C8F2F8B1-D5E4-47FC-A482-E15642E97ADF}" srcOrd="6" destOrd="0" parTransId="{FCEF5A4B-83C0-4F75-B4E3-FFC063837600}" sibTransId="{F83B466D-4F65-44D0-97F0-D6D5BA54BA32}"/>
     <dgm:cxn modelId="{43ED6747-9745-4AEC-932F-015864BAAA4B}" srcId="{ABA77F75-8642-4931-8D7E-BE6C6DB9940D}" destId="{658E7E1C-C938-4112-884D-828D3980BD39}" srcOrd="1" destOrd="0" parTransId="{A15418C6-AACB-45C4-82C9-6EEAB6BC9AD2}" sibTransId="{02FE6E80-3BB1-4112-817D-FFE07F685D4A}"/>
     <dgm:cxn modelId="{18DC796B-A12C-4933-9201-8D6EE300A2A0}" srcId="{6857B86A-DEC1-407C-A1BB-5BF9ACCBCA6A}" destId="{39E0DCC1-D3FF-46A1-84AC-3E2C046206C3}" srcOrd="1" destOrd="0" parTransId="{75982A97-8130-4E98-B82E-DB0953FC8B95}" sibTransId="{5C6A8CA1-CB30-45D0-B9ED-3A3294BF0500}"/>
     <dgm:cxn modelId="{D5D61B4C-1312-427C-BDCC-013237D8A488}" srcId="{ABA77F75-8642-4931-8D7E-BE6C6DB9940D}" destId="{611C3B18-07F8-4A66-9682-97E24AEF6014}" srcOrd="0" destOrd="0" parTransId="{5940BF2D-F08A-4150-9A86-173D9242DE8C}" sibTransId="{477660C6-2B6D-4FB8-B9A3-D555E2082C2A}"/>
     <dgm:cxn modelId="{9B5EF070-2208-4D48-B5EE-FD4380264929}" srcId="{6857B86A-DEC1-407C-A1BB-5BF9ACCBCA6A}" destId="{2AE9B789-FEE4-4EA5-BA4D-CE5E1FDDBB56}" srcOrd="2" destOrd="0" parTransId="{85238600-29C2-44DB-BD00-1C7AFF99B7C0}" sibTransId="{1FBB97C2-178C-4D74-84BC-818F9449B037}"/>
     <dgm:cxn modelId="{AA027375-CDBC-4C6A-9C86-9F783B47207F}" srcId="{2F60EAC5-6FD4-4BEF-BDD9-FDB6679C289F}" destId="{DCA9B665-D854-45CA-B3EB-F8806A002D9A}" srcOrd="1" destOrd="0" parTransId="{7C675B52-C964-48EC-8FF9-B52CF7AFE30B}" sibTransId="{B4A37C19-0DAA-4E65-9851-42B233A92F89}"/>
-    <dgm:cxn modelId="{63ADF855-874E-4ED8-AE0A-6EA2A7D9D57C}" srcId="{77893CAB-E6A4-481C-A464-9FC5B5917853}" destId="{1004CC15-A022-49D3-ADA3-5F59CC69F1C9}" srcOrd="0" destOrd="0" parTransId="{836E658F-0BBE-4667-B125-98DFD6DAD62F}" sibTransId="{D194E600-E6AD-4FBC-B512-DF328FBF7987}"/>
+    <dgm:cxn modelId="{63ADF855-874E-4ED8-AE0A-6EA2A7D9D57C}" srcId="{5E9A4EC2-4EDE-4E07-B692-46D6739EE230}" destId="{1004CC15-A022-49D3-ADA3-5F59CC69F1C9}" srcOrd="0" destOrd="0" parTransId="{836E658F-0BBE-4667-B125-98DFD6DAD62F}" sibTransId="{D194E600-E6AD-4FBC-B512-DF328FBF7987}"/>
     <dgm:cxn modelId="{CC914357-107D-444A-BC0C-A0FC0F75A205}" type="presOf" srcId="{2D5B933B-42F3-42B5-909C-385314E0D308}" destId="{17CA1487-CDD9-4364-92F6-A11DBDAFE16C}" srcOrd="0" destOrd="4" presId="urn:microsoft.com/office/officeart/2005/8/layout/hList1"/>
+    <dgm:cxn modelId="{EF126E58-80B2-4345-ACBA-6C5962B06D58}" type="presOf" srcId="{C8F2F8B1-D5E4-47FC-A482-E15642E97ADF}" destId="{EA81ED6A-A7EA-4137-A3DC-D16E79F1B938}" srcOrd="0" destOrd="8" presId="urn:microsoft.com/office/officeart/2005/8/layout/hList1"/>
     <dgm:cxn modelId="{F84A0D7A-88C7-4C2F-88CB-2300A21E2893}" type="presOf" srcId="{CB2ED894-EA78-4ADA-989E-53760C9E8D8B}" destId="{EA81ED6A-A7EA-4137-A3DC-D16E79F1B938}" srcOrd="0" destOrd="2" presId="urn:microsoft.com/office/officeart/2005/8/layout/hList1"/>
     <dgm:cxn modelId="{9078E27D-B210-4132-B9B0-2C5E74A749EF}" type="presOf" srcId="{658E7E1C-C938-4112-884D-828D3980BD39}" destId="{E4FD5043-5612-43C5-B6AE-CCD431549399}" srcOrd="0" destOrd="1" presId="urn:microsoft.com/office/officeart/2005/8/layout/hList1"/>
     <dgm:cxn modelId="{64420D81-C48A-4E79-8A0C-0A360AFFE148}" type="presOf" srcId="{DCA9B665-D854-45CA-B3EB-F8806A002D9A}" destId="{EA81ED6A-A7EA-4137-A3DC-D16E79F1B938}" srcOrd="0" destOrd="3" presId="urn:microsoft.com/office/officeart/2005/8/layout/hList1"/>
@@ -3405,18 +3856,19 @@
     <dgm:cxn modelId="{2A048A8A-D3E9-4D78-97F5-CDA37AB1D412}" type="presOf" srcId="{DA5DFAD8-E443-4F53-9341-A0903BBBD378}" destId="{23D06E36-F688-4B37-8BB8-73015E665B0E}" srcOrd="0" destOrd="0" presId="urn:microsoft.com/office/officeart/2005/8/layout/hList1"/>
     <dgm:cxn modelId="{7A4FB68D-298C-4344-BBDC-B1D0C26B68F7}" srcId="{DA5DFAD8-E443-4F53-9341-A0903BBBD378}" destId="{77893CAB-E6A4-481C-A464-9FC5B5917853}" srcOrd="1" destOrd="0" parTransId="{2E35248E-DBE4-4228-830E-A28FBAF7CBCC}" sibTransId="{D10328EA-009D-41F7-9B92-F7D416FF302F}"/>
     <dgm:cxn modelId="{23D6659A-C44A-45A3-A093-1B9804CF6E74}" srcId="{6857B86A-DEC1-407C-A1BB-5BF9ACCBCA6A}" destId="{2326EA86-5B01-448D-B7F1-3E265923EA6A}" srcOrd="3" destOrd="0" parTransId="{C918EDD0-D697-4AC8-B84A-C075A4D48F5E}" sibTransId="{3D62CC48-B5DB-4CF7-8312-212DF6E8750F}"/>
-    <dgm:cxn modelId="{9E265D9F-1436-4FEB-9477-8C7CAD0B4B62}" srcId="{77893CAB-E6A4-481C-A464-9FC5B5917853}" destId="{C6431A95-FB0B-4CAC-AEC9-E017A8960D6D}" srcOrd="1" destOrd="0" parTransId="{710904E6-3B09-497C-982D-6E974045EC45}" sibTransId="{BA5EF7C2-6909-4504-8620-F5DB7DE7E099}"/>
+    <dgm:cxn modelId="{9E265D9F-1436-4FEB-9477-8C7CAD0B4B62}" srcId="{5E9A4EC2-4EDE-4E07-B692-46D6739EE230}" destId="{C6431A95-FB0B-4CAC-AEC9-E017A8960D6D}" srcOrd="1" destOrd="0" parTransId="{710904E6-3B09-497C-982D-6E974045EC45}" sibTransId="{BA5EF7C2-6909-4504-8620-F5DB7DE7E099}"/>
     <dgm:cxn modelId="{4BF1EEA1-6E89-4F91-BAE8-11038685C515}" type="presOf" srcId="{4C8BFA56-3F75-4CAD-90A3-2F214D699322}" destId="{17CA1487-CDD9-4364-92F6-A11DBDAFE16C}" srcOrd="0" destOrd="0" presId="urn:microsoft.com/office/officeart/2005/8/layout/hList1"/>
     <dgm:cxn modelId="{1958AFA4-E260-4D59-AFE5-D9B6D5ABC5C0}" type="presOf" srcId="{39E0DCC1-D3FF-46A1-84AC-3E2C046206C3}" destId="{17CA1487-CDD9-4364-92F6-A11DBDAFE16C}" srcOrd="0" destOrd="1" presId="urn:microsoft.com/office/officeart/2005/8/layout/hList1"/>
     <dgm:cxn modelId="{8CA602A7-2740-420C-969E-A88C2E388817}" srcId="{2F60EAC5-6FD4-4BEF-BDD9-FDB6679C289F}" destId="{3AE54233-9B91-43EE-972D-726141A367FB}" srcOrd="3" destOrd="0" parTransId="{F1FDBDE0-B091-454A-BFA6-4255703D04F2}" sibTransId="{662170A1-04DA-4048-A815-659CA8DAFA60}"/>
-    <dgm:cxn modelId="{298E61AC-B766-4B67-A699-65F69BEC371A}" type="presOf" srcId="{1004CC15-A022-49D3-ADA3-5F59CC69F1C9}" destId="{EA81ED6A-A7EA-4137-A3DC-D16E79F1B938}" srcOrd="0" destOrd="9" presId="urn:microsoft.com/office/officeart/2005/8/layout/hList1"/>
-    <dgm:cxn modelId="{0A1105AD-2BDC-471D-8AE6-37FDAB19EDF9}" type="presOf" srcId="{C6431A95-FB0B-4CAC-AEC9-E017A8960D6D}" destId="{EA81ED6A-A7EA-4137-A3DC-D16E79F1B938}" srcOrd="0" destOrd="10" presId="urn:microsoft.com/office/officeart/2005/8/layout/hList1"/>
+    <dgm:cxn modelId="{298E61AC-B766-4B67-A699-65F69BEC371A}" type="presOf" srcId="{1004CC15-A022-49D3-ADA3-5F59CC69F1C9}" destId="{EA81ED6A-A7EA-4137-A3DC-D16E79F1B938}" srcOrd="0" destOrd="12" presId="urn:microsoft.com/office/officeart/2005/8/layout/hList1"/>
+    <dgm:cxn modelId="{0A1105AD-2BDC-471D-8AE6-37FDAB19EDF9}" type="presOf" srcId="{C6431A95-FB0B-4CAC-AEC9-E017A8960D6D}" destId="{EA81ED6A-A7EA-4137-A3DC-D16E79F1B938}" srcOrd="0" destOrd="13" presId="urn:microsoft.com/office/officeart/2005/8/layout/hList1"/>
     <dgm:cxn modelId="{5F12E8B9-000C-441B-B9E7-99ED7A20363B}" type="presOf" srcId="{6857B86A-DEC1-407C-A1BB-5BF9ACCBCA6A}" destId="{F0C1B2C7-0B23-4FE8-AB0F-5877B88532DB}" srcOrd="0" destOrd="0" presId="urn:microsoft.com/office/officeart/2005/8/layout/hList1"/>
     <dgm:cxn modelId="{A88409BB-D26D-47BE-9D12-D94001E8D4E4}" type="presOf" srcId="{3AE54233-9B91-43EE-972D-726141A367FB}" destId="{EA81ED6A-A7EA-4137-A3DC-D16E79F1B938}" srcOrd="0" destOrd="5" presId="urn:microsoft.com/office/officeart/2005/8/layout/hList1"/>
     <dgm:cxn modelId="{B4B90BC0-3B9A-402C-9AA5-2F91586FE0E8}" srcId="{6121824F-16C4-4C65-97D4-AE31C568557E}" destId="{753AC111-015C-42D1-8ABB-9AB6F3785DBF}" srcOrd="0" destOrd="0" parTransId="{5A327804-E5B5-4524-BDF8-43E89C648B4F}" sibTransId="{FB7AA6DF-3B26-482A-A715-738D84538B54}"/>
     <dgm:cxn modelId="{0073D4C3-F488-4F79-B637-186FAECF6BAD}" srcId="{CF9FC193-7A05-4631-B681-B56EAB543D38}" destId="{DA5DFAD8-E443-4F53-9341-A0903BBBD378}" srcOrd="2" destOrd="0" parTransId="{F6012B3B-01B0-4E7C-A363-0177B95D3DD8}" sibTransId="{76D9F54E-47B3-4FE0-B465-AD673964072E}"/>
     <dgm:cxn modelId="{BEE9B2C8-35BA-4C42-BCB6-42FCA175EF8C}" type="presOf" srcId="{753AC111-015C-42D1-8ABB-9AB6F3785DBF}" destId="{17CA1487-CDD9-4364-92F6-A11DBDAFE16C}" srcOrd="0" destOrd="6" presId="urn:microsoft.com/office/officeart/2005/8/layout/hList1"/>
     <dgm:cxn modelId="{51E9F5C9-CB9B-4256-8C0A-5C44B575C0D8}" srcId="{6EE89B4E-BAED-4A90-B29D-70AF11256801}" destId="{2F60EAC5-6FD4-4BEF-BDD9-FDB6679C289F}" srcOrd="0" destOrd="0" parTransId="{20D31ADA-66D8-41E9-8FE2-C11B0DBC6437}" sibTransId="{D0CED008-9504-4BEA-92F4-16C826541117}"/>
+    <dgm:cxn modelId="{083D09CE-8684-4B7A-9140-35D2DA542D79}" type="presOf" srcId="{5E9A4EC2-4EDE-4E07-B692-46D6739EE230}" destId="{EA81ED6A-A7EA-4137-A3DC-D16E79F1B938}" srcOrd="0" destOrd="11" presId="urn:microsoft.com/office/officeart/2005/8/layout/hList1"/>
     <dgm:cxn modelId="{4E21C5D3-FA97-4E62-8CC9-01B68E76021E}" type="presOf" srcId="{ABA77F75-8642-4931-8D7E-BE6C6DB9940D}" destId="{055A5EAB-EAE0-4501-8649-31F112FF9AD5}" srcOrd="0" destOrd="0" presId="urn:microsoft.com/office/officeart/2005/8/layout/hList1"/>
     <dgm:cxn modelId="{F5DD56DD-6CAD-417C-BDD4-6C13842E15C2}" srcId="{6857B86A-DEC1-407C-A1BB-5BF9ACCBCA6A}" destId="{2D5B933B-42F3-42B5-909C-385314E0D308}" srcOrd="4" destOrd="0" parTransId="{7A9A6CE3-4967-4A84-92D1-1B3BA61CE2B6}" sibTransId="{F23233DB-EAE3-4491-887E-16969F1190F1}"/>
     <dgm:cxn modelId="{4CD5FCDD-1F8A-43A3-BD77-CBE3B3864C41}" srcId="{6857B86A-DEC1-407C-A1BB-5BF9ACCBCA6A}" destId="{4C8BFA56-3F75-4CAD-90A3-2F214D699322}" srcOrd="0" destOrd="0" parTransId="{9A6E3B20-A734-4412-84CF-0134D93D4B28}" sibTransId="{7B50916F-B8BA-427F-B9F0-A301E54D7FB3}"/>
@@ -3424,7 +3876,8 @@
     <dgm:cxn modelId="{58D887E9-04DA-4285-827F-DA6F12BD080E}" type="presOf" srcId="{611C3B18-07F8-4A66-9682-97E24AEF6014}" destId="{E4FD5043-5612-43C5-B6AE-CCD431549399}" srcOrd="0" destOrd="0" presId="urn:microsoft.com/office/officeart/2005/8/layout/hList1"/>
     <dgm:cxn modelId="{D959B3EA-A66A-4B40-901C-93ECD4985A93}" srcId="{CF9FC193-7A05-4631-B681-B56EAB543D38}" destId="{ABA77F75-8642-4931-8D7E-BE6C6DB9940D}" srcOrd="1" destOrd="0" parTransId="{FCF9AE1B-B22B-4F91-BFD8-DDBBF762F128}" sibTransId="{1A095211-ADB0-42CA-9F24-F1BC942872F3}"/>
     <dgm:cxn modelId="{E5F3C7EA-3008-4AEE-AB3F-99D6696FCD2D}" type="presOf" srcId="{2AE9B789-FEE4-4EA5-BA4D-CE5E1FDDBB56}" destId="{17CA1487-CDD9-4364-92F6-A11DBDAFE16C}" srcOrd="0" destOrd="2" presId="urn:microsoft.com/office/officeart/2005/8/layout/hList1"/>
-    <dgm:cxn modelId="{74BB2EEB-AE96-4927-AACF-4168C7C1D61B}" type="presOf" srcId="{77893CAB-E6A4-481C-A464-9FC5B5917853}" destId="{EA81ED6A-A7EA-4137-A3DC-D16E79F1B938}" srcOrd="0" destOrd="8" presId="urn:microsoft.com/office/officeart/2005/8/layout/hList1"/>
+    <dgm:cxn modelId="{74BB2EEB-AE96-4927-AACF-4168C7C1D61B}" type="presOf" srcId="{77893CAB-E6A4-481C-A464-9FC5B5917853}" destId="{EA81ED6A-A7EA-4137-A3DC-D16E79F1B938}" srcOrd="0" destOrd="10" presId="urn:microsoft.com/office/officeart/2005/8/layout/hList1"/>
+    <dgm:cxn modelId="{D3F9ACEC-EC06-4AA9-A11B-A4C93AD7379D}" srcId="{DA5DFAD8-E443-4F53-9341-A0903BBBD378}" destId="{5E9A4EC2-4EDE-4E07-B692-46D6739EE230}" srcOrd="2" destOrd="0" parTransId="{BC0EC666-DAFE-4339-921A-C82E4A290B19}" sibTransId="{61778957-840E-489C-8E30-135D6863ECA3}"/>
     <dgm:cxn modelId="{16DF51F3-0A09-49DE-925C-03278AE9CD0E}" srcId="{2F60EAC5-6FD4-4BEF-BDD9-FDB6679C289F}" destId="{CB2ED894-EA78-4ADA-989E-53760C9E8D8B}" srcOrd="0" destOrd="0" parTransId="{7ADF8406-B31C-4892-A444-F22D8AC412F8}" sibTransId="{14C28DF8-E8F7-4670-B352-3A86137AD91C}"/>
     <dgm:cxn modelId="{DC2501F6-690F-45DC-8B69-6D2896F32FAC}" srcId="{6857B86A-DEC1-407C-A1BB-5BF9ACCBCA6A}" destId="{6121824F-16C4-4C65-97D4-AE31C568557E}" srcOrd="5" destOrd="0" parTransId="{3C6A4360-9C59-4EBC-A537-49DBF29E1BCF}" sibTransId="{B7BD3C6B-24FE-45A9-B58B-BC6814396649}"/>
     <dgm:cxn modelId="{765D4AFC-C3A4-4F8B-A000-988DC6C44800}" type="presOf" srcId="{6EE89B4E-BAED-4A90-B29D-70AF11256801}" destId="{EA81ED6A-A7EA-4137-A3DC-D16E79F1B938}" srcOrd="0" destOrd="0" presId="urn:microsoft.com/office/officeart/2005/8/layout/hList1"/>
@@ -4145,8 +4598,8 @@
       </dsp:nvSpPr>
       <dsp:spPr>
         <a:xfrm>
-          <a:off x="3535" y="72998"/>
-          <a:ext cx="3447370" cy="652860"/>
+          <a:off x="3535" y="136077"/>
+          <a:ext cx="3447370" cy="432000"/>
         </a:xfrm>
         <a:prstGeom prst="rect">
           <a:avLst/>
@@ -4187,12 +4640,12 @@
         </a:fontRef>
       </dsp:style>
       <dsp:txBody>
-        <a:bodyPr spcFirstLastPara="0" vert="horz" wrap="square" lIns="128016" tIns="73152" rIns="128016" bIns="73152" numCol="1" spcCol="1270" anchor="ctr" anchorCtr="0">
+        <a:bodyPr spcFirstLastPara="0" vert="horz" wrap="square" lIns="106680" tIns="60960" rIns="106680" bIns="60960" numCol="1" spcCol="1270" anchor="ctr" anchorCtr="0">
           <a:noAutofit/>
         </a:bodyPr>
         <a:lstStyle/>
         <a:p>
-          <a:pPr marL="0" lvl="0" indent="0" algn="ctr" defTabSz="800100">
+          <a:pPr marL="0" lvl="0" indent="0" algn="ctr" defTabSz="666750">
             <a:lnSpc>
               <a:spcPct val="90000"/>
             </a:lnSpc>
@@ -4205,7 +4658,7 @@
             <a:buNone/>
           </a:pPr>
           <a:r>
-            <a:rPr lang="en-US" sz="1800" b="1" kern="1200" dirty="0">
+            <a:rPr lang="en-US" sz="1500" b="1" kern="1200" dirty="0">
               <a:solidFill>
                 <a:schemeClr val="tx1"/>
               </a:solidFill>
@@ -4218,8 +4671,8 @@
         </a:p>
       </dsp:txBody>
       <dsp:txXfrm>
-        <a:off x="3535" y="72998"/>
-        <a:ext cx="3447370" cy="652860"/>
+        <a:off x="3535" y="136077"/>
+        <a:ext cx="3447370" cy="432000"/>
       </dsp:txXfrm>
     </dsp:sp>
     <dsp:sp modelId="{17CA1487-CDD9-4364-92F6-A11DBDAFE16C}">
@@ -4229,8 +4682,8 @@
       </dsp:nvSpPr>
       <dsp:spPr>
         <a:xfrm>
-          <a:off x="3535" y="725859"/>
-          <a:ext cx="3447370" cy="3693397"/>
+          <a:off x="3535" y="568077"/>
+          <a:ext cx="3447370" cy="3788100"/>
         </a:xfrm>
         <a:prstGeom prst="rect">
           <a:avLst/>
@@ -4273,12 +4726,12 @@
         <a:fontRef idx="minor"/>
       </dsp:style>
       <dsp:txBody>
-        <a:bodyPr spcFirstLastPara="0" vert="horz" wrap="square" lIns="96012" tIns="96012" rIns="128016" bIns="144018" numCol="1" spcCol="1270" anchor="t" anchorCtr="0">
+        <a:bodyPr spcFirstLastPara="0" vert="horz" wrap="square" lIns="80010" tIns="80010" rIns="106680" bIns="120015" numCol="1" spcCol="1270" anchor="t" anchorCtr="0">
           <a:noAutofit/>
         </a:bodyPr>
         <a:lstStyle/>
         <a:p>
-          <a:pPr marL="171450" lvl="1" indent="-171450" algn="l" defTabSz="800100">
+          <a:pPr marL="114300" lvl="1" indent="-114300" algn="l" defTabSz="666750">
             <a:lnSpc>
               <a:spcPct val="90000"/>
             </a:lnSpc>
@@ -4292,21 +4745,21 @@
             <a:buChar char=""/>
           </a:pPr>
           <a:r>
-            <a:rPr lang="en-US" sz="1800" kern="1200" dirty="0" err="1">
+            <a:rPr lang="en-US" sz="1500" kern="1200" dirty="0" err="1">
               <a:latin typeface="Tahoma" panose="020B0604030504040204" pitchFamily="34" charset="0"/>
               <a:ea typeface="Tahoma" panose="020B0604030504040204" pitchFamily="34" charset="0"/>
               <a:cs typeface="Tahoma" panose="020B0604030504040204" pitchFamily="34" charset="0"/>
             </a:rPr>
             <a:t>Webscraping</a:t>
           </a:r>
-          <a:endParaRPr lang="en-US" sz="1800" kern="1200" dirty="0">
+          <a:endParaRPr lang="en-US" sz="1500" kern="1200" dirty="0">
             <a:latin typeface="Tahoma" panose="020B0604030504040204" pitchFamily="34" charset="0"/>
             <a:ea typeface="Tahoma" panose="020B0604030504040204" pitchFamily="34" charset="0"/>
             <a:cs typeface="Tahoma" panose="020B0604030504040204" pitchFamily="34" charset="0"/>
           </a:endParaRPr>
         </a:p>
         <a:p>
-          <a:pPr marL="171450" lvl="1" indent="-171450" algn="l" defTabSz="800100">
+          <a:pPr marL="114300" lvl="1" indent="-114300" algn="l" defTabSz="666750">
             <a:lnSpc>
               <a:spcPct val="90000"/>
             </a:lnSpc>
@@ -4320,7 +4773,7 @@
             <a:buChar char=""/>
           </a:pPr>
           <a:r>
-            <a:rPr lang="en-US" sz="1800" kern="1200" dirty="0">
+            <a:rPr lang="en-US" sz="1500" kern="1200" dirty="0">
               <a:latin typeface="Tahoma" panose="020B0604030504040204" pitchFamily="34" charset="0"/>
               <a:ea typeface="Tahoma" panose="020B0604030504040204" pitchFamily="34" charset="0"/>
               <a:cs typeface="Tahoma" panose="020B0604030504040204" pitchFamily="34" charset="0"/>
@@ -4329,7 +4782,7 @@
           </a:r>
         </a:p>
         <a:p>
-          <a:pPr marL="171450" lvl="1" indent="-171450" algn="l" defTabSz="800100">
+          <a:pPr marL="114300" lvl="1" indent="-114300" algn="l" defTabSz="666750">
             <a:lnSpc>
               <a:spcPct val="90000"/>
             </a:lnSpc>
@@ -4343,7 +4796,7 @@
             <a:buChar char=""/>
           </a:pPr>
           <a:r>
-            <a:rPr lang="en-US" sz="1800" kern="1200" dirty="0">
+            <a:rPr lang="en-US" sz="1500" kern="1200" dirty="0">
               <a:latin typeface="Tahoma" panose="020B0604030504040204" pitchFamily="34" charset="0"/>
               <a:ea typeface="Tahoma" panose="020B0604030504040204" pitchFamily="34" charset="0"/>
               <a:cs typeface="Tahoma" panose="020B0604030504040204" pitchFamily="34" charset="0"/>
@@ -4352,7 +4805,7 @@
           </a:r>
         </a:p>
         <a:p>
-          <a:pPr marL="171450" lvl="1" indent="-171450" algn="l" defTabSz="800100">
+          <a:pPr marL="114300" lvl="1" indent="-114300" algn="l" defTabSz="666750">
             <a:lnSpc>
               <a:spcPct val="90000"/>
             </a:lnSpc>
@@ -4366,7 +4819,7 @@
             <a:buChar char=""/>
           </a:pPr>
           <a:r>
-            <a:rPr lang="en-US" sz="1800" kern="1200" dirty="0">
+            <a:rPr lang="en-US" sz="1500" kern="1200" dirty="0">
               <a:latin typeface="Tahoma" panose="020B0604030504040204" pitchFamily="34" charset="0"/>
               <a:ea typeface="Tahoma" panose="020B0604030504040204" pitchFamily="34" charset="0"/>
               <a:cs typeface="Tahoma" panose="020B0604030504040204" pitchFamily="34" charset="0"/>
@@ -4375,7 +4828,7 @@
           </a:r>
         </a:p>
         <a:p>
-          <a:pPr marL="171450" lvl="1" indent="-171450" algn="l" defTabSz="800100">
+          <a:pPr marL="114300" lvl="1" indent="-114300" algn="l" defTabSz="666750">
             <a:lnSpc>
               <a:spcPct val="90000"/>
             </a:lnSpc>
@@ -4389,21 +4842,21 @@
             <a:buChar char=""/>
           </a:pPr>
           <a:r>
-            <a:rPr lang="en-US" sz="1800" kern="1200" dirty="0" err="1">
+            <a:rPr lang="en-US" sz="1500" kern="1200" dirty="0" err="1">
               <a:latin typeface="Tahoma" panose="020B0604030504040204" pitchFamily="34" charset="0"/>
               <a:ea typeface="Tahoma" panose="020B0604030504040204" pitchFamily="34" charset="0"/>
               <a:cs typeface="Tahoma" panose="020B0604030504040204" pitchFamily="34" charset="0"/>
             </a:rPr>
             <a:t>sqlalchemy</a:t>
           </a:r>
-          <a:endParaRPr lang="en-US" sz="1800" kern="1200" dirty="0">
+          <a:endParaRPr lang="en-US" sz="1500" kern="1200" dirty="0">
             <a:latin typeface="Tahoma" panose="020B0604030504040204" pitchFamily="34" charset="0"/>
             <a:ea typeface="Tahoma" panose="020B0604030504040204" pitchFamily="34" charset="0"/>
             <a:cs typeface="Tahoma" panose="020B0604030504040204" pitchFamily="34" charset="0"/>
           </a:endParaRPr>
         </a:p>
         <a:p>
-          <a:pPr marL="171450" lvl="1" indent="-171450" algn="l" defTabSz="800100">
+          <a:pPr marL="114300" lvl="1" indent="-114300" algn="l" defTabSz="666750">
             <a:lnSpc>
               <a:spcPct val="90000"/>
             </a:lnSpc>
@@ -4417,7 +4870,7 @@
             <a:buChar char=""/>
           </a:pPr>
           <a:r>
-            <a:rPr lang="en-US" sz="1800" kern="1200" dirty="0">
+            <a:rPr lang="en-US" sz="1500" kern="1200" dirty="0">
               <a:latin typeface="Tahoma" panose="020B0604030504040204" pitchFamily="34" charset="0"/>
               <a:ea typeface="Tahoma" panose="020B0604030504040204" pitchFamily="34" charset="0"/>
               <a:cs typeface="Tahoma" panose="020B0604030504040204" pitchFamily="34" charset="0"/>
@@ -4426,7 +4879,7 @@
           </a:r>
         </a:p>
         <a:p>
-          <a:pPr marL="342900" lvl="2" indent="-171450" algn="l" defTabSz="800100">
+          <a:pPr marL="228600" lvl="2" indent="-114300" algn="l" defTabSz="666750">
             <a:lnSpc>
               <a:spcPct val="90000"/>
             </a:lnSpc>
@@ -4440,7 +4893,7 @@
             <a:buChar char=""/>
           </a:pPr>
           <a:r>
-            <a:rPr lang="en-US" sz="1800" kern="1200" dirty="0">
+            <a:rPr lang="en-US" sz="1500" kern="1200" dirty="0">
               <a:latin typeface="Tahoma" panose="020B0604030504040204" pitchFamily="34" charset="0"/>
               <a:ea typeface="Tahoma" panose="020B0604030504040204" pitchFamily="34" charset="0"/>
               <a:cs typeface="Tahoma" panose="020B0604030504040204" pitchFamily="34" charset="0"/>
@@ -4450,8 +4903,8 @@
         </a:p>
       </dsp:txBody>
       <dsp:txXfrm>
-        <a:off x="3535" y="725859"/>
-        <a:ext cx="3447370" cy="3693397"/>
+        <a:off x="3535" y="568077"/>
+        <a:ext cx="3447370" cy="3788100"/>
       </dsp:txXfrm>
     </dsp:sp>
     <dsp:sp modelId="{055A5EAB-EAE0-4501-8649-31F112FF9AD5}">
@@ -4461,8 +4914,8 @@
       </dsp:nvSpPr>
       <dsp:spPr>
         <a:xfrm>
-          <a:off x="3933537" y="72998"/>
-          <a:ext cx="3447370" cy="652860"/>
+          <a:off x="3933537" y="136077"/>
+          <a:ext cx="3447370" cy="432000"/>
         </a:xfrm>
         <a:prstGeom prst="rect">
           <a:avLst/>
@@ -4503,12 +4956,12 @@
         </a:fontRef>
       </dsp:style>
       <dsp:txBody>
-        <a:bodyPr spcFirstLastPara="0" vert="horz" wrap="square" lIns="128016" tIns="73152" rIns="128016" bIns="73152" numCol="1" spcCol="1270" anchor="ctr" anchorCtr="0">
+        <a:bodyPr spcFirstLastPara="0" vert="horz" wrap="square" lIns="106680" tIns="60960" rIns="106680" bIns="60960" numCol="1" spcCol="1270" anchor="ctr" anchorCtr="0">
           <a:noAutofit/>
         </a:bodyPr>
         <a:lstStyle/>
         <a:p>
-          <a:pPr marL="0" lvl="0" indent="0" algn="ctr" defTabSz="800100">
+          <a:pPr marL="0" lvl="0" indent="0" algn="ctr" defTabSz="666750">
             <a:lnSpc>
               <a:spcPct val="90000"/>
             </a:lnSpc>
@@ -4521,7 +4974,7 @@
             <a:buNone/>
           </a:pPr>
           <a:r>
-            <a:rPr lang="en-US" sz="1800" b="1" kern="1200" dirty="0">
+            <a:rPr lang="en-US" sz="1500" b="1" kern="1200" dirty="0">
               <a:solidFill>
                 <a:schemeClr val="tx1"/>
               </a:solidFill>
@@ -4534,8 +4987,8 @@
         </a:p>
       </dsp:txBody>
       <dsp:txXfrm>
-        <a:off x="3933537" y="72998"/>
-        <a:ext cx="3447370" cy="652860"/>
+        <a:off x="3933537" y="136077"/>
+        <a:ext cx="3447370" cy="432000"/>
       </dsp:txXfrm>
     </dsp:sp>
     <dsp:sp modelId="{E4FD5043-5612-43C5-B6AE-CCD431549399}">
@@ -4545,8 +4998,8 @@
       </dsp:nvSpPr>
       <dsp:spPr>
         <a:xfrm>
-          <a:off x="3933537" y="725859"/>
-          <a:ext cx="3447370" cy="3693397"/>
+          <a:off x="3933537" y="568077"/>
+          <a:ext cx="3447370" cy="3788100"/>
         </a:xfrm>
         <a:prstGeom prst="rect">
           <a:avLst/>
@@ -4589,12 +5042,12 @@
         <a:fontRef idx="minor"/>
       </dsp:style>
       <dsp:txBody>
-        <a:bodyPr spcFirstLastPara="0" vert="horz" wrap="square" lIns="96012" tIns="96012" rIns="128016" bIns="144018" numCol="1" spcCol="1270" anchor="t" anchorCtr="0">
+        <a:bodyPr spcFirstLastPara="0" vert="horz" wrap="square" lIns="80010" tIns="80010" rIns="106680" bIns="120015" numCol="1" spcCol="1270" anchor="t" anchorCtr="0">
           <a:noAutofit/>
         </a:bodyPr>
         <a:lstStyle/>
         <a:p>
-          <a:pPr marL="171450" lvl="1" indent="-171450" algn="l" defTabSz="800100">
+          <a:pPr marL="114300" lvl="1" indent="-114300" algn="l" defTabSz="666750">
             <a:lnSpc>
               <a:spcPct val="90000"/>
             </a:lnSpc>
@@ -4608,7 +5061,7 @@
             <a:buChar char=""/>
           </a:pPr>
           <a:r>
-            <a:rPr lang="en-US" sz="1800" kern="1200" dirty="0">
+            <a:rPr lang="en-US" sz="1500" kern="1200" dirty="0">
               <a:latin typeface="Tahoma" panose="020B0604030504040204" pitchFamily="34" charset="0"/>
               <a:ea typeface="Tahoma" panose="020B0604030504040204" pitchFamily="34" charset="0"/>
               <a:cs typeface="Tahoma" panose="020B0604030504040204" pitchFamily="34" charset="0"/>
@@ -4617,7 +5070,7 @@
           </a:r>
         </a:p>
         <a:p>
-          <a:pPr marL="171450" lvl="1" indent="-171450" algn="l" defTabSz="800100">
+          <a:pPr marL="114300" lvl="1" indent="-114300" algn="l" defTabSz="666750">
             <a:lnSpc>
               <a:spcPct val="90000"/>
             </a:lnSpc>
@@ -4631,7 +5084,7 @@
             <a:buChar char=""/>
           </a:pPr>
           <a:r>
-            <a:rPr lang="en-US" sz="1800" kern="1200" dirty="0">
+            <a:rPr lang="en-US" sz="1500" kern="1200" dirty="0">
               <a:latin typeface="Tahoma" panose="020B0604030504040204" pitchFamily="34" charset="0"/>
               <a:ea typeface="Tahoma" panose="020B0604030504040204" pitchFamily="34" charset="0"/>
               <a:cs typeface="Tahoma" panose="020B0604030504040204" pitchFamily="34" charset="0"/>
@@ -4640,7 +5093,7 @@
           </a:r>
         </a:p>
         <a:p>
-          <a:pPr marL="171450" lvl="1" indent="-171450" algn="l" defTabSz="800100">
+          <a:pPr marL="114300" lvl="1" indent="-114300" algn="l" defTabSz="666750">
             <a:lnSpc>
               <a:spcPct val="90000"/>
             </a:lnSpc>
@@ -4654,7 +5107,7 @@
             <a:buChar char=""/>
           </a:pPr>
           <a:r>
-            <a:rPr lang="en-US" sz="1800" kern="1200" dirty="0" err="1">
+            <a:rPr lang="en-US" sz="1500" kern="1200" dirty="0" err="1">
               <a:latin typeface="Tahoma" panose="020B0604030504040204" pitchFamily="34" charset="0"/>
               <a:ea typeface="Tahoma" panose="020B0604030504040204" pitchFamily="34" charset="0"/>
               <a:cs typeface="Tahoma" panose="020B0604030504040204" pitchFamily="34" charset="0"/>
@@ -4662,7 +5115,7 @@
             <a:t>Jupyter</a:t>
           </a:r>
           <a:r>
-            <a:rPr lang="en-US" sz="1800" kern="1200" dirty="0">
+            <a:rPr lang="en-US" sz="1500" kern="1200" dirty="0">
               <a:latin typeface="Tahoma" panose="020B0604030504040204" pitchFamily="34" charset="0"/>
               <a:ea typeface="Tahoma" panose="020B0604030504040204" pitchFamily="34" charset="0"/>
               <a:cs typeface="Tahoma" panose="020B0604030504040204" pitchFamily="34" charset="0"/>
@@ -4672,8 +5125,8 @@
         </a:p>
       </dsp:txBody>
       <dsp:txXfrm>
-        <a:off x="3933537" y="725859"/>
-        <a:ext cx="3447370" cy="3693397"/>
+        <a:off x="3933537" y="568077"/>
+        <a:ext cx="3447370" cy="3788100"/>
       </dsp:txXfrm>
     </dsp:sp>
     <dsp:sp modelId="{23D06E36-F688-4B37-8BB8-73015E665B0E}">
@@ -4683,8 +5136,8 @@
       </dsp:nvSpPr>
       <dsp:spPr>
         <a:xfrm>
-          <a:off x="7863539" y="72998"/>
-          <a:ext cx="3447370" cy="652860"/>
+          <a:off x="7863539" y="136077"/>
+          <a:ext cx="3447370" cy="432000"/>
         </a:xfrm>
         <a:prstGeom prst="rect">
           <a:avLst/>
@@ -4725,12 +5178,12 @@
         </a:fontRef>
       </dsp:style>
       <dsp:txBody>
-        <a:bodyPr spcFirstLastPara="0" vert="horz" wrap="square" lIns="128016" tIns="73152" rIns="128016" bIns="73152" numCol="1" spcCol="1270" anchor="ctr" anchorCtr="0">
+        <a:bodyPr spcFirstLastPara="0" vert="horz" wrap="square" lIns="106680" tIns="60960" rIns="106680" bIns="60960" numCol="1" spcCol="1270" anchor="ctr" anchorCtr="0">
           <a:noAutofit/>
         </a:bodyPr>
         <a:lstStyle/>
         <a:p>
-          <a:pPr marL="0" lvl="0" indent="0" algn="ctr" defTabSz="800100">
+          <a:pPr marL="0" lvl="0" indent="0" algn="ctr" defTabSz="666750">
             <a:lnSpc>
               <a:spcPct val="90000"/>
             </a:lnSpc>
@@ -4743,7 +5196,7 @@
             <a:buNone/>
           </a:pPr>
           <a:r>
-            <a:rPr lang="en-US" sz="1800" b="1" kern="1200" dirty="0">
+            <a:rPr lang="en-US" sz="1500" b="1" kern="1200" dirty="0">
               <a:solidFill>
                 <a:schemeClr val="tx1"/>
               </a:solidFill>
@@ -4754,7 +5207,7 @@
             <a:t>Machine Learning </a:t>
           </a:r>
           <a:r>
-            <a:rPr lang="en-US" sz="1800" b="1" kern="1200">
+            <a:rPr lang="en-US" sz="1500" b="1" kern="1200">
               <a:solidFill>
                 <a:schemeClr val="tx1"/>
               </a:solidFill>
@@ -4764,7 +5217,7 @@
             </a:rPr>
             <a:t>&amp; Visualization</a:t>
           </a:r>
-          <a:endParaRPr lang="en-US" sz="1800" b="1" kern="1200" dirty="0">
+          <a:endParaRPr lang="en-US" sz="1500" b="1" kern="1200" dirty="0">
             <a:solidFill>
               <a:schemeClr val="tx1"/>
             </a:solidFill>
@@ -4775,8 +5228,8 @@
         </a:p>
       </dsp:txBody>
       <dsp:txXfrm>
-        <a:off x="7863539" y="72998"/>
-        <a:ext cx="3447370" cy="652860"/>
+        <a:off x="7863539" y="136077"/>
+        <a:ext cx="3447370" cy="432000"/>
       </dsp:txXfrm>
     </dsp:sp>
     <dsp:sp modelId="{EA81ED6A-A7EA-4137-A3DC-D16E79F1B938}">
@@ -4786,8 +5239,8 @@
       </dsp:nvSpPr>
       <dsp:spPr>
         <a:xfrm>
-          <a:off x="7863539" y="725859"/>
-          <a:ext cx="3447370" cy="3693397"/>
+          <a:off x="7863539" y="568077"/>
+          <a:ext cx="3447370" cy="3788100"/>
         </a:xfrm>
         <a:prstGeom prst="rect">
           <a:avLst/>
@@ -4830,12 +5283,12 @@
         <a:fontRef idx="minor"/>
       </dsp:style>
       <dsp:txBody>
-        <a:bodyPr spcFirstLastPara="0" vert="horz" wrap="square" lIns="96012" tIns="96012" rIns="128016" bIns="144018" numCol="1" spcCol="1270" anchor="t" anchorCtr="0">
+        <a:bodyPr spcFirstLastPara="0" vert="horz" wrap="square" lIns="80010" tIns="80010" rIns="106680" bIns="120015" numCol="1" spcCol="1270" anchor="t" anchorCtr="0">
           <a:noAutofit/>
         </a:bodyPr>
         <a:lstStyle/>
         <a:p>
-          <a:pPr marL="171450" lvl="1" indent="-171450" algn="l" defTabSz="800100">
+          <a:pPr marL="114300" lvl="1" indent="-114300" algn="l" defTabSz="666750">
             <a:lnSpc>
               <a:spcPct val="90000"/>
             </a:lnSpc>
@@ -4849,7 +5302,7 @@
             <a:buChar char="§"/>
           </a:pPr>
           <a:r>
-            <a:rPr lang="en-US" sz="1800" kern="1200" dirty="0">
+            <a:rPr lang="en-US" sz="1500" kern="1200" dirty="0">
               <a:latin typeface="Tahoma" panose="020B0604030504040204" pitchFamily="34" charset="0"/>
               <a:ea typeface="Tahoma" panose="020B0604030504040204" pitchFamily="34" charset="0"/>
               <a:cs typeface="Tahoma" panose="020B0604030504040204" pitchFamily="34" charset="0"/>
@@ -4858,7 +5311,7 @@
           </a:r>
         </a:p>
         <a:p>
-          <a:pPr marL="342900" lvl="2" indent="-171450" algn="l" defTabSz="800100">
+          <a:pPr marL="228600" lvl="2" indent="-114300" algn="l" defTabSz="666750">
             <a:lnSpc>
               <a:spcPct val="90000"/>
             </a:lnSpc>
@@ -4872,7 +5325,7 @@
             <a:buChar char="§"/>
           </a:pPr>
           <a:r>
-            <a:rPr lang="en-US" sz="1800" kern="1200" dirty="0">
+            <a:rPr lang="en-US" sz="1500" kern="1200" dirty="0">
               <a:latin typeface="Tahoma" panose="020B0604030504040204" pitchFamily="34" charset="0"/>
               <a:ea typeface="Tahoma" panose="020B0604030504040204" pitchFamily="34" charset="0"/>
               <a:cs typeface="Tahoma" panose="020B0604030504040204" pitchFamily="34" charset="0"/>
@@ -4881,7 +5334,7 @@
           </a:r>
         </a:p>
         <a:p>
-          <a:pPr marL="514350" lvl="3" indent="-171450" algn="l" defTabSz="800100">
+          <a:pPr marL="342900" lvl="3" indent="-114300" algn="l" defTabSz="666750">
             <a:lnSpc>
               <a:spcPct val="90000"/>
             </a:lnSpc>
@@ -4895,7 +5348,7 @@
             <a:buChar char="§"/>
           </a:pPr>
           <a:r>
-            <a:rPr lang="en-US" sz="1800" kern="1200" dirty="0">
+            <a:rPr lang="en-US" sz="1500" kern="1200" dirty="0">
               <a:latin typeface="Tahoma" panose="020B0604030504040204" pitchFamily="34" charset="0"/>
               <a:ea typeface="Tahoma" panose="020B0604030504040204" pitchFamily="34" charset="0"/>
               <a:cs typeface="Tahoma" panose="020B0604030504040204" pitchFamily="34" charset="0"/>
@@ -4904,7 +5357,7 @@
           </a:r>
         </a:p>
         <a:p>
-          <a:pPr marL="514350" lvl="3" indent="-171450" algn="l" defTabSz="800100">
+          <a:pPr marL="342900" lvl="3" indent="-114300" algn="l" defTabSz="666750">
             <a:lnSpc>
               <a:spcPct val="90000"/>
             </a:lnSpc>
@@ -4918,7 +5371,7 @@
             <a:buChar char="§"/>
           </a:pPr>
           <a:r>
-            <a:rPr lang="en-US" sz="1800" kern="1200" dirty="0">
+            <a:rPr lang="en-US" sz="1500" kern="1200" dirty="0">
               <a:latin typeface="Tahoma" panose="020B0604030504040204" pitchFamily="34" charset="0"/>
               <a:ea typeface="Tahoma" panose="020B0604030504040204" pitchFamily="34" charset="0"/>
               <a:cs typeface="Tahoma" panose="020B0604030504040204" pitchFamily="34" charset="0"/>
@@ -4927,7 +5380,7 @@
           </a:r>
         </a:p>
         <a:p>
-          <a:pPr marL="514350" lvl="3" indent="-171450" algn="l" defTabSz="800100">
+          <a:pPr marL="342900" lvl="3" indent="-114300" algn="l" defTabSz="666750">
             <a:lnSpc>
               <a:spcPct val="90000"/>
             </a:lnSpc>
@@ -4941,7 +5394,7 @@
             <a:buChar char="§"/>
           </a:pPr>
           <a:r>
-            <a:rPr lang="en-US" sz="1800" kern="1200" dirty="0">
+            <a:rPr lang="en-US" sz="1500" kern="1200" dirty="0">
               <a:latin typeface="Tahoma" panose="020B0604030504040204" pitchFamily="34" charset="0"/>
               <a:ea typeface="Tahoma" panose="020B0604030504040204" pitchFamily="34" charset="0"/>
               <a:cs typeface="Tahoma" panose="020B0604030504040204" pitchFamily="34" charset="0"/>
@@ -4950,7 +5403,7 @@
           </a:r>
         </a:p>
         <a:p>
-          <a:pPr marL="514350" lvl="3" indent="-171450" algn="l" defTabSz="800100">
+          <a:pPr marL="342900" lvl="3" indent="-114300" algn="l" defTabSz="666750">
             <a:lnSpc>
               <a:spcPct val="90000"/>
             </a:lnSpc>
@@ -4964,7 +5417,7 @@
             <a:buChar char="§"/>
           </a:pPr>
           <a:r>
-            <a:rPr lang="en-US" sz="1800" kern="1200" dirty="0">
+            <a:rPr lang="en-US" sz="1500" kern="1200" dirty="0">
               <a:latin typeface="Tahoma" panose="020B0604030504040204" pitchFamily="34" charset="0"/>
               <a:ea typeface="Tahoma" panose="020B0604030504040204" pitchFamily="34" charset="0"/>
               <a:cs typeface="Tahoma" panose="020B0604030504040204" pitchFamily="34" charset="0"/>
@@ -4973,7 +5426,7 @@
           </a:r>
         </a:p>
         <a:p>
-          <a:pPr marL="514350" lvl="3" indent="-171450" algn="l" defTabSz="800100">
+          <a:pPr marL="342900" lvl="3" indent="-114300" algn="l" defTabSz="666750">
             <a:lnSpc>
               <a:spcPct val="90000"/>
             </a:lnSpc>
@@ -4987,7 +5440,7 @@
             <a:buChar char="§"/>
           </a:pPr>
           <a:r>
-            <a:rPr lang="en-US" sz="1800" kern="1200" dirty="0">
+            <a:rPr lang="en-US" sz="1500" kern="1200" dirty="0">
               <a:latin typeface="Tahoma" panose="020B0604030504040204" pitchFamily="34" charset="0"/>
               <a:ea typeface="Tahoma" panose="020B0604030504040204" pitchFamily="34" charset="0"/>
               <a:cs typeface="Tahoma" panose="020B0604030504040204" pitchFamily="34" charset="0"/>
@@ -4996,7 +5449,7 @@
           </a:r>
         </a:p>
         <a:p>
-          <a:pPr marL="514350" lvl="3" indent="-171450" algn="l" defTabSz="800100">
+          <a:pPr marL="342900" lvl="3" indent="-114300" algn="l" defTabSz="666750">
             <a:lnSpc>
               <a:spcPct val="90000"/>
             </a:lnSpc>
@@ -5010,7 +5463,7 @@
             <a:buChar char="§"/>
           </a:pPr>
           <a:r>
-            <a:rPr lang="en-US" sz="1800" kern="1200" dirty="0">
+            <a:rPr lang="en-US" sz="1500" kern="1200" dirty="0">
               <a:latin typeface="Tahoma" panose="020B0604030504040204" pitchFamily="34" charset="0"/>
               <a:ea typeface="Tahoma" panose="020B0604030504040204" pitchFamily="34" charset="0"/>
               <a:cs typeface="Tahoma" panose="020B0604030504040204" pitchFamily="34" charset="0"/>
@@ -5019,7 +5472,7 @@
           </a:r>
         </a:p>
         <a:p>
-          <a:pPr marL="171450" lvl="1" indent="-171450" algn="l" defTabSz="800100">
+          <a:pPr marL="342900" lvl="3" indent="-114300" algn="l" defTabSz="666750">
             <a:lnSpc>
               <a:spcPct val="90000"/>
             </a:lnSpc>
@@ -5033,21 +5486,16 @@
             <a:buChar char="§"/>
           </a:pPr>
           <a:r>
-            <a:rPr lang="en-US" sz="1800" kern="1200" dirty="0" err="1">
+            <a:rPr lang="en-US" sz="1500" kern="1200" dirty="0">
               <a:latin typeface="Tahoma" panose="020B0604030504040204" pitchFamily="34" charset="0"/>
               <a:ea typeface="Tahoma" panose="020B0604030504040204" pitchFamily="34" charset="0"/>
               <a:cs typeface="Tahoma" panose="020B0604030504040204" pitchFamily="34" charset="0"/>
             </a:rPr>
-            <a:t>Plotly</a:t>
+            <a:t>K-means Clustering</a:t>
           </a:r>
-          <a:endParaRPr lang="en-US" sz="1800" kern="1200" dirty="0">
-            <a:latin typeface="Tahoma" panose="020B0604030504040204" pitchFamily="34" charset="0"/>
-            <a:ea typeface="Tahoma" panose="020B0604030504040204" pitchFamily="34" charset="0"/>
-            <a:cs typeface="Tahoma" panose="020B0604030504040204" pitchFamily="34" charset="0"/>
-          </a:endParaRPr>
         </a:p>
         <a:p>
-          <a:pPr marL="342900" lvl="2" indent="-171450" algn="l" defTabSz="800100">
+          <a:pPr marL="342900" lvl="3" indent="-114300" algn="l" defTabSz="666750">
             <a:lnSpc>
               <a:spcPct val="90000"/>
             </a:lnSpc>
@@ -5060,14 +5508,88 @@
             <a:buFont typeface="Wingdings" panose="05000000000000000000" pitchFamily="2" charset="2"/>
             <a:buChar char="§"/>
           </a:pPr>
-          <a:endParaRPr lang="en-US" sz="1800" kern="1200" dirty="0">
+          <a:r>
+            <a:rPr lang="en-US" sz="1500" kern="1200" dirty="0">
+              <a:latin typeface="Tahoma" panose="020B0604030504040204" pitchFamily="34" charset="0"/>
+              <a:ea typeface="Tahoma" panose="020B0604030504040204" pitchFamily="34" charset="0"/>
+              <a:cs typeface="Tahoma" panose="020B0604030504040204" pitchFamily="34" charset="0"/>
+            </a:rPr>
+            <a:t>Deep Learning</a:t>
+          </a:r>
+        </a:p>
+        <a:p>
+          <a:pPr marL="114300" lvl="1" indent="-114300" algn="l" defTabSz="666750">
+            <a:lnSpc>
+              <a:spcPct val="90000"/>
+            </a:lnSpc>
+            <a:spcBef>
+              <a:spcPct val="0"/>
+            </a:spcBef>
+            <a:spcAft>
+              <a:spcPct val="15000"/>
+            </a:spcAft>
+            <a:buFont typeface="Wingdings" panose="05000000000000000000" pitchFamily="2" charset="2"/>
+            <a:buChar char="§"/>
+          </a:pPr>
+          <a:r>
+            <a:rPr lang="en-US" sz="1500" kern="1200" dirty="0" err="1">
+              <a:latin typeface="Tahoma" panose="020B0604030504040204" pitchFamily="34" charset="0"/>
+              <a:ea typeface="Tahoma" panose="020B0604030504040204" pitchFamily="34" charset="0"/>
+              <a:cs typeface="Tahoma" panose="020B0604030504040204" pitchFamily="34" charset="0"/>
+            </a:rPr>
+            <a:t>Plotly</a:t>
+          </a:r>
+          <a:endParaRPr lang="en-US" sz="1500" kern="1200" dirty="0">
             <a:latin typeface="Tahoma" panose="020B0604030504040204" pitchFamily="34" charset="0"/>
             <a:ea typeface="Tahoma" panose="020B0604030504040204" pitchFamily="34" charset="0"/>
             <a:cs typeface="Tahoma" panose="020B0604030504040204" pitchFamily="34" charset="0"/>
           </a:endParaRPr>
         </a:p>
         <a:p>
-          <a:pPr marL="342900" lvl="2" indent="-171450" algn="l" defTabSz="800100">
+          <a:pPr marL="114300" lvl="1" indent="-114300" algn="l" defTabSz="666750">
+            <a:lnSpc>
+              <a:spcPct val="90000"/>
+            </a:lnSpc>
+            <a:spcBef>
+              <a:spcPct val="0"/>
+            </a:spcBef>
+            <a:spcAft>
+              <a:spcPct val="15000"/>
+            </a:spcAft>
+            <a:buFont typeface="Wingdings" panose="05000000000000000000" pitchFamily="2" charset="2"/>
+            <a:buChar char="§"/>
+          </a:pPr>
+          <a:r>
+            <a:rPr lang="en-US" sz="1500" kern="1200" dirty="0">
+              <a:latin typeface="Tahoma" panose="020B0604030504040204" pitchFamily="34" charset="0"/>
+              <a:ea typeface="Tahoma" panose="020B0604030504040204" pitchFamily="34" charset="0"/>
+              <a:cs typeface="Tahoma" panose="020B0604030504040204" pitchFamily="34" charset="0"/>
+            </a:rPr>
+            <a:t>Tableau</a:t>
+          </a:r>
+        </a:p>
+        <a:p>
+          <a:pPr marL="228600" lvl="2" indent="-114300" algn="l" defTabSz="666750">
+            <a:lnSpc>
+              <a:spcPct val="90000"/>
+            </a:lnSpc>
+            <a:spcBef>
+              <a:spcPct val="0"/>
+            </a:spcBef>
+            <a:spcAft>
+              <a:spcPct val="15000"/>
+            </a:spcAft>
+            <a:buFont typeface="Wingdings" panose="05000000000000000000" pitchFamily="2" charset="2"/>
+            <a:buChar char="§"/>
+          </a:pPr>
+          <a:endParaRPr lang="en-US" sz="1500" kern="1200" dirty="0">
+            <a:latin typeface="Tahoma" panose="020B0604030504040204" pitchFamily="34" charset="0"/>
+            <a:ea typeface="Tahoma" panose="020B0604030504040204" pitchFamily="34" charset="0"/>
+            <a:cs typeface="Tahoma" panose="020B0604030504040204" pitchFamily="34" charset="0"/>
+          </a:endParaRPr>
+        </a:p>
+        <a:p>
+          <a:pPr marL="228600" lvl="2" indent="-114300" algn="l" defTabSz="666750">
             <a:lnSpc>
               <a:spcPct val="90000"/>
             </a:lnSpc>
@@ -5080,14 +5602,14 @@
             <a:buFont typeface="Wingdings" panose="05000000000000000000" pitchFamily="2" charset="2"/>
             <a:buChar char=""/>
           </a:pPr>
-          <a:endParaRPr lang="en-US" sz="1800" kern="1200" dirty="0">
+          <a:endParaRPr lang="en-US" sz="1500" kern="1200" dirty="0">
             <a:latin typeface="Tahoma" panose="020B0604030504040204" pitchFamily="34" charset="0"/>
             <a:ea typeface="Tahoma" panose="020B0604030504040204" pitchFamily="34" charset="0"/>
             <a:cs typeface="Tahoma" panose="020B0604030504040204" pitchFamily="34" charset="0"/>
           </a:endParaRPr>
         </a:p>
         <a:p>
-          <a:pPr marL="171450" lvl="1" indent="-171450" algn="l" defTabSz="800100">
+          <a:pPr marL="114300" lvl="1" indent="-114300" algn="l" defTabSz="666750">
             <a:lnSpc>
               <a:spcPct val="90000"/>
             </a:lnSpc>
@@ -5100,7 +5622,7 @@
             <a:buFont typeface="Wingdings" panose="05000000000000000000" pitchFamily="2" charset="2"/>
             <a:buNone/>
           </a:pPr>
-          <a:endParaRPr lang="en-US" sz="1800" kern="1200" dirty="0">
+          <a:endParaRPr lang="en-US" sz="1500" kern="1200" dirty="0">
             <a:latin typeface="Tahoma" panose="020B0604030504040204" pitchFamily="34" charset="0"/>
             <a:ea typeface="Tahoma" panose="020B0604030504040204" pitchFamily="34" charset="0"/>
             <a:cs typeface="Tahoma" panose="020B0604030504040204" pitchFamily="34" charset="0"/>
@@ -5108,8 +5630,8 @@
         </a:p>
       </dsp:txBody>
       <dsp:txXfrm>
-        <a:off x="7863539" y="725859"/>
-        <a:ext cx="3447370" cy="3693397"/>
+        <a:off x="7863539" y="568077"/>
+        <a:ext cx="3447370" cy="3788100"/>
       </dsp:txXfrm>
     </dsp:sp>
   </dsp:spTree>
@@ -8229,7 +8751,7 @@
           <a:noFill/>
           <a:extLst>
             <a:ext uri="{909E8E84-426E-40dd-AFC4-6F175D3DCCD1}">
-              <a14:hiddenFill xmlns="" xmlns:a14="http://schemas.microsoft.com/office/drawing/2010/main">
+              <a14:hiddenFill xmlns:a14="http://schemas.microsoft.com/office/drawing/2010/main" xmlns="">
                 <a:solidFill>
                   <a:srgbClr val="FFFFFF"/>
                 </a:solidFill>
@@ -8288,7 +8810,7 @@
             </a:ln>
             <a:extLst>
               <a:ext uri="{91240B29-F687-4f45-9708-019B960494DF}">
-                <a14:hiddenLine xmlns="" xmlns:a14="http://schemas.microsoft.com/office/drawing/2010/main" w="9525">
+                <a14:hiddenLine xmlns:a14="http://schemas.microsoft.com/office/drawing/2010/main" xmlns="" w="9525">
                   <a:solidFill>
                     <a:srgbClr val="000000"/>
                   </a:solidFill>
@@ -8378,7 +8900,7 @@
             </a:ln>
             <a:extLst>
               <a:ext uri="{91240B29-F687-4f45-9708-019B960494DF}">
-                <a14:hiddenLine xmlns="" xmlns:a14="http://schemas.microsoft.com/office/drawing/2010/main" w="9525">
+                <a14:hiddenLine xmlns:a14="http://schemas.microsoft.com/office/drawing/2010/main" xmlns="" w="9525">
                   <a:solidFill>
                     <a:srgbClr val="000000"/>
                   </a:solidFill>
@@ -8468,7 +8990,7 @@
             </a:ln>
             <a:extLst>
               <a:ext uri="{91240B29-F687-4f45-9708-019B960494DF}">
-                <a14:hiddenLine xmlns="" xmlns:a14="http://schemas.microsoft.com/office/drawing/2010/main" w="9525">
+                <a14:hiddenLine xmlns:a14="http://schemas.microsoft.com/office/drawing/2010/main" xmlns="" w="9525">
                   <a:solidFill>
                     <a:srgbClr val="000000"/>
                   </a:solidFill>
@@ -8502,7 +9024,7 @@
             </a:ln>
             <a:extLst>
               <a:ext uri="{91240B29-F687-4f45-9708-019B960494DF}">
-                <a14:hiddenLine xmlns="" xmlns:a14="http://schemas.microsoft.com/office/drawing/2010/main" w="9525">
+                <a14:hiddenLine xmlns:a14="http://schemas.microsoft.com/office/drawing/2010/main" xmlns="" w="9525">
                   <a:solidFill>
                     <a:srgbClr val="000000"/>
                   </a:solidFill>
@@ -8592,7 +9114,7 @@
             </a:ln>
             <a:extLst>
               <a:ext uri="{91240B29-F687-4f45-9708-019B960494DF}">
-                <a14:hiddenLine xmlns="" xmlns:a14="http://schemas.microsoft.com/office/drawing/2010/main" w="9525">
+                <a14:hiddenLine xmlns:a14="http://schemas.microsoft.com/office/drawing/2010/main" xmlns="" w="9525">
                   <a:solidFill>
                     <a:srgbClr val="000000"/>
                   </a:solidFill>
@@ -8654,7 +9176,7 @@
             </a:ln>
             <a:extLst>
               <a:ext uri="{91240B29-F687-4f45-9708-019B960494DF}">
-                <a14:hiddenLine xmlns="" xmlns:a14="http://schemas.microsoft.com/office/drawing/2010/main" w="9525">
+                <a14:hiddenLine xmlns:a14="http://schemas.microsoft.com/office/drawing/2010/main" xmlns="" w="9525">
                   <a:solidFill>
                     <a:srgbClr val="000000"/>
                   </a:solidFill>
@@ -8716,7 +9238,7 @@
             </a:ln>
             <a:extLst>
               <a:ext uri="{91240B29-F687-4f45-9708-019B960494DF}">
-                <a14:hiddenLine xmlns="" xmlns:a14="http://schemas.microsoft.com/office/drawing/2010/main" w="9525">
+                <a14:hiddenLine xmlns:a14="http://schemas.microsoft.com/office/drawing/2010/main" xmlns="" w="9525">
                   <a:solidFill>
                     <a:srgbClr val="000000"/>
                   </a:solidFill>
@@ -8806,7 +9328,7 @@
             </a:ln>
             <a:extLst>
               <a:ext uri="{91240B29-F687-4f45-9708-019B960494DF}">
-                <a14:hiddenLine xmlns="" xmlns:a14="http://schemas.microsoft.com/office/drawing/2010/main" w="9525">
+                <a14:hiddenLine xmlns:a14="http://schemas.microsoft.com/office/drawing/2010/main" xmlns="" w="9525">
                   <a:solidFill>
                     <a:srgbClr val="000000"/>
                   </a:solidFill>
@@ -8868,7 +9390,7 @@
             </a:ln>
             <a:extLst>
               <a:ext uri="{91240B29-F687-4f45-9708-019B960494DF}">
-                <a14:hiddenLine xmlns="" xmlns:a14="http://schemas.microsoft.com/office/drawing/2010/main" w="9525">
+                <a14:hiddenLine xmlns:a14="http://schemas.microsoft.com/office/drawing/2010/main" xmlns="" w="9525">
                   <a:solidFill>
                     <a:srgbClr val="000000"/>
                   </a:solidFill>
@@ -8930,7 +9452,7 @@
             </a:ln>
             <a:extLst>
               <a:ext uri="{91240B29-F687-4f45-9708-019B960494DF}">
-                <a14:hiddenLine xmlns="" xmlns:a14="http://schemas.microsoft.com/office/drawing/2010/main" w="9525">
+                <a14:hiddenLine xmlns:a14="http://schemas.microsoft.com/office/drawing/2010/main" xmlns="" w="9525">
                   <a:solidFill>
                     <a:srgbClr val="000000"/>
                   </a:solidFill>
@@ -9020,7 +9542,7 @@
             </a:ln>
             <a:extLst>
               <a:ext uri="{91240B29-F687-4f45-9708-019B960494DF}">
-                <a14:hiddenLine xmlns="" xmlns:a14="http://schemas.microsoft.com/office/drawing/2010/main" w="9525">
+                <a14:hiddenLine xmlns:a14="http://schemas.microsoft.com/office/drawing/2010/main" xmlns="" w="9525">
                   <a:solidFill>
                     <a:srgbClr val="000000"/>
                   </a:solidFill>
@@ -9110,7 +9632,7 @@
             </a:ln>
             <a:extLst>
               <a:ext uri="{91240B29-F687-4f45-9708-019B960494DF}">
-                <a14:hiddenLine xmlns="" xmlns:a14="http://schemas.microsoft.com/office/drawing/2010/main" w="9525">
+                <a14:hiddenLine xmlns:a14="http://schemas.microsoft.com/office/drawing/2010/main" xmlns="" w="9525">
                   <a:solidFill>
                     <a:srgbClr val="000000"/>
                   </a:solidFill>
@@ -9172,7 +9694,7 @@
             </a:ln>
             <a:extLst>
               <a:ext uri="{91240B29-F687-4f45-9708-019B960494DF}">
-                <a14:hiddenLine xmlns="" xmlns:a14="http://schemas.microsoft.com/office/drawing/2010/main" w="9525">
+                <a14:hiddenLine xmlns:a14="http://schemas.microsoft.com/office/drawing/2010/main" xmlns="" w="9525">
                   <a:solidFill>
                     <a:srgbClr val="000000"/>
                   </a:solidFill>
@@ -9282,7 +9804,7 @@
             </a:ln>
             <a:extLst>
               <a:ext uri="{91240B29-F687-4f45-9708-019B960494DF}">
-                <a14:hiddenLine xmlns="" xmlns:a14="http://schemas.microsoft.com/office/drawing/2010/main" w="9525">
+                <a14:hiddenLine xmlns:a14="http://schemas.microsoft.com/office/drawing/2010/main" xmlns="" w="9525">
                   <a:solidFill>
                     <a:srgbClr val="000000"/>
                   </a:solidFill>
@@ -9344,7 +9866,7 @@
             </a:ln>
             <a:extLst>
               <a:ext uri="{91240B29-F687-4f45-9708-019B960494DF}">
-                <a14:hiddenLine xmlns="" xmlns:a14="http://schemas.microsoft.com/office/drawing/2010/main" w="9525">
+                <a14:hiddenLine xmlns:a14="http://schemas.microsoft.com/office/drawing/2010/main" xmlns="" w="9525">
                   <a:solidFill>
                     <a:srgbClr val="000000"/>
                   </a:solidFill>
@@ -9434,7 +9956,7 @@
             </a:ln>
             <a:extLst>
               <a:ext uri="{91240B29-F687-4f45-9708-019B960494DF}">
-                <a14:hiddenLine xmlns="" xmlns:a14="http://schemas.microsoft.com/office/drawing/2010/main" w="9525">
+                <a14:hiddenLine xmlns:a14="http://schemas.microsoft.com/office/drawing/2010/main" xmlns="" w="9525">
                   <a:solidFill>
                     <a:srgbClr val="000000"/>
                   </a:solidFill>
@@ -9524,7 +10046,7 @@
             </a:ln>
             <a:extLst>
               <a:ext uri="{91240B29-F687-4f45-9708-019B960494DF}">
-                <a14:hiddenLine xmlns="" xmlns:a14="http://schemas.microsoft.com/office/drawing/2010/main" w="9525">
+                <a14:hiddenLine xmlns:a14="http://schemas.microsoft.com/office/drawing/2010/main" xmlns="" w="9525">
                   <a:solidFill>
                     <a:srgbClr val="000000"/>
                   </a:solidFill>
@@ -9586,7 +10108,7 @@
             </a:ln>
             <a:extLst>
               <a:ext uri="{91240B29-F687-4f45-9708-019B960494DF}">
-                <a14:hiddenLine xmlns="" xmlns:a14="http://schemas.microsoft.com/office/drawing/2010/main" w="9525">
+                <a14:hiddenLine xmlns:a14="http://schemas.microsoft.com/office/drawing/2010/main" xmlns="" w="9525">
                   <a:solidFill>
                     <a:srgbClr val="000000"/>
                   </a:solidFill>
@@ -9676,7 +10198,7 @@
             </a:ln>
             <a:extLst>
               <a:ext uri="{91240B29-F687-4f45-9708-019B960494DF}">
-                <a14:hiddenLine xmlns="" xmlns:a14="http://schemas.microsoft.com/office/drawing/2010/main" w="9525">
+                <a14:hiddenLine xmlns:a14="http://schemas.microsoft.com/office/drawing/2010/main" xmlns="" w="9525">
                   <a:solidFill>
                     <a:srgbClr val="000000"/>
                   </a:solidFill>
@@ -9766,7 +10288,7 @@
             </a:ln>
             <a:extLst>
               <a:ext uri="{91240B29-F687-4f45-9708-019B960494DF}">
-                <a14:hiddenLine xmlns="" xmlns:a14="http://schemas.microsoft.com/office/drawing/2010/main" w="9525">
+                <a14:hiddenLine xmlns:a14="http://schemas.microsoft.com/office/drawing/2010/main" xmlns="" w="9525">
                   <a:solidFill>
                     <a:srgbClr val="000000"/>
                   </a:solidFill>
@@ -9822,7 +10344,7 @@
             </a:ln>
             <a:extLst>
               <a:ext uri="{91240B29-F687-4f45-9708-019B960494DF}">
-                <a14:hiddenLine xmlns="" xmlns:a14="http://schemas.microsoft.com/office/drawing/2010/main" w="9525">
+                <a14:hiddenLine xmlns:a14="http://schemas.microsoft.com/office/drawing/2010/main" xmlns="" w="9525">
                   <a:solidFill>
                     <a:srgbClr val="000000"/>
                   </a:solidFill>
@@ -9912,7 +10434,7 @@
             </a:ln>
             <a:extLst>
               <a:ext uri="{91240B29-F687-4f45-9708-019B960494DF}">
-                <a14:hiddenLine xmlns="" xmlns:a14="http://schemas.microsoft.com/office/drawing/2010/main" w="9525">
+                <a14:hiddenLine xmlns:a14="http://schemas.microsoft.com/office/drawing/2010/main" xmlns="" w="9525">
                   <a:solidFill>
                     <a:srgbClr val="000000"/>
                   </a:solidFill>
@@ -9968,7 +10490,7 @@
             </a:ln>
             <a:extLst>
               <a:ext uri="{91240B29-F687-4f45-9708-019B960494DF}">
-                <a14:hiddenLine xmlns="" xmlns:a14="http://schemas.microsoft.com/office/drawing/2010/main" w="9525">
+                <a14:hiddenLine xmlns:a14="http://schemas.microsoft.com/office/drawing/2010/main" xmlns="" w="9525">
                   <a:solidFill>
                     <a:srgbClr val="000000"/>
                   </a:solidFill>
@@ -10058,7 +10580,7 @@
             </a:ln>
             <a:extLst>
               <a:ext uri="{91240B29-F687-4f45-9708-019B960494DF}">
-                <a14:hiddenLine xmlns="" xmlns:a14="http://schemas.microsoft.com/office/drawing/2010/main" w="9525">
+                <a14:hiddenLine xmlns:a14="http://schemas.microsoft.com/office/drawing/2010/main" xmlns="" w="9525">
                   <a:solidFill>
                     <a:srgbClr val="000000"/>
                   </a:solidFill>
@@ -10126,7 +10648,7 @@
             </a:ln>
             <a:extLst>
               <a:ext uri="{91240B29-F687-4f45-9708-019B960494DF}">
-                <a14:hiddenLine xmlns="" xmlns:a14="http://schemas.microsoft.com/office/drawing/2010/main" w="9525">
+                <a14:hiddenLine xmlns:a14="http://schemas.microsoft.com/office/drawing/2010/main" xmlns="" w="9525">
                   <a:solidFill>
                     <a:srgbClr val="000000"/>
                   </a:solidFill>
@@ -10216,7 +10738,7 @@
             </a:ln>
             <a:extLst>
               <a:ext uri="{91240B29-F687-4f45-9708-019B960494DF}">
-                <a14:hiddenLine xmlns="" xmlns:a14="http://schemas.microsoft.com/office/drawing/2010/main" w="9525">
+                <a14:hiddenLine xmlns:a14="http://schemas.microsoft.com/office/drawing/2010/main" xmlns="" w="9525">
                   <a:solidFill>
                     <a:srgbClr val="000000"/>
                   </a:solidFill>
@@ -10284,7 +10806,7 @@
             </a:ln>
             <a:extLst>
               <a:ext uri="{91240B29-F687-4f45-9708-019B960494DF}">
-                <a14:hiddenLine xmlns="" xmlns:a14="http://schemas.microsoft.com/office/drawing/2010/main" w="9525">
+                <a14:hiddenLine xmlns:a14="http://schemas.microsoft.com/office/drawing/2010/main" xmlns="" w="9525">
                   <a:solidFill>
                     <a:srgbClr val="000000"/>
                   </a:solidFill>
@@ -10374,7 +10896,7 @@
             </a:ln>
             <a:extLst>
               <a:ext uri="{91240B29-F687-4f45-9708-019B960494DF}">
-                <a14:hiddenLine xmlns="" xmlns:a14="http://schemas.microsoft.com/office/drawing/2010/main" w="9525">
+                <a14:hiddenLine xmlns:a14="http://schemas.microsoft.com/office/drawing/2010/main" xmlns="" w="9525">
                   <a:solidFill>
                     <a:srgbClr val="000000"/>
                   </a:solidFill>
@@ -10408,7 +10930,7 @@
             </a:ln>
             <a:extLst>
               <a:ext uri="{91240B29-F687-4f45-9708-019B960494DF}">
-                <a14:hiddenLine xmlns="" xmlns:a14="http://schemas.microsoft.com/office/drawing/2010/main" w="9525">
+                <a14:hiddenLine xmlns:a14="http://schemas.microsoft.com/office/drawing/2010/main" xmlns="" w="9525">
                   <a:solidFill>
                     <a:srgbClr val="000000"/>
                   </a:solidFill>
@@ -10498,7 +11020,7 @@
             </a:ln>
             <a:extLst>
               <a:ext uri="{91240B29-F687-4f45-9708-019B960494DF}">
-                <a14:hiddenLine xmlns="" xmlns:a14="http://schemas.microsoft.com/office/drawing/2010/main" w="9525">
+                <a14:hiddenLine xmlns:a14="http://schemas.microsoft.com/office/drawing/2010/main" xmlns="" w="9525">
                   <a:solidFill>
                     <a:srgbClr val="000000"/>
                   </a:solidFill>
@@ -10560,7 +11082,7 @@
             </a:ln>
             <a:extLst>
               <a:ext uri="{91240B29-F687-4f45-9708-019B960494DF}">
-                <a14:hiddenLine xmlns="" xmlns:a14="http://schemas.microsoft.com/office/drawing/2010/main" w="9525">
+                <a14:hiddenLine xmlns:a14="http://schemas.microsoft.com/office/drawing/2010/main" xmlns="" w="9525">
                   <a:solidFill>
                     <a:srgbClr val="000000"/>
                   </a:solidFill>
@@ -10622,7 +11144,7 @@
             </a:ln>
             <a:extLst>
               <a:ext uri="{91240B29-F687-4f45-9708-019B960494DF}">
-                <a14:hiddenLine xmlns="" xmlns:a14="http://schemas.microsoft.com/office/drawing/2010/main" w="9525">
+                <a14:hiddenLine xmlns:a14="http://schemas.microsoft.com/office/drawing/2010/main" xmlns="" w="9525">
                   <a:solidFill>
                     <a:srgbClr val="000000"/>
                   </a:solidFill>
@@ -10712,7 +11234,7 @@
             </a:ln>
             <a:extLst>
               <a:ext uri="{91240B29-F687-4f45-9708-019B960494DF}">
-                <a14:hiddenLine xmlns="" xmlns:a14="http://schemas.microsoft.com/office/drawing/2010/main" w="9525">
+                <a14:hiddenLine xmlns:a14="http://schemas.microsoft.com/office/drawing/2010/main" xmlns="" w="9525">
                   <a:solidFill>
                     <a:srgbClr val="000000"/>
                   </a:solidFill>
@@ -10780,7 +11302,7 @@
             </a:ln>
             <a:extLst>
               <a:ext uri="{91240B29-F687-4f45-9708-019B960494DF}">
-                <a14:hiddenLine xmlns="" xmlns:a14="http://schemas.microsoft.com/office/drawing/2010/main" w="9525">
+                <a14:hiddenLine xmlns:a14="http://schemas.microsoft.com/office/drawing/2010/main" xmlns="" w="9525">
                   <a:solidFill>
                     <a:srgbClr val="000000"/>
                   </a:solidFill>
@@ -10842,7 +11364,7 @@
             </a:ln>
             <a:extLst>
               <a:ext uri="{91240B29-F687-4f45-9708-019B960494DF}">
-                <a14:hiddenLine xmlns="" xmlns:a14="http://schemas.microsoft.com/office/drawing/2010/main" w="9525">
+                <a14:hiddenLine xmlns:a14="http://schemas.microsoft.com/office/drawing/2010/main" xmlns="" w="9525">
                   <a:solidFill>
                     <a:srgbClr val="000000"/>
                   </a:solidFill>
@@ -10932,7 +11454,7 @@
             </a:ln>
             <a:extLst>
               <a:ext uri="{91240B29-F687-4f45-9708-019B960494DF}">
-                <a14:hiddenLine xmlns="" xmlns:a14="http://schemas.microsoft.com/office/drawing/2010/main" w="9525">
+                <a14:hiddenLine xmlns:a14="http://schemas.microsoft.com/office/drawing/2010/main" xmlns="" w="9525">
                   <a:solidFill>
                     <a:srgbClr val="000000"/>
                   </a:solidFill>
@@ -10994,7 +11516,7 @@
             </a:ln>
             <a:extLst>
               <a:ext uri="{91240B29-F687-4f45-9708-019B960494DF}">
-                <a14:hiddenLine xmlns="" xmlns:a14="http://schemas.microsoft.com/office/drawing/2010/main" w="9525">
+                <a14:hiddenLine xmlns:a14="http://schemas.microsoft.com/office/drawing/2010/main" xmlns="" w="9525">
                   <a:solidFill>
                     <a:srgbClr val="000000"/>
                   </a:solidFill>
@@ -11084,7 +11606,7 @@
             </a:ln>
             <a:extLst>
               <a:ext uri="{91240B29-F687-4f45-9708-019B960494DF}">
-                <a14:hiddenLine xmlns="" xmlns:a14="http://schemas.microsoft.com/office/drawing/2010/main" w="9525">
+                <a14:hiddenLine xmlns:a14="http://schemas.microsoft.com/office/drawing/2010/main" xmlns="" w="9525">
                   <a:solidFill>
                     <a:srgbClr val="000000"/>
                   </a:solidFill>
@@ -11146,7 +11668,7 @@
             </a:ln>
             <a:extLst>
               <a:ext uri="{91240B29-F687-4f45-9708-019B960494DF}">
-                <a14:hiddenLine xmlns="" xmlns:a14="http://schemas.microsoft.com/office/drawing/2010/main" w="9525">
+                <a14:hiddenLine xmlns:a14="http://schemas.microsoft.com/office/drawing/2010/main" xmlns="" w="9525">
                   <a:solidFill>
                     <a:srgbClr val="000000"/>
                   </a:solidFill>
@@ -11236,7 +11758,7 @@
             </a:ln>
             <a:extLst>
               <a:ext uri="{91240B29-F687-4f45-9708-019B960494DF}">
-                <a14:hiddenLine xmlns="" xmlns:a14="http://schemas.microsoft.com/office/drawing/2010/main" w="9525">
+                <a14:hiddenLine xmlns:a14="http://schemas.microsoft.com/office/drawing/2010/main" xmlns="" w="9525">
                   <a:solidFill>
                     <a:srgbClr val="000000"/>
                   </a:solidFill>
@@ -11270,7 +11792,7 @@
             </a:ln>
             <a:extLst>
               <a:ext uri="{91240B29-F687-4f45-9708-019B960494DF}">
-                <a14:hiddenLine xmlns="" xmlns:a14="http://schemas.microsoft.com/office/drawing/2010/main" w="9525">
+                <a14:hiddenLine xmlns:a14="http://schemas.microsoft.com/office/drawing/2010/main" xmlns="" w="9525">
                   <a:solidFill>
                     <a:srgbClr val="000000"/>
                   </a:solidFill>
@@ -11335,7 +11857,7 @@
             </a:ln>
             <a:extLst>
               <a:ext uri="{91240B29-F687-4f45-9708-019B960494DF}">
-                <a14:hiddenLine xmlns="" xmlns:a14="http://schemas.microsoft.com/office/drawing/2010/main" w="9525">
+                <a14:hiddenLine xmlns:a14="http://schemas.microsoft.com/office/drawing/2010/main" xmlns="" w="9525">
                   <a:solidFill>
                     <a:srgbClr val="000000"/>
                   </a:solidFill>
@@ -11425,7 +11947,7 @@
             </a:ln>
             <a:extLst>
               <a:ext uri="{91240B29-F687-4f45-9708-019B960494DF}">
-                <a14:hiddenLine xmlns="" xmlns:a14="http://schemas.microsoft.com/office/drawing/2010/main" w="9525">
+                <a14:hiddenLine xmlns:a14="http://schemas.microsoft.com/office/drawing/2010/main" xmlns="" w="9525">
                   <a:solidFill>
                     <a:srgbClr val="000000"/>
                   </a:solidFill>
@@ -11487,7 +12009,7 @@
             </a:ln>
             <a:extLst>
               <a:ext uri="{91240B29-F687-4f45-9708-019B960494DF}">
-                <a14:hiddenLine xmlns="" xmlns:a14="http://schemas.microsoft.com/office/drawing/2010/main" w="9525">
+                <a14:hiddenLine xmlns:a14="http://schemas.microsoft.com/office/drawing/2010/main" xmlns="" w="9525">
                   <a:solidFill>
                     <a:srgbClr val="000000"/>
                   </a:solidFill>
@@ -11577,7 +12099,7 @@
             </a:ln>
             <a:extLst>
               <a:ext uri="{91240B29-F687-4f45-9708-019B960494DF}">
-                <a14:hiddenLine xmlns="" xmlns:a14="http://schemas.microsoft.com/office/drawing/2010/main" w="9525">
+                <a14:hiddenLine xmlns:a14="http://schemas.microsoft.com/office/drawing/2010/main" xmlns="" w="9525">
                   <a:solidFill>
                     <a:srgbClr val="000000"/>
                   </a:solidFill>
@@ -11667,7 +12189,7 @@
             </a:ln>
             <a:extLst>
               <a:ext uri="{91240B29-F687-4f45-9708-019B960494DF}">
-                <a14:hiddenLine xmlns="" xmlns:a14="http://schemas.microsoft.com/office/drawing/2010/main" w="9525">
+                <a14:hiddenLine xmlns:a14="http://schemas.microsoft.com/office/drawing/2010/main" xmlns="" w="9525">
                   <a:solidFill>
                     <a:srgbClr val="000000"/>
                   </a:solidFill>
@@ -11732,7 +12254,7 @@
             </a:ln>
             <a:extLst>
               <a:ext uri="{91240B29-F687-4f45-9708-019B960494DF}">
-                <a14:hiddenLine xmlns="" xmlns:a14="http://schemas.microsoft.com/office/drawing/2010/main" w="9525">
+                <a14:hiddenLine xmlns:a14="http://schemas.microsoft.com/office/drawing/2010/main" xmlns="" w="9525">
                   <a:solidFill>
                     <a:srgbClr val="000000"/>
                   </a:solidFill>
@@ -11794,7 +12316,7 @@
             </a:ln>
             <a:extLst>
               <a:ext uri="{91240B29-F687-4f45-9708-019B960494DF}">
-                <a14:hiddenLine xmlns="" xmlns:a14="http://schemas.microsoft.com/office/drawing/2010/main" w="9525">
+                <a14:hiddenLine xmlns:a14="http://schemas.microsoft.com/office/drawing/2010/main" xmlns="" w="9525">
                   <a:solidFill>
                     <a:srgbClr val="000000"/>
                   </a:solidFill>
@@ -11884,7 +12406,7 @@
             </a:ln>
             <a:extLst>
               <a:ext uri="{91240B29-F687-4f45-9708-019B960494DF}">
-                <a14:hiddenLine xmlns="" xmlns:a14="http://schemas.microsoft.com/office/drawing/2010/main" w="9525">
+                <a14:hiddenLine xmlns:a14="http://schemas.microsoft.com/office/drawing/2010/main" xmlns="" w="9525">
                   <a:solidFill>
                     <a:srgbClr val="000000"/>
                   </a:solidFill>
@@ -11974,7 +12496,7 @@
             </a:ln>
             <a:extLst>
               <a:ext uri="{91240B29-F687-4f45-9708-019B960494DF}">
-                <a14:hiddenLine xmlns="" xmlns:a14="http://schemas.microsoft.com/office/drawing/2010/main" w="9525">
+                <a14:hiddenLine xmlns:a14="http://schemas.microsoft.com/office/drawing/2010/main" xmlns="" w="9525">
                   <a:solidFill>
                     <a:srgbClr val="000000"/>
                   </a:solidFill>
@@ -12036,7 +12558,7 @@
             </a:ln>
             <a:extLst>
               <a:ext uri="{91240B29-F687-4f45-9708-019B960494DF}">
-                <a14:hiddenLine xmlns="" xmlns:a14="http://schemas.microsoft.com/office/drawing/2010/main" w="9525">
+                <a14:hiddenLine xmlns:a14="http://schemas.microsoft.com/office/drawing/2010/main" xmlns="" w="9525">
                   <a:solidFill>
                     <a:srgbClr val="000000"/>
                   </a:solidFill>
@@ -12156,7 +12678,7 @@
             </a:ln>
             <a:extLst>
               <a:ext uri="{91240B29-F687-4f45-9708-019B960494DF}">
-                <a14:hiddenLine xmlns="" xmlns:a14="http://schemas.microsoft.com/office/drawing/2010/main" w="9525">
+                <a14:hiddenLine xmlns:a14="http://schemas.microsoft.com/office/drawing/2010/main" xmlns="" w="9525">
                   <a:solidFill>
                     <a:srgbClr val="000000"/>
                   </a:solidFill>
@@ -12224,7 +12746,7 @@
             </a:ln>
             <a:extLst>
               <a:ext uri="{91240B29-F687-4f45-9708-019B960494DF}">
-                <a14:hiddenLine xmlns="" xmlns:a14="http://schemas.microsoft.com/office/drawing/2010/main" w="9525">
+                <a14:hiddenLine xmlns:a14="http://schemas.microsoft.com/office/drawing/2010/main" xmlns="" w="9525">
                   <a:solidFill>
                     <a:srgbClr val="000000"/>
                   </a:solidFill>
@@ -12314,7 +12836,7 @@
             </a:ln>
             <a:extLst>
               <a:ext uri="{91240B29-F687-4f45-9708-019B960494DF}">
-                <a14:hiddenLine xmlns="" xmlns:a14="http://schemas.microsoft.com/office/drawing/2010/main" w="9525">
+                <a14:hiddenLine xmlns:a14="http://schemas.microsoft.com/office/drawing/2010/main" xmlns="" w="9525">
                   <a:solidFill>
                     <a:srgbClr val="000000"/>
                   </a:solidFill>
@@ -17128,7 +17650,7 @@
           <a:noFill/>
           <a:extLst>
             <a:ext uri="{909E8E84-426E-40dd-AFC4-6F175D3DCCD1}">
-              <a14:hiddenFill xmlns="" xmlns:a14="http://schemas.microsoft.com/office/drawing/2010/main">
+              <a14:hiddenFill xmlns:a14="http://schemas.microsoft.com/office/drawing/2010/main" xmlns="">
                 <a:solidFill>
                   <a:srgbClr val="FFFFFF"/>
                 </a:solidFill>
@@ -17202,7 +17724,7 @@
               </a:ln>
               <a:extLst>
                 <a:ext uri="{91240B29-F687-4f45-9708-019B960494DF}">
-                  <a14:hiddenLine xmlns="" xmlns:a14="http://schemas.microsoft.com/office/drawing/2010/main" w="9525">
+                  <a14:hiddenLine xmlns:a14="http://schemas.microsoft.com/office/drawing/2010/main" xmlns="" w="9525">
                     <a:solidFill>
                       <a:srgbClr val="000000"/>
                     </a:solidFill>
@@ -17292,7 +17814,7 @@
               </a:ln>
               <a:extLst>
                 <a:ext uri="{91240B29-F687-4f45-9708-019B960494DF}">
-                  <a14:hiddenLine xmlns="" xmlns:a14="http://schemas.microsoft.com/office/drawing/2010/main" w="9525">
+                  <a14:hiddenLine xmlns:a14="http://schemas.microsoft.com/office/drawing/2010/main" xmlns="" w="9525">
                     <a:solidFill>
                       <a:srgbClr val="000000"/>
                     </a:solidFill>
@@ -17382,7 +17904,7 @@
               </a:ln>
               <a:extLst>
                 <a:ext uri="{91240B29-F687-4f45-9708-019B960494DF}">
-                  <a14:hiddenLine xmlns="" xmlns:a14="http://schemas.microsoft.com/office/drawing/2010/main" w="9525">
+                  <a14:hiddenLine xmlns:a14="http://schemas.microsoft.com/office/drawing/2010/main" xmlns="" w="9525">
                     <a:solidFill>
                       <a:srgbClr val="000000"/>
                     </a:solidFill>
@@ -17444,7 +17966,7 @@
               </a:ln>
               <a:extLst>
                 <a:ext uri="{91240B29-F687-4f45-9708-019B960494DF}">
-                  <a14:hiddenLine xmlns="" xmlns:a14="http://schemas.microsoft.com/office/drawing/2010/main" w="9525">
+                  <a14:hiddenLine xmlns:a14="http://schemas.microsoft.com/office/drawing/2010/main" xmlns="" w="9525">
                     <a:solidFill>
                       <a:srgbClr val="000000"/>
                     </a:solidFill>
@@ -17534,7 +18056,7 @@
               </a:ln>
               <a:extLst>
                 <a:ext uri="{91240B29-F687-4f45-9708-019B960494DF}">
-                  <a14:hiddenLine xmlns="" xmlns:a14="http://schemas.microsoft.com/office/drawing/2010/main" w="9525">
+                  <a14:hiddenLine xmlns:a14="http://schemas.microsoft.com/office/drawing/2010/main" xmlns="" w="9525">
                     <a:solidFill>
                       <a:srgbClr val="000000"/>
                     </a:solidFill>
@@ -17596,7 +18118,7 @@
               </a:ln>
               <a:extLst>
                 <a:ext uri="{91240B29-F687-4f45-9708-019B960494DF}">
-                  <a14:hiddenLine xmlns="" xmlns:a14="http://schemas.microsoft.com/office/drawing/2010/main" w="9525">
+                  <a14:hiddenLine xmlns:a14="http://schemas.microsoft.com/office/drawing/2010/main" xmlns="" w="9525">
                     <a:solidFill>
                       <a:srgbClr val="000000"/>
                     </a:solidFill>
@@ -17658,7 +18180,7 @@
               </a:ln>
               <a:extLst>
                 <a:ext uri="{91240B29-F687-4f45-9708-019B960494DF}">
-                  <a14:hiddenLine xmlns="" xmlns:a14="http://schemas.microsoft.com/office/drawing/2010/main" w="9525">
+                  <a14:hiddenLine xmlns:a14="http://schemas.microsoft.com/office/drawing/2010/main" xmlns="" w="9525">
                     <a:solidFill>
                       <a:srgbClr val="000000"/>
                     </a:solidFill>
@@ -17748,7 +18270,7 @@
               </a:ln>
               <a:extLst>
                 <a:ext uri="{91240B29-F687-4f45-9708-019B960494DF}">
-                  <a14:hiddenLine xmlns="" xmlns:a14="http://schemas.microsoft.com/office/drawing/2010/main" w="9525">
+                  <a14:hiddenLine xmlns:a14="http://schemas.microsoft.com/office/drawing/2010/main" xmlns="" w="9525">
                     <a:solidFill>
                       <a:srgbClr val="000000"/>
                     </a:solidFill>
@@ -17838,7 +18360,7 @@
               </a:ln>
               <a:extLst>
                 <a:ext uri="{91240B29-F687-4f45-9708-019B960494DF}">
-                  <a14:hiddenLine xmlns="" xmlns:a14="http://schemas.microsoft.com/office/drawing/2010/main" w="9525">
+                  <a14:hiddenLine xmlns:a14="http://schemas.microsoft.com/office/drawing/2010/main" xmlns="" w="9525">
                     <a:solidFill>
                       <a:srgbClr val="000000"/>
                     </a:solidFill>
@@ -17900,7 +18422,7 @@
               </a:ln>
               <a:extLst>
                 <a:ext uri="{91240B29-F687-4f45-9708-019B960494DF}">
-                  <a14:hiddenLine xmlns="" xmlns:a14="http://schemas.microsoft.com/office/drawing/2010/main" w="9525">
+                  <a14:hiddenLine xmlns:a14="http://schemas.microsoft.com/office/drawing/2010/main" xmlns="" w="9525">
                     <a:solidFill>
                       <a:srgbClr val="000000"/>
                     </a:solidFill>
@@ -18010,7 +18532,7 @@
               </a:ln>
               <a:extLst>
                 <a:ext uri="{91240B29-F687-4f45-9708-019B960494DF}">
-                  <a14:hiddenLine xmlns="" xmlns:a14="http://schemas.microsoft.com/office/drawing/2010/main" w="9525">
+                  <a14:hiddenLine xmlns:a14="http://schemas.microsoft.com/office/drawing/2010/main" xmlns="" w="9525">
                     <a:solidFill>
                       <a:srgbClr val="000000"/>
                     </a:solidFill>
@@ -18094,7 +18616,7 @@
               </a:ln>
               <a:extLst>
                 <a:ext uri="{91240B29-F687-4f45-9708-019B960494DF}">
-                  <a14:hiddenLine xmlns="" xmlns:a14="http://schemas.microsoft.com/office/drawing/2010/main" w="9525">
+                  <a14:hiddenLine xmlns:a14="http://schemas.microsoft.com/office/drawing/2010/main" xmlns="" w="9525">
                     <a:solidFill>
                       <a:srgbClr val="000000"/>
                     </a:solidFill>
@@ -18156,7 +18678,7 @@
               </a:ln>
               <a:extLst>
                 <a:ext uri="{91240B29-F687-4f45-9708-019B960494DF}">
-                  <a14:hiddenLine xmlns="" xmlns:a14="http://schemas.microsoft.com/office/drawing/2010/main" w="9525">
+                  <a14:hiddenLine xmlns:a14="http://schemas.microsoft.com/office/drawing/2010/main" xmlns="" w="9525">
                     <a:solidFill>
                       <a:srgbClr val="000000"/>
                     </a:solidFill>
@@ -18218,7 +18740,7 @@
               </a:ln>
               <a:extLst>
                 <a:ext uri="{91240B29-F687-4f45-9708-019B960494DF}">
-                  <a14:hiddenLine xmlns="" xmlns:a14="http://schemas.microsoft.com/office/drawing/2010/main" w="9525">
+                  <a14:hiddenLine xmlns:a14="http://schemas.microsoft.com/office/drawing/2010/main" xmlns="" w="9525">
                     <a:solidFill>
                       <a:srgbClr val="000000"/>
                     </a:solidFill>
@@ -18308,7 +18830,7 @@
               </a:ln>
               <a:extLst>
                 <a:ext uri="{91240B29-F687-4f45-9708-019B960494DF}">
-                  <a14:hiddenLine xmlns="" xmlns:a14="http://schemas.microsoft.com/office/drawing/2010/main" w="9525">
+                  <a14:hiddenLine xmlns:a14="http://schemas.microsoft.com/office/drawing/2010/main" xmlns="" w="9525">
                     <a:solidFill>
                       <a:srgbClr val="000000"/>
                     </a:solidFill>
@@ -18342,7 +18864,7 @@
               </a:ln>
               <a:extLst>
                 <a:ext uri="{91240B29-F687-4f45-9708-019B960494DF}">
-                  <a14:hiddenLine xmlns="" xmlns:a14="http://schemas.microsoft.com/office/drawing/2010/main" w="9525">
+                  <a14:hiddenLine xmlns:a14="http://schemas.microsoft.com/office/drawing/2010/main" xmlns="" w="9525">
                     <a:solidFill>
                       <a:srgbClr val="000000"/>
                     </a:solidFill>
@@ -18407,7 +18929,7 @@
               </a:ln>
               <a:extLst>
                 <a:ext uri="{91240B29-F687-4f45-9708-019B960494DF}">
-                  <a14:hiddenLine xmlns="" xmlns:a14="http://schemas.microsoft.com/office/drawing/2010/main" w="9525">
+                  <a14:hiddenLine xmlns:a14="http://schemas.microsoft.com/office/drawing/2010/main" xmlns="" w="9525">
                     <a:solidFill>
                       <a:srgbClr val="000000"/>
                     </a:solidFill>
@@ -18497,7 +19019,7 @@
               </a:ln>
               <a:extLst>
                 <a:ext uri="{91240B29-F687-4f45-9708-019B960494DF}">
-                  <a14:hiddenLine xmlns="" xmlns:a14="http://schemas.microsoft.com/office/drawing/2010/main" w="9525">
+                  <a14:hiddenLine xmlns:a14="http://schemas.microsoft.com/office/drawing/2010/main" xmlns="" w="9525">
                     <a:solidFill>
                       <a:srgbClr val="000000"/>
                     </a:solidFill>
@@ -18559,7 +19081,7 @@
               </a:ln>
               <a:extLst>
                 <a:ext uri="{91240B29-F687-4f45-9708-019B960494DF}">
-                  <a14:hiddenLine xmlns="" xmlns:a14="http://schemas.microsoft.com/office/drawing/2010/main" w="9525">
+                  <a14:hiddenLine xmlns:a14="http://schemas.microsoft.com/office/drawing/2010/main" xmlns="" w="9525">
                     <a:solidFill>
                       <a:srgbClr val="000000"/>
                     </a:solidFill>
@@ -18649,7 +19171,7 @@
               </a:ln>
               <a:extLst>
                 <a:ext uri="{91240B29-F687-4f45-9708-019B960494DF}">
-                  <a14:hiddenLine xmlns="" xmlns:a14="http://schemas.microsoft.com/office/drawing/2010/main" w="9525">
+                  <a14:hiddenLine xmlns:a14="http://schemas.microsoft.com/office/drawing/2010/main" xmlns="" w="9525">
                     <a:solidFill>
                       <a:srgbClr val="000000"/>
                     </a:solidFill>
@@ -18714,7 +19236,7 @@
               </a:ln>
               <a:extLst>
                 <a:ext uri="{91240B29-F687-4f45-9708-019B960494DF}">
-                  <a14:hiddenLine xmlns="" xmlns:a14="http://schemas.microsoft.com/office/drawing/2010/main" w="9525">
+                  <a14:hiddenLine xmlns:a14="http://schemas.microsoft.com/office/drawing/2010/main" xmlns="" w="9525">
                     <a:solidFill>
                       <a:srgbClr val="000000"/>
                     </a:solidFill>
@@ -18776,7 +19298,7 @@
               </a:ln>
               <a:extLst>
                 <a:ext uri="{91240B29-F687-4f45-9708-019B960494DF}">
-                  <a14:hiddenLine xmlns="" xmlns:a14="http://schemas.microsoft.com/office/drawing/2010/main" w="9525">
+                  <a14:hiddenLine xmlns:a14="http://schemas.microsoft.com/office/drawing/2010/main" xmlns="" w="9525">
                     <a:solidFill>
                       <a:srgbClr val="000000"/>
                     </a:solidFill>
@@ -18866,7 +19388,7 @@
               </a:ln>
               <a:extLst>
                 <a:ext uri="{91240B29-F687-4f45-9708-019B960494DF}">
-                  <a14:hiddenLine xmlns="" xmlns:a14="http://schemas.microsoft.com/office/drawing/2010/main" w="9525">
+                  <a14:hiddenLine xmlns:a14="http://schemas.microsoft.com/office/drawing/2010/main" xmlns="" w="9525">
                     <a:solidFill>
                       <a:srgbClr val="000000"/>
                     </a:solidFill>
@@ -18956,7 +19478,7 @@
               </a:ln>
               <a:extLst>
                 <a:ext uri="{91240B29-F687-4f45-9708-019B960494DF}">
-                  <a14:hiddenLine xmlns="" xmlns:a14="http://schemas.microsoft.com/office/drawing/2010/main" w="9525">
+                  <a14:hiddenLine xmlns:a14="http://schemas.microsoft.com/office/drawing/2010/main" xmlns="" w="9525">
                     <a:solidFill>
                       <a:srgbClr val="000000"/>
                     </a:solidFill>
@@ -19021,7 +19543,7 @@
               </a:ln>
               <a:extLst>
                 <a:ext uri="{91240B29-F687-4f45-9708-019B960494DF}">
-                  <a14:hiddenLine xmlns="" xmlns:a14="http://schemas.microsoft.com/office/drawing/2010/main" w="9525">
+                  <a14:hiddenLine xmlns:a14="http://schemas.microsoft.com/office/drawing/2010/main" xmlns="" w="9525">
                     <a:solidFill>
                       <a:srgbClr val="000000"/>
                     </a:solidFill>
@@ -19141,7 +19663,7 @@
               </a:ln>
               <a:extLst>
                 <a:ext uri="{91240B29-F687-4f45-9708-019B960494DF}">
-                  <a14:hiddenLine xmlns="" xmlns:a14="http://schemas.microsoft.com/office/drawing/2010/main" w="9525">
+                  <a14:hiddenLine xmlns:a14="http://schemas.microsoft.com/office/drawing/2010/main" xmlns="" w="9525">
                     <a:solidFill>
                       <a:srgbClr val="000000"/>
                     </a:solidFill>
@@ -19222,7 +19744,7 @@
               </a:ln>
               <a:extLst>
                 <a:ext uri="{91240B29-F687-4f45-9708-019B960494DF}">
-                  <a14:hiddenLine xmlns="" xmlns:a14="http://schemas.microsoft.com/office/drawing/2010/main" w="9525">
+                  <a14:hiddenLine xmlns:a14="http://schemas.microsoft.com/office/drawing/2010/main" xmlns="" w="9525">
                     <a:solidFill>
                       <a:srgbClr val="000000"/>
                     </a:solidFill>
@@ -19337,7 +19859,7 @@
               </a:ln>
               <a:extLst>
                 <a:ext uri="{91240B29-F687-4f45-9708-019B960494DF}">
-                  <a14:hiddenLine xmlns="" xmlns:a14="http://schemas.microsoft.com/office/drawing/2010/main" w="9525">
+                  <a14:hiddenLine xmlns:a14="http://schemas.microsoft.com/office/drawing/2010/main" xmlns="" w="9525">
                     <a:solidFill>
                       <a:srgbClr val="000000"/>
                     </a:solidFill>
@@ -19427,7 +19949,7 @@
               </a:ln>
               <a:extLst>
                 <a:ext uri="{91240B29-F687-4f45-9708-019B960494DF}">
-                  <a14:hiddenLine xmlns="" xmlns:a14="http://schemas.microsoft.com/office/drawing/2010/main" w="9525">
+                  <a14:hiddenLine xmlns:a14="http://schemas.microsoft.com/office/drawing/2010/main" xmlns="" w="9525">
                     <a:solidFill>
                       <a:srgbClr val="000000"/>
                     </a:solidFill>
@@ -19492,7 +20014,7 @@
               </a:ln>
               <a:extLst>
                 <a:ext uri="{91240B29-F687-4f45-9708-019B960494DF}">
-                  <a14:hiddenLine xmlns="" xmlns:a14="http://schemas.microsoft.com/office/drawing/2010/main" w="9525">
+                  <a14:hiddenLine xmlns:a14="http://schemas.microsoft.com/office/drawing/2010/main" xmlns="" w="9525">
                     <a:solidFill>
                       <a:srgbClr val="000000"/>
                     </a:solidFill>
@@ -19582,7 +20104,7 @@
               </a:ln>
               <a:extLst>
                 <a:ext uri="{91240B29-F687-4f45-9708-019B960494DF}">
-                  <a14:hiddenLine xmlns="" xmlns:a14="http://schemas.microsoft.com/office/drawing/2010/main" w="9525">
+                  <a14:hiddenLine xmlns:a14="http://schemas.microsoft.com/office/drawing/2010/main" xmlns="" w="9525">
                     <a:solidFill>
                       <a:srgbClr val="000000"/>
                     </a:solidFill>
@@ -19650,7 +20172,7 @@
               </a:ln>
               <a:extLst>
                 <a:ext uri="{91240B29-F687-4f45-9708-019B960494DF}">
-                  <a14:hiddenLine xmlns="" xmlns:a14="http://schemas.microsoft.com/office/drawing/2010/main" w="9525">
+                  <a14:hiddenLine xmlns:a14="http://schemas.microsoft.com/office/drawing/2010/main" xmlns="" w="9525">
                     <a:solidFill>
                       <a:srgbClr val="000000"/>
                     </a:solidFill>
@@ -19740,7 +20262,7 @@
               </a:ln>
               <a:extLst>
                 <a:ext uri="{91240B29-F687-4f45-9708-019B960494DF}">
-                  <a14:hiddenLine xmlns="" xmlns:a14="http://schemas.microsoft.com/office/drawing/2010/main" w="9525">
+                  <a14:hiddenLine xmlns:a14="http://schemas.microsoft.com/office/drawing/2010/main" xmlns="" w="9525">
                     <a:solidFill>
                       <a:srgbClr val="000000"/>
                     </a:solidFill>
@@ -19808,7 +20330,7 @@
               </a:ln>
               <a:extLst>
                 <a:ext uri="{91240B29-F687-4f45-9708-019B960494DF}">
-                  <a14:hiddenLine xmlns="" xmlns:a14="http://schemas.microsoft.com/office/drawing/2010/main" w="9525">
+                  <a14:hiddenLine xmlns:a14="http://schemas.microsoft.com/office/drawing/2010/main" xmlns="" w="9525">
                     <a:solidFill>
                       <a:srgbClr val="000000"/>
                     </a:solidFill>
@@ -19898,7 +20420,7 @@
               </a:ln>
               <a:extLst>
                 <a:ext uri="{91240B29-F687-4f45-9708-019B960494DF}">
-                  <a14:hiddenLine xmlns="" xmlns:a14="http://schemas.microsoft.com/office/drawing/2010/main" w="9525">
+                  <a14:hiddenLine xmlns:a14="http://schemas.microsoft.com/office/drawing/2010/main" xmlns="" w="9525">
                     <a:solidFill>
                       <a:srgbClr val="000000"/>
                     </a:solidFill>
@@ -19932,7 +20454,7 @@
               </a:ln>
               <a:extLst>
                 <a:ext uri="{91240B29-F687-4f45-9708-019B960494DF}">
-                  <a14:hiddenLine xmlns="" xmlns:a14="http://schemas.microsoft.com/office/drawing/2010/main" w="9525">
+                  <a14:hiddenLine xmlns:a14="http://schemas.microsoft.com/office/drawing/2010/main" xmlns="" w="9525">
                     <a:solidFill>
                       <a:srgbClr val="000000"/>
                     </a:solidFill>
@@ -20546,7 +21068,7 @@
         <p:spPr/>
         <p:txBody>
           <a:bodyPr>
-            <a:normAutofit/>
+            <a:normAutofit fontScale="77500" lnSpcReduction="20000"/>
           </a:bodyPr>
           <a:lstStyle/>
           <a:p>
@@ -20611,12 +21133,739 @@
               <a:cs typeface="Tahoma" panose="020B0604030504040204" pitchFamily="34" charset="0"/>
             </a:endParaRPr>
           </a:p>
+          <a:p>
+            <a:pPr algn="ctr"/>
+            <a:r>
+              <a:rPr lang="en-US" sz="2400" dirty="0">
+                <a:latin typeface="Tahoma" panose="020B0604030504040204" pitchFamily="34" charset="0"/>
+                <a:ea typeface="Tahoma" panose="020B0604030504040204" pitchFamily="34" charset="0"/>
+                <a:cs typeface="Tahoma" panose="020B0604030504040204" pitchFamily="34" charset="0"/>
+              </a:rPr>
+              <a:t>Amelia Corea</a:t>
+            </a:r>
+          </a:p>
         </p:txBody>
       </p:sp>
     </p:spTree>
     <p:extLst>
       <p:ext uri="{BB962C8B-B14F-4D97-AF65-F5344CB8AC3E}">
         <p14:creationId xmlns:p14="http://schemas.microsoft.com/office/powerpoint/2010/main" val="1819359268"/>
+      </p:ext>
+    </p:extLst>
+  </p:cSld>
+  <p:clrMapOvr>
+    <a:masterClrMapping/>
+  </p:clrMapOvr>
+</p:sld>
+</file>
+
+<file path=ppt/slides/slide10.xml><?xml version="1.0" encoding="utf-8"?>
+<p:sld xmlns:a="http://schemas.openxmlformats.org/drawingml/2006/main" xmlns:r="http://schemas.openxmlformats.org/officeDocument/2006/relationships" xmlns:p="http://schemas.openxmlformats.org/presentationml/2006/main">
+  <p:cSld>
+    <p:spTree>
+      <p:nvGrpSpPr>
+        <p:cNvPr id="1" name=""/>
+        <p:cNvGrpSpPr/>
+        <p:nvPr/>
+      </p:nvGrpSpPr>
+      <p:grpSpPr>
+        <a:xfrm>
+          <a:off x="0" y="0"/>
+          <a:ext cx="0" cy="0"/>
+          <a:chOff x="0" y="0"/>
+          <a:chExt cx="0" cy="0"/>
+        </a:xfrm>
+      </p:grpSpPr>
+      <p:sp>
+        <p:nvSpPr>
+          <p:cNvPr id="2" name="Title 1">
+            <a:extLst>
+              <a:ext uri="{FF2B5EF4-FFF2-40B4-BE49-F238E27FC236}">
+                <a16:creationId xmlns:a16="http://schemas.microsoft.com/office/drawing/2014/main" id="{34DB6CE4-2B13-4715-B5B2-615A55922CA1}"/>
+              </a:ext>
+            </a:extLst>
+          </p:cNvPr>
+          <p:cNvSpPr>
+            <a:spLocks noGrp="1"/>
+          </p:cNvSpPr>
+          <p:nvPr>
+            <p:ph type="title"/>
+          </p:nvPr>
+        </p:nvSpPr>
+        <p:spPr>
+          <a:xfrm>
+            <a:off x="1322388" y="235930"/>
+            <a:ext cx="9905998" cy="1478570"/>
+          </a:xfrm>
+        </p:spPr>
+        <p:txBody>
+          <a:bodyPr anchor="ctr">
+            <a:normAutofit/>
+          </a:bodyPr>
+          <a:lstStyle/>
+          <a:p>
+            <a:r>
+              <a:rPr lang="en-US" sz="4400" dirty="0">
+                <a:latin typeface="Rockwell" panose="02060603020205020403" pitchFamily="18" charset="0"/>
+              </a:rPr>
+              <a:t>K Nearest neighbors MODEL</a:t>
+            </a:r>
+          </a:p>
+        </p:txBody>
+      </p:sp>
+      <p:sp>
+        <p:nvSpPr>
+          <p:cNvPr id="3" name="Content Placeholder 2">
+            <a:extLst>
+              <a:ext uri="{FF2B5EF4-FFF2-40B4-BE49-F238E27FC236}">
+                <a16:creationId xmlns:a16="http://schemas.microsoft.com/office/drawing/2014/main" id="{143F5361-68C0-4BF5-80C8-F1E7BF92B2DB}"/>
+              </a:ext>
+            </a:extLst>
+          </p:cNvPr>
+          <p:cNvSpPr>
+            <a:spLocks noGrp="1"/>
+          </p:cNvSpPr>
+          <p:nvPr>
+            <p:ph sz="half" idx="2"/>
+          </p:nvPr>
+        </p:nvSpPr>
+        <p:spPr>
+          <a:xfrm>
+            <a:off x="6172200" y="2249486"/>
+            <a:ext cx="4875211" cy="3541714"/>
+          </a:xfrm>
+        </p:spPr>
+        <p:txBody>
+          <a:bodyPr>
+            <a:normAutofit/>
+          </a:bodyPr>
+          <a:lstStyle/>
+          <a:p>
+            <a:endParaRPr lang="en-US"/>
+          </a:p>
+          <a:p>
+            <a:pPr marL="457200" lvl="1" indent="0">
+              <a:buNone/>
+            </a:pPr>
+            <a:endParaRPr lang="en-US" sz="2400"/>
+          </a:p>
+          <a:p>
+            <a:pPr lvl="1"/>
+            <a:endParaRPr lang="en-US" sz="2400"/>
+          </a:p>
+          <a:p>
+            <a:pPr lvl="2"/>
+            <a:endParaRPr lang="en-US" sz="2400"/>
+          </a:p>
+        </p:txBody>
+      </p:sp>
+      <p:sp>
+        <p:nvSpPr>
+          <p:cNvPr id="7" name="TextBox 6">
+            <a:extLst>
+              <a:ext uri="{FF2B5EF4-FFF2-40B4-BE49-F238E27FC236}">
+                <a16:creationId xmlns:a16="http://schemas.microsoft.com/office/drawing/2014/main" id="{62E16E35-EFD3-4F41-97E0-BFBBC5B849BD}"/>
+              </a:ext>
+            </a:extLst>
+          </p:cNvPr>
+          <p:cNvSpPr txBox="1"/>
+          <p:nvPr/>
+        </p:nvSpPr>
+        <p:spPr>
+          <a:xfrm>
+            <a:off x="7067550" y="1724024"/>
+            <a:ext cx="4275533" cy="2862322"/>
+          </a:xfrm>
+          <a:prstGeom prst="rect">
+            <a:avLst/>
+          </a:prstGeom>
+          <a:noFill/>
+        </p:spPr>
+        <p:txBody>
+          <a:bodyPr wrap="square" rtlCol="0">
+            <a:spAutoFit/>
+          </a:bodyPr>
+          <a:lstStyle/>
+          <a:p>
+            <a:pPr marL="285750" marR="0" lvl="0" indent="-285750" algn="l" defTabSz="457200" rtl="0" eaLnBrk="1" fontAlgn="auto" latinLnBrk="0" hangingPunct="1">
+              <a:lnSpc>
+                <a:spcPct val="100000"/>
+              </a:lnSpc>
+              <a:spcBef>
+                <a:spcPts val="0"/>
+              </a:spcBef>
+              <a:spcAft>
+                <a:spcPts val="0"/>
+              </a:spcAft>
+              <a:buClrTx/>
+              <a:buSzTx/>
+              <a:buFont typeface="Wingdings" panose="05000000000000000000" pitchFamily="2" charset="2"/>
+              <a:buChar char="§"/>
+              <a:tabLst/>
+              <a:defRPr/>
+            </a:pPr>
+            <a:endParaRPr kumimoji="0" lang="en-US" sz="1800" b="0" i="0" u="none" strike="noStrike" kern="1200" cap="none" spc="0" normalizeH="0" baseline="0" noProof="0" dirty="0">
+              <a:ln>
+                <a:noFill/>
+              </a:ln>
+              <a:solidFill>
+                <a:prstClr val="white"/>
+              </a:solidFill>
+              <a:effectLst/>
+              <a:uLnTx/>
+              <a:uFillTx/>
+              <a:latin typeface="Tw Cen MT" panose="020B0602020104020603"/>
+              <a:ea typeface="+mn-ea"/>
+              <a:cs typeface="+mn-cs"/>
+            </a:endParaRPr>
+          </a:p>
+          <a:p>
+            <a:pPr marL="285750" marR="0" lvl="0" indent="-285750" algn="l" defTabSz="457200" rtl="0" eaLnBrk="1" fontAlgn="auto" latinLnBrk="0" hangingPunct="1">
+              <a:lnSpc>
+                <a:spcPct val="100000"/>
+              </a:lnSpc>
+              <a:spcBef>
+                <a:spcPts val="0"/>
+              </a:spcBef>
+              <a:spcAft>
+                <a:spcPts val="0"/>
+              </a:spcAft>
+              <a:buClrTx/>
+              <a:buSzTx/>
+              <a:buFont typeface="Wingdings" panose="05000000000000000000" pitchFamily="2" charset="2"/>
+              <a:buChar char="§"/>
+              <a:tabLst/>
+              <a:defRPr/>
+            </a:pPr>
+            <a:r>
+              <a:rPr kumimoji="0" lang="en-US" sz="2400" b="0" i="0" u="none" strike="noStrike" kern="1200" cap="none" spc="0" normalizeH="0" baseline="0" noProof="0" dirty="0">
+                <a:ln>
+                  <a:noFill/>
+                </a:ln>
+                <a:solidFill>
+                  <a:prstClr val="white"/>
+                </a:solidFill>
+                <a:effectLst/>
+                <a:uLnTx/>
+                <a:uFillTx/>
+                <a:latin typeface="Tahoma" panose="020B0604030504040204" pitchFamily="34" charset="0"/>
+                <a:ea typeface="Tahoma" panose="020B0604030504040204" pitchFamily="34" charset="0"/>
+                <a:cs typeface="Tahoma" panose="020B0604030504040204" pitchFamily="34" charset="0"/>
+              </a:rPr>
+              <a:t>Supervised machine learning algorithm</a:t>
+            </a:r>
+          </a:p>
+          <a:p>
+            <a:pPr marL="285750" marR="0" lvl="0" indent="-285750" algn="l" defTabSz="457200" rtl="0" eaLnBrk="1" fontAlgn="auto" latinLnBrk="0" hangingPunct="1">
+              <a:lnSpc>
+                <a:spcPct val="100000"/>
+              </a:lnSpc>
+              <a:spcBef>
+                <a:spcPts val="0"/>
+              </a:spcBef>
+              <a:spcAft>
+                <a:spcPts val="0"/>
+              </a:spcAft>
+              <a:buClrTx/>
+              <a:buSzTx/>
+              <a:buFont typeface="Wingdings" panose="05000000000000000000" pitchFamily="2" charset="2"/>
+              <a:buChar char="§"/>
+              <a:tabLst/>
+              <a:defRPr/>
+            </a:pPr>
+            <a:r>
+              <a:rPr kumimoji="0" lang="en-US" sz="2400" b="0" i="0" u="none" strike="noStrike" kern="1200" cap="none" spc="0" normalizeH="0" baseline="0" noProof="0" dirty="0">
+                <a:ln>
+                  <a:noFill/>
+                </a:ln>
+                <a:solidFill>
+                  <a:prstClr val="white"/>
+                </a:solidFill>
+                <a:effectLst/>
+                <a:uLnTx/>
+                <a:uFillTx/>
+                <a:latin typeface="Tahoma" panose="020B0604030504040204" pitchFamily="34" charset="0"/>
+                <a:ea typeface="Tahoma" panose="020B0604030504040204" pitchFamily="34" charset="0"/>
+                <a:cs typeface="Tahoma" panose="020B0604030504040204" pitchFamily="34" charset="0"/>
+              </a:rPr>
+              <a:t>Regression analysis</a:t>
+            </a:r>
+          </a:p>
+          <a:p>
+            <a:pPr marL="285750" marR="0" lvl="0" indent="-285750" algn="l" defTabSz="457200" rtl="0" eaLnBrk="1" fontAlgn="auto" latinLnBrk="0" hangingPunct="1">
+              <a:lnSpc>
+                <a:spcPct val="100000"/>
+              </a:lnSpc>
+              <a:spcBef>
+                <a:spcPts val="0"/>
+              </a:spcBef>
+              <a:spcAft>
+                <a:spcPts val="0"/>
+              </a:spcAft>
+              <a:buClrTx/>
+              <a:buSzTx/>
+              <a:buFont typeface="Wingdings" panose="05000000000000000000" pitchFamily="2" charset="2"/>
+              <a:buChar char="§"/>
+              <a:tabLst/>
+              <a:defRPr/>
+            </a:pPr>
+            <a:r>
+              <a:rPr kumimoji="0" lang="en-US" sz="2400" b="0" i="0" u="none" strike="noStrike" kern="1200" cap="none" spc="0" normalizeH="0" baseline="0" noProof="0" dirty="0">
+                <a:ln>
+                  <a:noFill/>
+                </a:ln>
+                <a:solidFill>
+                  <a:prstClr val="white"/>
+                </a:solidFill>
+                <a:effectLst/>
+                <a:uLnTx/>
+                <a:uFillTx/>
+                <a:latin typeface="Tahoma" panose="020B0604030504040204" pitchFamily="34" charset="0"/>
+                <a:ea typeface="Tahoma" panose="020B0604030504040204" pitchFamily="34" charset="0"/>
+                <a:cs typeface="Tahoma" panose="020B0604030504040204" pitchFamily="34" charset="0"/>
+              </a:rPr>
+              <a:t>Finetuning the model to improve accuracy</a:t>
+            </a:r>
+          </a:p>
+          <a:p>
+            <a:pPr marL="285750" marR="0" lvl="0" indent="-285750" algn="l" defTabSz="457200" rtl="0" eaLnBrk="1" fontAlgn="auto" latinLnBrk="0" hangingPunct="1">
+              <a:lnSpc>
+                <a:spcPct val="100000"/>
+              </a:lnSpc>
+              <a:spcBef>
+                <a:spcPts val="0"/>
+              </a:spcBef>
+              <a:spcAft>
+                <a:spcPts val="0"/>
+              </a:spcAft>
+              <a:buClrTx/>
+              <a:buSzTx/>
+              <a:buFont typeface="Wingdings" panose="05000000000000000000" pitchFamily="2" charset="2"/>
+              <a:buChar char="§"/>
+              <a:tabLst/>
+              <a:defRPr/>
+            </a:pPr>
+            <a:endParaRPr kumimoji="0" lang="en-US" sz="2400" b="0" i="0" u="none" strike="noStrike" kern="1200" cap="none" spc="0" normalizeH="0" baseline="0" noProof="0" dirty="0">
+              <a:ln>
+                <a:noFill/>
+              </a:ln>
+              <a:solidFill>
+                <a:prstClr val="white"/>
+              </a:solidFill>
+              <a:effectLst/>
+              <a:uLnTx/>
+              <a:uFillTx/>
+              <a:latin typeface="Tahoma" panose="020B0604030504040204" pitchFamily="34" charset="0"/>
+              <a:ea typeface="Tahoma" panose="020B0604030504040204" pitchFamily="34" charset="0"/>
+              <a:cs typeface="Tahoma" panose="020B0604030504040204" pitchFamily="34" charset="0"/>
+            </a:endParaRPr>
+          </a:p>
+          <a:p>
+            <a:pPr marL="285750" marR="0" lvl="0" indent="-285750" algn="l" defTabSz="457200" rtl="0" eaLnBrk="1" fontAlgn="auto" latinLnBrk="0" hangingPunct="1">
+              <a:lnSpc>
+                <a:spcPct val="100000"/>
+              </a:lnSpc>
+              <a:spcBef>
+                <a:spcPts val="0"/>
+              </a:spcBef>
+              <a:spcAft>
+                <a:spcPts val="0"/>
+              </a:spcAft>
+              <a:buClrTx/>
+              <a:buSzTx/>
+              <a:buFont typeface="Wingdings" panose="05000000000000000000" pitchFamily="2" charset="2"/>
+              <a:buChar char="§"/>
+              <a:tabLst/>
+              <a:defRPr/>
+            </a:pPr>
+            <a:endParaRPr kumimoji="0" lang="en-US" sz="1800" b="0" i="0" u="none" strike="noStrike" kern="1200" cap="none" spc="0" normalizeH="0" baseline="0" noProof="0" dirty="0">
+              <a:ln>
+                <a:noFill/>
+              </a:ln>
+              <a:solidFill>
+                <a:prstClr val="white"/>
+              </a:solidFill>
+              <a:effectLst/>
+              <a:uLnTx/>
+              <a:uFillTx/>
+              <a:latin typeface="Tw Cen MT" panose="020B0602020104020603"/>
+              <a:ea typeface="+mn-ea"/>
+              <a:cs typeface="+mn-cs"/>
+            </a:endParaRPr>
+          </a:p>
+        </p:txBody>
+      </p:sp>
+      <p:pic>
+        <p:nvPicPr>
+          <p:cNvPr id="5" name="Picture 4" descr="Text&#10;&#10;Description automatically generated">
+            <a:extLst>
+              <a:ext uri="{FF2B5EF4-FFF2-40B4-BE49-F238E27FC236}">
+                <a16:creationId xmlns:a16="http://schemas.microsoft.com/office/drawing/2014/main" id="{1D6FD02E-2F6B-42F3-A070-5C769C852277}"/>
+              </a:ext>
+            </a:extLst>
+          </p:cNvPr>
+          <p:cNvPicPr>
+            <a:picLocks noChangeAspect="1"/>
+          </p:cNvPicPr>
+          <p:nvPr/>
+        </p:nvPicPr>
+        <p:blipFill>
+          <a:blip r:embed="rId2"/>
+          <a:stretch>
+            <a:fillRect/>
+          </a:stretch>
+        </p:blipFill>
+        <p:spPr>
+          <a:xfrm>
+            <a:off x="1585163" y="1455938"/>
+            <a:ext cx="5070640" cy="5166132"/>
+          </a:xfrm>
+          <a:prstGeom prst="rect">
+            <a:avLst/>
+          </a:prstGeom>
+        </p:spPr>
+      </p:pic>
+    </p:spTree>
+    <p:extLst>
+      <p:ext uri="{BB962C8B-B14F-4D97-AF65-F5344CB8AC3E}">
+        <p14:creationId xmlns:p14="http://schemas.microsoft.com/office/powerpoint/2010/main" val="3103998298"/>
+      </p:ext>
+    </p:extLst>
+  </p:cSld>
+  <p:clrMapOvr>
+    <a:masterClrMapping/>
+  </p:clrMapOvr>
+</p:sld>
+</file>
+
+<file path=ppt/slides/slide11.xml><?xml version="1.0" encoding="utf-8"?>
+<p:sld xmlns:a="http://schemas.openxmlformats.org/drawingml/2006/main" xmlns:r="http://schemas.openxmlformats.org/officeDocument/2006/relationships" xmlns:p="http://schemas.openxmlformats.org/presentationml/2006/main">
+  <p:cSld>
+    <p:spTree>
+      <p:nvGrpSpPr>
+        <p:cNvPr id="1" name=""/>
+        <p:cNvGrpSpPr/>
+        <p:nvPr/>
+      </p:nvGrpSpPr>
+      <p:grpSpPr>
+        <a:xfrm>
+          <a:off x="0" y="0"/>
+          <a:ext cx="0" cy="0"/>
+          <a:chOff x="0" y="0"/>
+          <a:chExt cx="0" cy="0"/>
+        </a:xfrm>
+      </p:grpSpPr>
+      <p:sp>
+        <p:nvSpPr>
+          <p:cNvPr id="2" name="Title 1">
+            <a:extLst>
+              <a:ext uri="{FF2B5EF4-FFF2-40B4-BE49-F238E27FC236}">
+                <a16:creationId xmlns:a16="http://schemas.microsoft.com/office/drawing/2014/main" id="{50F0DA21-CC99-4C3A-A5AB-D57045F893EA}"/>
+              </a:ext>
+            </a:extLst>
+          </p:cNvPr>
+          <p:cNvSpPr>
+            <a:spLocks noGrp="1"/>
+          </p:cNvSpPr>
+          <p:nvPr>
+            <p:ph type="title"/>
+          </p:nvPr>
+        </p:nvSpPr>
+        <p:spPr/>
+        <p:txBody>
+          <a:bodyPr>
+            <a:normAutofit/>
+          </a:bodyPr>
+          <a:lstStyle/>
+          <a:p>
+            <a:r>
+              <a:rPr lang="en-US" sz="4400" dirty="0">
+                <a:latin typeface="Rockwell" panose="02060603020205020403" pitchFamily="18" charset="0"/>
+              </a:rPr>
+              <a:t>TABLEAU VISUALIZATION</a:t>
+            </a:r>
+          </a:p>
+        </p:txBody>
+      </p:sp>
+      <p:sp>
+        <p:nvSpPr>
+          <p:cNvPr id="3" name="Content Placeholder 2">
+            <a:extLst>
+              <a:ext uri="{FF2B5EF4-FFF2-40B4-BE49-F238E27FC236}">
+                <a16:creationId xmlns:a16="http://schemas.microsoft.com/office/drawing/2014/main" id="{3899BDF4-B543-46C8-9956-BD9969975109}"/>
+              </a:ext>
+            </a:extLst>
+          </p:cNvPr>
+          <p:cNvSpPr>
+            <a:spLocks noGrp="1"/>
+          </p:cNvSpPr>
+          <p:nvPr>
+            <p:ph idx="1"/>
+          </p:nvPr>
+        </p:nvSpPr>
+        <p:spPr/>
+        <p:txBody>
+          <a:bodyPr/>
+          <a:lstStyle/>
+          <a:p>
+            <a:endParaRPr lang="en-US" dirty="0"/>
+          </a:p>
+        </p:txBody>
+      </p:sp>
+    </p:spTree>
+    <p:extLst>
+      <p:ext uri="{BB962C8B-B14F-4D97-AF65-F5344CB8AC3E}">
+        <p14:creationId xmlns:p14="http://schemas.microsoft.com/office/powerpoint/2010/main" val="3405949825"/>
+      </p:ext>
+    </p:extLst>
+  </p:cSld>
+  <p:clrMapOvr>
+    <a:masterClrMapping/>
+  </p:clrMapOvr>
+</p:sld>
+</file>
+
+<file path=ppt/slides/slide12.xml><?xml version="1.0" encoding="utf-8"?>
+<p:sld xmlns:a="http://schemas.openxmlformats.org/drawingml/2006/main" xmlns:r="http://schemas.openxmlformats.org/officeDocument/2006/relationships" xmlns:p="http://schemas.openxmlformats.org/presentationml/2006/main">
+  <p:cSld>
+    <p:spTree>
+      <p:nvGrpSpPr>
+        <p:cNvPr id="1" name=""/>
+        <p:cNvGrpSpPr/>
+        <p:nvPr/>
+      </p:nvGrpSpPr>
+      <p:grpSpPr>
+        <a:xfrm>
+          <a:off x="0" y="0"/>
+          <a:ext cx="0" cy="0"/>
+          <a:chOff x="0" y="0"/>
+          <a:chExt cx="0" cy="0"/>
+        </a:xfrm>
+      </p:grpSpPr>
+      <p:sp>
+        <p:nvSpPr>
+          <p:cNvPr id="2" name="Title 1">
+            <a:extLst>
+              <a:ext uri="{FF2B5EF4-FFF2-40B4-BE49-F238E27FC236}">
+                <a16:creationId xmlns:a16="http://schemas.microsoft.com/office/drawing/2014/main" id="{34DB6CE4-2B13-4715-B5B2-615A55922CA1}"/>
+              </a:ext>
+            </a:extLst>
+          </p:cNvPr>
+          <p:cNvSpPr>
+            <a:spLocks noGrp="1"/>
+          </p:cNvSpPr>
+          <p:nvPr>
+            <p:ph type="title"/>
+          </p:nvPr>
+        </p:nvSpPr>
+        <p:spPr>
+          <a:xfrm>
+            <a:off x="1141413" y="202879"/>
+            <a:ext cx="9905998" cy="1478570"/>
+          </a:xfrm>
+        </p:spPr>
+        <p:txBody>
+          <a:bodyPr>
+            <a:normAutofit/>
+          </a:bodyPr>
+          <a:lstStyle/>
+          <a:p>
+            <a:r>
+              <a:rPr lang="en-US" sz="4400" dirty="0">
+                <a:latin typeface="Rockwell" panose="02060603020205020403" pitchFamily="18" charset="0"/>
+              </a:rPr>
+              <a:t>Take Away</a:t>
+            </a:r>
+          </a:p>
+        </p:txBody>
+      </p:sp>
+      <p:sp>
+        <p:nvSpPr>
+          <p:cNvPr id="3" name="Content Placeholder 2">
+            <a:extLst>
+              <a:ext uri="{FF2B5EF4-FFF2-40B4-BE49-F238E27FC236}">
+                <a16:creationId xmlns:a16="http://schemas.microsoft.com/office/drawing/2014/main" id="{143F5361-68C0-4BF5-80C8-F1E7BF92B2DB}"/>
+              </a:ext>
+            </a:extLst>
+          </p:cNvPr>
+          <p:cNvSpPr>
+            <a:spLocks noGrp="1"/>
+          </p:cNvSpPr>
+          <p:nvPr>
+            <p:ph idx="1"/>
+          </p:nvPr>
+        </p:nvSpPr>
+        <p:spPr>
+          <a:xfrm>
+            <a:off x="1141413" y="1473632"/>
+            <a:ext cx="4194158" cy="3984488"/>
+          </a:xfrm>
+        </p:spPr>
+        <p:txBody>
+          <a:bodyPr>
+            <a:normAutofit/>
+          </a:bodyPr>
+          <a:lstStyle/>
+          <a:p>
+            <a:r>
+              <a:rPr lang="en-US" sz="2000" dirty="0">
+                <a:latin typeface="Tahoma" panose="020B0604030504040204" pitchFamily="34" charset="0"/>
+                <a:ea typeface="Tahoma" panose="020B0604030504040204" pitchFamily="34" charset="0"/>
+                <a:cs typeface="Tahoma" panose="020B0604030504040204" pitchFamily="34" charset="0"/>
+              </a:rPr>
+              <a:t>Our map visualization shows there are patterns within the county to be studied</a:t>
+            </a:r>
+          </a:p>
+          <a:p>
+            <a:r>
+              <a:rPr lang="en-US" sz="2000" dirty="0">
+                <a:latin typeface="Tahoma" panose="020B0604030504040204" pitchFamily="34" charset="0"/>
+                <a:ea typeface="Tahoma" panose="020B0604030504040204" pitchFamily="34" charset="0"/>
+                <a:cs typeface="Tahoma" panose="020B0604030504040204" pitchFamily="34" charset="0"/>
+              </a:rPr>
+              <a:t>Data is structured for further inspection and analysis (</a:t>
+            </a:r>
+            <a:r>
+              <a:rPr lang="en-US" sz="2000" dirty="0" err="1">
+                <a:latin typeface="Tahoma" panose="020B0604030504040204" pitchFamily="34" charset="0"/>
+                <a:ea typeface="Tahoma" panose="020B0604030504040204" pitchFamily="34" charset="0"/>
+                <a:cs typeface="Tahoma" panose="020B0604030504040204" pitchFamily="34" charset="0"/>
+              </a:rPr>
+              <a:t>xy</a:t>
+            </a:r>
+            <a:r>
+              <a:rPr lang="en-US" sz="2000" dirty="0">
+                <a:latin typeface="Tahoma" panose="020B0604030504040204" pitchFamily="34" charset="0"/>
+                <a:ea typeface="Tahoma" panose="020B0604030504040204" pitchFamily="34" charset="0"/>
+                <a:cs typeface="Tahoma" panose="020B0604030504040204" pitchFamily="34" charset="0"/>
+              </a:rPr>
+              <a:t> scatter plots!)</a:t>
+            </a:r>
+          </a:p>
+          <a:p>
+            <a:endParaRPr lang="en-US" sz="2000" dirty="0">
+              <a:latin typeface="Tahoma" panose="020B0604030504040204" pitchFamily="34" charset="0"/>
+              <a:ea typeface="Tahoma" panose="020B0604030504040204" pitchFamily="34" charset="0"/>
+              <a:cs typeface="Tahoma" panose="020B0604030504040204" pitchFamily="34" charset="0"/>
+            </a:endParaRPr>
+          </a:p>
+          <a:p>
+            <a:pPr marL="457200" lvl="1" indent="0">
+              <a:buNone/>
+            </a:pPr>
+            <a:endParaRPr lang="en-US" sz="1800" dirty="0">
+              <a:latin typeface="Tahoma" panose="020B0604030504040204" pitchFamily="34" charset="0"/>
+              <a:ea typeface="Tahoma" panose="020B0604030504040204" pitchFamily="34" charset="0"/>
+              <a:cs typeface="Tahoma" panose="020B0604030504040204" pitchFamily="34" charset="0"/>
+            </a:endParaRPr>
+          </a:p>
+          <a:p>
+            <a:pPr marL="457200" lvl="1" indent="0">
+              <a:buNone/>
+            </a:pPr>
+            <a:endParaRPr lang="en-US" sz="1800" dirty="0">
+              <a:latin typeface="Tahoma" panose="020B0604030504040204" pitchFamily="34" charset="0"/>
+              <a:ea typeface="Tahoma" panose="020B0604030504040204" pitchFamily="34" charset="0"/>
+              <a:cs typeface="Tahoma" panose="020B0604030504040204" pitchFamily="34" charset="0"/>
+            </a:endParaRPr>
+          </a:p>
+          <a:p>
+            <a:pPr lvl="2"/>
+            <a:endParaRPr lang="en-US" sz="1600" dirty="0">
+              <a:latin typeface="Tahoma" panose="020B0604030504040204" pitchFamily="34" charset="0"/>
+              <a:ea typeface="Tahoma" panose="020B0604030504040204" pitchFamily="34" charset="0"/>
+              <a:cs typeface="Tahoma" panose="020B0604030504040204" pitchFamily="34" charset="0"/>
+            </a:endParaRPr>
+          </a:p>
+        </p:txBody>
+      </p:sp>
+    </p:spTree>
+    <p:extLst>
+      <p:ext uri="{BB962C8B-B14F-4D97-AF65-F5344CB8AC3E}">
+        <p14:creationId xmlns:p14="http://schemas.microsoft.com/office/powerpoint/2010/main" val="192885746"/>
+      </p:ext>
+    </p:extLst>
+  </p:cSld>
+  <p:clrMapOvr>
+    <a:masterClrMapping/>
+  </p:clrMapOvr>
+</p:sld>
+</file>
+
+<file path=ppt/slides/slide13.xml><?xml version="1.0" encoding="utf-8"?>
+<p:sld xmlns:a="http://schemas.openxmlformats.org/drawingml/2006/main" xmlns:r="http://schemas.openxmlformats.org/officeDocument/2006/relationships" xmlns:p="http://schemas.openxmlformats.org/presentationml/2006/main">
+  <p:cSld>
+    <p:spTree>
+      <p:nvGrpSpPr>
+        <p:cNvPr id="1" name=""/>
+        <p:cNvGrpSpPr/>
+        <p:nvPr/>
+      </p:nvGrpSpPr>
+      <p:grpSpPr>
+        <a:xfrm>
+          <a:off x="0" y="0"/>
+          <a:ext cx="0" cy="0"/>
+          <a:chOff x="0" y="0"/>
+          <a:chExt cx="0" cy="0"/>
+        </a:xfrm>
+      </p:grpSpPr>
+      <p:sp>
+        <p:nvSpPr>
+          <p:cNvPr id="2" name="Title 1">
+            <a:extLst>
+              <a:ext uri="{FF2B5EF4-FFF2-40B4-BE49-F238E27FC236}">
+                <a16:creationId xmlns:a16="http://schemas.microsoft.com/office/drawing/2014/main" id="{8123DCBC-CEBE-4D23-8253-3E8B8086BD12}"/>
+              </a:ext>
+            </a:extLst>
+          </p:cNvPr>
+          <p:cNvSpPr>
+            <a:spLocks noGrp="1"/>
+          </p:cNvSpPr>
+          <p:nvPr>
+            <p:ph type="title"/>
+          </p:nvPr>
+        </p:nvSpPr>
+        <p:spPr/>
+        <p:txBody>
+          <a:bodyPr/>
+          <a:lstStyle/>
+          <a:p>
+            <a:r>
+              <a:rPr lang="en-US" dirty="0"/>
+              <a:t>BACKUP</a:t>
+            </a:r>
+          </a:p>
+        </p:txBody>
+      </p:sp>
+      <p:sp>
+        <p:nvSpPr>
+          <p:cNvPr id="3" name="Content Placeholder 2">
+            <a:extLst>
+              <a:ext uri="{FF2B5EF4-FFF2-40B4-BE49-F238E27FC236}">
+                <a16:creationId xmlns:a16="http://schemas.microsoft.com/office/drawing/2014/main" id="{E658C7B0-47D9-488A-9CEC-B71B5309B025}"/>
+              </a:ext>
+            </a:extLst>
+          </p:cNvPr>
+          <p:cNvSpPr>
+            <a:spLocks noGrp="1"/>
+          </p:cNvSpPr>
+          <p:nvPr>
+            <p:ph idx="1"/>
+          </p:nvPr>
+        </p:nvSpPr>
+        <p:spPr/>
+        <p:txBody>
+          <a:bodyPr/>
+          <a:lstStyle/>
+          <a:p>
+            <a:endParaRPr lang="en-US"/>
+          </a:p>
+        </p:txBody>
+      </p:sp>
+    </p:spTree>
+    <p:extLst>
+      <p:ext uri="{BB962C8B-B14F-4D97-AF65-F5344CB8AC3E}">
+        <p14:creationId xmlns:p14="http://schemas.microsoft.com/office/powerpoint/2010/main" val="4140908998"/>
       </p:ext>
     </p:extLst>
   </p:cSld>
@@ -20795,7 +22044,7 @@
             <p:ph idx="1"/>
             <p:extLst>
               <p:ext uri="{D42A27DB-BD31-4B8C-83A1-F6EECF244321}">
-                <p14:modId xmlns:p14="http://schemas.microsoft.com/office/powerpoint/2010/main" val="3251568266"/>
+                <p14:modId xmlns:p14="http://schemas.microsoft.com/office/powerpoint/2010/main" val="2053053073"/>
               </p:ext>
             </p:extLst>
           </p:nvPr>
@@ -22070,6 +23319,518 @@
           </a:p>
         </p:txBody>
       </p:sp>
+      <p:graphicFrame>
+        <p:nvGraphicFramePr>
+          <p:cNvPr id="3" name="Table 3">
+            <a:extLst>
+              <a:ext uri="{FF2B5EF4-FFF2-40B4-BE49-F238E27FC236}">
+                <a16:creationId xmlns:a16="http://schemas.microsoft.com/office/drawing/2014/main" id="{E9360718-F9A4-4A8A-A2A3-AFFD9EB61D23}"/>
+              </a:ext>
+            </a:extLst>
+          </p:cNvPr>
+          <p:cNvGraphicFramePr>
+            <a:graphicFrameLocks noGrp="1"/>
+          </p:cNvGraphicFramePr>
+          <p:nvPr>
+            <p:extLst>
+              <p:ext uri="{D42A27DB-BD31-4B8C-83A1-F6EECF244321}">
+                <p14:modId xmlns:p14="http://schemas.microsoft.com/office/powerpoint/2010/main" val="803503659"/>
+              </p:ext>
+            </p:extLst>
+          </p:nvPr>
+        </p:nvGraphicFramePr>
+        <p:xfrm>
+          <a:off x="1177636" y="1639030"/>
+          <a:ext cx="8503259" cy="3211961"/>
+        </p:xfrm>
+        <a:graphic>
+          <a:graphicData uri="http://schemas.openxmlformats.org/drawingml/2006/table">
+            <a:tbl>
+              <a:tblPr firstRow="1" bandRow="1">
+                <a:tableStyleId>{5C22544A-7EE6-4342-B048-85BDC9FD1C3A}</a:tableStyleId>
+              </a:tblPr>
+              <a:tblGrid>
+                <a:gridCol w="2085681">
+                  <a:extLst>
+                    <a:ext uri="{9D8B030D-6E8A-4147-A177-3AD203B41FA5}">
+                      <a16:colId xmlns:a16="http://schemas.microsoft.com/office/drawing/2014/main" val="217715763"/>
+                    </a:ext>
+                  </a:extLst>
+                </a:gridCol>
+                <a:gridCol w="1589293">
+                  <a:extLst>
+                    <a:ext uri="{9D8B030D-6E8A-4147-A177-3AD203B41FA5}">
+                      <a16:colId xmlns:a16="http://schemas.microsoft.com/office/drawing/2014/main" val="3851072542"/>
+                    </a:ext>
+                  </a:extLst>
+                </a:gridCol>
+                <a:gridCol w="1769280">
+                  <a:extLst>
+                    <a:ext uri="{9D8B030D-6E8A-4147-A177-3AD203B41FA5}">
+                      <a16:colId xmlns:a16="http://schemas.microsoft.com/office/drawing/2014/main" val="420803821"/>
+                    </a:ext>
+                  </a:extLst>
+                </a:gridCol>
+                <a:gridCol w="3059005">
+                  <a:extLst>
+                    <a:ext uri="{9D8B030D-6E8A-4147-A177-3AD203B41FA5}">
+                      <a16:colId xmlns:a16="http://schemas.microsoft.com/office/drawing/2014/main" val="3844336437"/>
+                    </a:ext>
+                  </a:extLst>
+                </a:gridCol>
+              </a:tblGrid>
+              <a:tr h="726665">
+                <a:tc>
+                  <a:txBody>
+                    <a:bodyPr/>
+                    <a:lstStyle/>
+                    <a:p>
+                      <a:r>
+                        <a:rPr lang="en-US" dirty="0"/>
+                        <a:t>MODEL</a:t>
+                      </a:r>
+                    </a:p>
+                  </a:txBody>
+                  <a:tcPr/>
+                </a:tc>
+                <a:tc>
+                  <a:txBody>
+                    <a:bodyPr/>
+                    <a:lstStyle/>
+                    <a:p>
+                      <a:r>
+                        <a:rPr lang="en-US" dirty="0"/>
+                        <a:t>TRAINING ACCURACY</a:t>
+                      </a:r>
+                    </a:p>
+                  </a:txBody>
+                  <a:tcPr/>
+                </a:tc>
+                <a:tc>
+                  <a:txBody>
+                    <a:bodyPr/>
+                    <a:lstStyle/>
+                    <a:p>
+                      <a:r>
+                        <a:rPr lang="en-US" dirty="0"/>
+                        <a:t>TEST ACCURACY</a:t>
+                      </a:r>
+                    </a:p>
+                  </a:txBody>
+                  <a:tcPr/>
+                </a:tc>
+                <a:tc>
+                  <a:txBody>
+                    <a:bodyPr/>
+                    <a:lstStyle/>
+                    <a:p>
+                      <a:r>
+                        <a:rPr lang="en-US" dirty="0"/>
+                        <a:t>STANDARD DEVIATION</a:t>
+                      </a:r>
+                    </a:p>
+                  </a:txBody>
+                  <a:tcPr/>
+                </a:tc>
+                <a:extLst>
+                  <a:ext uri="{0D108BD9-81ED-4DB2-BD59-A6C34878D82A}">
+                    <a16:rowId xmlns:a16="http://schemas.microsoft.com/office/drawing/2014/main" val="2972020940"/>
+                  </a:ext>
+                </a:extLst>
+              </a:tr>
+              <a:tr h="414216">
+                <a:tc>
+                  <a:txBody>
+                    <a:bodyPr/>
+                    <a:lstStyle/>
+                    <a:p>
+                      <a:r>
+                        <a:rPr lang="en-US" sz="1600" dirty="0"/>
+                        <a:t>Linear Regression</a:t>
+                      </a:r>
+                    </a:p>
+                  </a:txBody>
+                  <a:tcPr/>
+                </a:tc>
+                <a:tc>
+                  <a:txBody>
+                    <a:bodyPr/>
+                    <a:lstStyle/>
+                    <a:p>
+                      <a:r>
+                        <a:rPr lang="en-US" dirty="0"/>
+                        <a:t>0.43</a:t>
+                      </a:r>
+                    </a:p>
+                  </a:txBody>
+                  <a:tcPr/>
+                </a:tc>
+                <a:tc>
+                  <a:txBody>
+                    <a:bodyPr/>
+                    <a:lstStyle/>
+                    <a:p>
+                      <a:r>
+                        <a:rPr lang="en-US" dirty="0"/>
+                        <a:t>0.46</a:t>
+                      </a:r>
+                    </a:p>
+                  </a:txBody>
+                  <a:tcPr/>
+                </a:tc>
+                <a:tc>
+                  <a:txBody>
+                    <a:bodyPr/>
+                    <a:lstStyle/>
+                    <a:p>
+                      <a:r>
+                        <a:rPr lang="en-US" dirty="0"/>
+                        <a:t>0.95</a:t>
+                      </a:r>
+                    </a:p>
+                  </a:txBody>
+                  <a:tcPr/>
+                </a:tc>
+                <a:extLst>
+                  <a:ext uri="{0D108BD9-81ED-4DB2-BD59-A6C34878D82A}">
+                    <a16:rowId xmlns:a16="http://schemas.microsoft.com/office/drawing/2014/main" val="313347443"/>
+                  </a:ext>
+                </a:extLst>
+              </a:tr>
+              <a:tr h="414216">
+                <a:tc>
+                  <a:txBody>
+                    <a:bodyPr/>
+                    <a:lstStyle/>
+                    <a:p>
+                      <a:r>
+                        <a:rPr lang="en-US" sz="1600" dirty="0"/>
+                        <a:t>Random Forest</a:t>
+                      </a:r>
+                    </a:p>
+                  </a:txBody>
+                  <a:tcPr/>
+                </a:tc>
+                <a:tc>
+                  <a:txBody>
+                    <a:bodyPr/>
+                    <a:lstStyle/>
+                    <a:p>
+                      <a:r>
+                        <a:rPr lang="en-US" dirty="0"/>
+                        <a:t>0.56</a:t>
+                      </a:r>
+                    </a:p>
+                  </a:txBody>
+                  <a:tcPr/>
+                </a:tc>
+                <a:tc>
+                  <a:txBody>
+                    <a:bodyPr/>
+                    <a:lstStyle/>
+                    <a:p>
+                      <a:r>
+                        <a:rPr lang="en-US" dirty="0"/>
+                        <a:t>0.43</a:t>
+                      </a:r>
+                    </a:p>
+                  </a:txBody>
+                  <a:tcPr/>
+                </a:tc>
+                <a:tc>
+                  <a:txBody>
+                    <a:bodyPr/>
+                    <a:lstStyle/>
+                    <a:p>
+                      <a:r>
+                        <a:rPr lang="en-US" dirty="0"/>
+                        <a:t>0.97</a:t>
+                      </a:r>
+                    </a:p>
+                  </a:txBody>
+                  <a:tcPr/>
+                </a:tc>
+                <a:extLst>
+                  <a:ext uri="{0D108BD9-81ED-4DB2-BD59-A6C34878D82A}">
+                    <a16:rowId xmlns:a16="http://schemas.microsoft.com/office/drawing/2014/main" val="824414311"/>
+                  </a:ext>
+                </a:extLst>
+              </a:tr>
+              <a:tr h="414216">
+                <a:tc>
+                  <a:txBody>
+                    <a:bodyPr/>
+                    <a:lstStyle/>
+                    <a:p>
+                      <a:r>
+                        <a:rPr lang="en-US" sz="1600" dirty="0"/>
+                        <a:t>Extra Trees</a:t>
+                      </a:r>
+                    </a:p>
+                  </a:txBody>
+                  <a:tcPr/>
+                </a:tc>
+                <a:tc>
+                  <a:txBody>
+                    <a:bodyPr/>
+                    <a:lstStyle/>
+                    <a:p>
+                      <a:r>
+                        <a:rPr lang="en-US" dirty="0"/>
+                        <a:t>0.48</a:t>
+                      </a:r>
+                    </a:p>
+                  </a:txBody>
+                  <a:tcPr/>
+                </a:tc>
+                <a:tc>
+                  <a:txBody>
+                    <a:bodyPr/>
+                    <a:lstStyle/>
+                    <a:p>
+                      <a:r>
+                        <a:rPr lang="en-US" dirty="0"/>
+                        <a:t>0.41</a:t>
+                      </a:r>
+                    </a:p>
+                  </a:txBody>
+                  <a:tcPr/>
+                </a:tc>
+                <a:tc>
+                  <a:txBody>
+                    <a:bodyPr/>
+                    <a:lstStyle/>
+                    <a:p>
+                      <a:r>
+                        <a:rPr lang="en-US" dirty="0"/>
+                        <a:t>1.03</a:t>
+                      </a:r>
+                    </a:p>
+                  </a:txBody>
+                  <a:tcPr/>
+                </a:tc>
+                <a:extLst>
+                  <a:ext uri="{0D108BD9-81ED-4DB2-BD59-A6C34878D82A}">
+                    <a16:rowId xmlns:a16="http://schemas.microsoft.com/office/drawing/2014/main" val="18415521"/>
+                  </a:ext>
+                </a:extLst>
+              </a:tr>
+              <a:tr h="414216">
+                <a:tc>
+                  <a:txBody>
+                    <a:bodyPr/>
+                    <a:lstStyle/>
+                    <a:p>
+                      <a:r>
+                        <a:rPr lang="en-US" sz="1600" dirty="0"/>
+                        <a:t>SVR</a:t>
+                      </a:r>
+                    </a:p>
+                  </a:txBody>
+                  <a:tcPr/>
+                </a:tc>
+                <a:tc>
+                  <a:txBody>
+                    <a:bodyPr/>
+                    <a:lstStyle/>
+                    <a:p>
+                      <a:r>
+                        <a:rPr lang="en-US" dirty="0"/>
+                        <a:t>0.49</a:t>
+                      </a:r>
+                    </a:p>
+                  </a:txBody>
+                  <a:tcPr/>
+                </a:tc>
+                <a:tc>
+                  <a:txBody>
+                    <a:bodyPr/>
+                    <a:lstStyle/>
+                    <a:p>
+                      <a:r>
+                        <a:rPr lang="en-US" dirty="0"/>
+                        <a:t>0.40</a:t>
+                      </a:r>
+                    </a:p>
+                  </a:txBody>
+                  <a:tcPr/>
+                </a:tc>
+                <a:tc>
+                  <a:txBody>
+                    <a:bodyPr/>
+                    <a:lstStyle/>
+                    <a:p>
+                      <a:r>
+                        <a:rPr lang="en-US" dirty="0"/>
+                        <a:t>1.02</a:t>
+                      </a:r>
+                    </a:p>
+                  </a:txBody>
+                  <a:tcPr/>
+                </a:tc>
+                <a:extLst>
+                  <a:ext uri="{0D108BD9-81ED-4DB2-BD59-A6C34878D82A}">
+                    <a16:rowId xmlns:a16="http://schemas.microsoft.com/office/drawing/2014/main" val="3306264964"/>
+                  </a:ext>
+                </a:extLst>
+              </a:tr>
+              <a:tr h="414216">
+                <a:tc>
+                  <a:txBody>
+                    <a:bodyPr/>
+                    <a:lstStyle/>
+                    <a:p>
+                      <a:r>
+                        <a:rPr lang="en-US" sz="1600" dirty="0"/>
+                        <a:t>AdaBoost</a:t>
+                      </a:r>
+                    </a:p>
+                  </a:txBody>
+                  <a:tcPr/>
+                </a:tc>
+                <a:tc>
+                  <a:txBody>
+                    <a:bodyPr/>
+                    <a:lstStyle/>
+                    <a:p>
+                      <a:r>
+                        <a:rPr lang="en-US" dirty="0"/>
+                        <a:t>0.49</a:t>
+                      </a:r>
+                    </a:p>
+                  </a:txBody>
+                  <a:tcPr/>
+                </a:tc>
+                <a:tc>
+                  <a:txBody>
+                    <a:bodyPr/>
+                    <a:lstStyle/>
+                    <a:p>
+                      <a:r>
+                        <a:rPr lang="en-US" dirty="0"/>
+                        <a:t>0.37</a:t>
+                      </a:r>
+                    </a:p>
+                  </a:txBody>
+                  <a:tcPr/>
+                </a:tc>
+                <a:tc>
+                  <a:txBody>
+                    <a:bodyPr/>
+                    <a:lstStyle/>
+                    <a:p>
+                      <a:r>
+                        <a:rPr lang="en-US" dirty="0"/>
+                        <a:t>1.00</a:t>
+                      </a:r>
+                    </a:p>
+                  </a:txBody>
+                  <a:tcPr/>
+                </a:tc>
+                <a:extLst>
+                  <a:ext uri="{0D108BD9-81ED-4DB2-BD59-A6C34878D82A}">
+                    <a16:rowId xmlns:a16="http://schemas.microsoft.com/office/drawing/2014/main" val="2758706818"/>
+                  </a:ext>
+                </a:extLst>
+              </a:tr>
+              <a:tr h="414216">
+                <a:tc>
+                  <a:txBody>
+                    <a:bodyPr/>
+                    <a:lstStyle/>
+                    <a:p>
+                      <a:r>
+                        <a:rPr lang="en-US" sz="1600" dirty="0"/>
+                        <a:t>KNN</a:t>
+                      </a:r>
+                    </a:p>
+                  </a:txBody>
+                  <a:tcPr/>
+                </a:tc>
+                <a:tc>
+                  <a:txBody>
+                    <a:bodyPr/>
+                    <a:lstStyle/>
+                    <a:p>
+                      <a:r>
+                        <a:rPr lang="en-US" dirty="0"/>
+                        <a:t>0.55</a:t>
+                      </a:r>
+                    </a:p>
+                  </a:txBody>
+                  <a:tcPr/>
+                </a:tc>
+                <a:tc>
+                  <a:txBody>
+                    <a:bodyPr/>
+                    <a:lstStyle/>
+                    <a:p>
+                      <a:r>
+                        <a:rPr lang="en-US" dirty="0"/>
+                        <a:t>0.37</a:t>
+                      </a:r>
+                    </a:p>
+                  </a:txBody>
+                  <a:tcPr/>
+                </a:tc>
+                <a:tc>
+                  <a:txBody>
+                    <a:bodyPr/>
+                    <a:lstStyle/>
+                    <a:p>
+                      <a:r>
+                        <a:rPr lang="en-US" dirty="0"/>
+                        <a:t>1.07</a:t>
+                      </a:r>
+                    </a:p>
+                  </a:txBody>
+                  <a:tcPr/>
+                </a:tc>
+                <a:extLst>
+                  <a:ext uri="{0D108BD9-81ED-4DB2-BD59-A6C34878D82A}">
+                    <a16:rowId xmlns:a16="http://schemas.microsoft.com/office/drawing/2014/main" val="668525858"/>
+                  </a:ext>
+                </a:extLst>
+              </a:tr>
+            </a:tbl>
+          </a:graphicData>
+        </a:graphic>
+      </p:graphicFrame>
+      <p:sp>
+        <p:nvSpPr>
+          <p:cNvPr id="4" name="TextBox 3">
+            <a:extLst>
+              <a:ext uri="{FF2B5EF4-FFF2-40B4-BE49-F238E27FC236}">
+                <a16:creationId xmlns:a16="http://schemas.microsoft.com/office/drawing/2014/main" id="{5CC53A53-4F41-4B49-82F2-85D40E3A76A3}"/>
+              </a:ext>
+            </a:extLst>
+          </p:cNvPr>
+          <p:cNvSpPr txBox="1"/>
+          <p:nvPr/>
+        </p:nvSpPr>
+        <p:spPr>
+          <a:xfrm>
+            <a:off x="1476462" y="5327009"/>
+            <a:ext cx="8204433" cy="369332"/>
+          </a:xfrm>
+          <a:prstGeom prst="rect">
+            <a:avLst/>
+          </a:prstGeom>
+          <a:noFill/>
+        </p:spPr>
+        <p:txBody>
+          <a:bodyPr wrap="square" rtlCol="0">
+            <a:spAutoFit/>
+          </a:bodyPr>
+          <a:lstStyle/>
+          <a:p>
+            <a:r>
+              <a:rPr lang="en-US" dirty="0"/>
+              <a:t>Deep Learning Model: LOSS: -1050.78 ACCURACY: 0.011</a:t>
+            </a:r>
+          </a:p>
+        </p:txBody>
+      </p:sp>
     </p:spTree>
     <p:extLst>
       <p:ext uri="{BB962C8B-B14F-4D97-AF65-F5344CB8AC3E}">
@@ -22132,7 +23893,7 @@
               <a:rPr lang="en-US" sz="4400" dirty="0">
                 <a:latin typeface="Rockwell" panose="02060603020205020403" pitchFamily="18" charset="0"/>
               </a:rPr>
-              <a:t>Take Away</a:t>
+              <a:t>LINEAR REGRESSION MODEL</a:t>
             </a:r>
           </a:p>
         </p:txBody>
@@ -22155,8 +23916,8 @@
         </p:nvSpPr>
         <p:spPr>
           <a:xfrm>
-            <a:off x="1141413" y="1473632"/>
-            <a:ext cx="4194158" cy="3984488"/>
+            <a:off x="1640178" y="4045527"/>
+            <a:ext cx="7688937" cy="2322021"/>
           </a:xfrm>
         </p:spPr>
         <p:txBody>
@@ -22165,43 +23926,7 @@
           </a:bodyPr>
           <a:lstStyle/>
           <a:p>
-            <a:r>
-              <a:rPr lang="en-US" sz="2000" dirty="0">
-                <a:latin typeface="Tahoma" panose="020B0604030504040204" pitchFamily="34" charset="0"/>
-                <a:ea typeface="Tahoma" panose="020B0604030504040204" pitchFamily="34" charset="0"/>
-                <a:cs typeface="Tahoma" panose="020B0604030504040204" pitchFamily="34" charset="0"/>
-              </a:rPr>
-              <a:t>Our map visualization shows there are patterns within the county to be studied</a:t>
-            </a:r>
-          </a:p>
-          <a:p>
-            <a:r>
-              <a:rPr lang="en-US" sz="2000" dirty="0">
-                <a:latin typeface="Tahoma" panose="020B0604030504040204" pitchFamily="34" charset="0"/>
-                <a:ea typeface="Tahoma" panose="020B0604030504040204" pitchFamily="34" charset="0"/>
-                <a:cs typeface="Tahoma" panose="020B0604030504040204" pitchFamily="34" charset="0"/>
-              </a:rPr>
-              <a:t>Data is structured for further inspection and analysis (</a:t>
-            </a:r>
-            <a:r>
-              <a:rPr lang="en-US" sz="2000" dirty="0" err="1">
-                <a:latin typeface="Tahoma" panose="020B0604030504040204" pitchFamily="34" charset="0"/>
-                <a:ea typeface="Tahoma" panose="020B0604030504040204" pitchFamily="34" charset="0"/>
-                <a:cs typeface="Tahoma" panose="020B0604030504040204" pitchFamily="34" charset="0"/>
-              </a:rPr>
-              <a:t>xy</a:t>
-            </a:r>
-            <a:r>
-              <a:rPr lang="en-US" sz="2000" dirty="0">
-                <a:latin typeface="Tahoma" panose="020B0604030504040204" pitchFamily="34" charset="0"/>
-                <a:ea typeface="Tahoma" panose="020B0604030504040204" pitchFamily="34" charset="0"/>
-                <a:cs typeface="Tahoma" panose="020B0604030504040204" pitchFamily="34" charset="0"/>
-              </a:rPr>
-              <a:t> scatter plots!)</a:t>
-            </a:r>
-          </a:p>
-          <a:p>
-            <a:endParaRPr lang="en-US" sz="2000" dirty="0">
+            <a:endParaRPr lang="en-US" dirty="0">
               <a:latin typeface="Tahoma" panose="020B0604030504040204" pitchFamily="34" charset="0"/>
               <a:ea typeface="Tahoma" panose="020B0604030504040204" pitchFamily="34" charset="0"/>
               <a:cs typeface="Tahoma" panose="020B0604030504040204" pitchFamily="34" charset="0"/>
@@ -22211,17 +23936,15 @@
             <a:pPr marL="457200" lvl="1" indent="0">
               <a:buNone/>
             </a:pPr>
-            <a:endParaRPr lang="en-US" sz="1800" dirty="0">
+            <a:endParaRPr lang="en-US" dirty="0">
               <a:latin typeface="Tahoma" panose="020B0604030504040204" pitchFamily="34" charset="0"/>
               <a:ea typeface="Tahoma" panose="020B0604030504040204" pitchFamily="34" charset="0"/>
               <a:cs typeface="Tahoma" panose="020B0604030504040204" pitchFamily="34" charset="0"/>
             </a:endParaRPr>
           </a:p>
           <a:p>
-            <a:pPr marL="457200" lvl="1" indent="0">
-              <a:buNone/>
-            </a:pPr>
-            <a:endParaRPr lang="en-US" sz="1800" dirty="0">
+            <a:pPr lvl="1"/>
+            <a:endParaRPr lang="en-US" dirty="0">
               <a:latin typeface="Tahoma" panose="020B0604030504040204" pitchFamily="34" charset="0"/>
               <a:ea typeface="Tahoma" panose="020B0604030504040204" pitchFamily="34" charset="0"/>
               <a:cs typeface="Tahoma" panose="020B0604030504040204" pitchFamily="34" charset="0"/>
@@ -22229,7 +23952,7 @@
           </a:p>
           <a:p>
             <a:pPr lvl="2"/>
-            <a:endParaRPr lang="en-US" sz="1600" dirty="0">
+            <a:endParaRPr lang="en-US" dirty="0">
               <a:latin typeface="Tahoma" panose="020B0604030504040204" pitchFamily="34" charset="0"/>
               <a:ea typeface="Tahoma" panose="020B0604030504040204" pitchFamily="34" charset="0"/>
               <a:cs typeface="Tahoma" panose="020B0604030504040204" pitchFamily="34" charset="0"/>
@@ -22237,10 +23960,40 @@
           </a:p>
         </p:txBody>
       </p:sp>
+      <p:pic>
+        <p:nvPicPr>
+          <p:cNvPr id="5" name="Picture 4" descr="Table&#10;&#10;Description automatically generated with low confidence">
+            <a:extLst>
+              <a:ext uri="{FF2B5EF4-FFF2-40B4-BE49-F238E27FC236}">
+                <a16:creationId xmlns:a16="http://schemas.microsoft.com/office/drawing/2014/main" id="{9E98EE5D-FB7D-4216-885C-0A6E70068147}"/>
+              </a:ext>
+            </a:extLst>
+          </p:cNvPr>
+          <p:cNvPicPr>
+            <a:picLocks noChangeAspect="1"/>
+          </p:cNvPicPr>
+          <p:nvPr/>
+        </p:nvPicPr>
+        <p:blipFill>
+          <a:blip r:embed="rId2"/>
+          <a:stretch>
+            <a:fillRect/>
+          </a:stretch>
+        </p:blipFill>
+        <p:spPr>
+          <a:xfrm>
+            <a:off x="1484207" y="1681448"/>
+            <a:ext cx="7844908" cy="1865315"/>
+          </a:xfrm>
+          <a:prstGeom prst="rect">
+            <a:avLst/>
+          </a:prstGeom>
+        </p:spPr>
+      </p:pic>
     </p:spTree>
     <p:extLst>
       <p:ext uri="{BB962C8B-B14F-4D97-AF65-F5344CB8AC3E}">
-        <p14:creationId xmlns:p14="http://schemas.microsoft.com/office/powerpoint/2010/main" val="192885746"/>
+        <p14:creationId xmlns:p14="http://schemas.microsoft.com/office/powerpoint/2010/main" val="3983383762"/>
       </p:ext>
     </p:extLst>
   </p:cSld>
@@ -22272,7 +24025,7 @@
           <p:cNvPr id="2" name="Title 1">
             <a:extLst>
               <a:ext uri="{FF2B5EF4-FFF2-40B4-BE49-F238E27FC236}">
-                <a16:creationId xmlns:a16="http://schemas.microsoft.com/office/drawing/2014/main" id="{8123DCBC-CEBE-4D23-8253-3E8B8086BD12}"/>
+                <a16:creationId xmlns:a16="http://schemas.microsoft.com/office/drawing/2014/main" id="{34DB6CE4-2B13-4715-B5B2-615A55922CA1}"/>
               </a:ext>
             </a:extLst>
           </p:cNvPr>
@@ -22283,24 +24036,64 @@
             <p:ph type="title"/>
           </p:nvPr>
         </p:nvSpPr>
-        <p:spPr/>
+        <p:spPr>
+          <a:xfrm>
+            <a:off x="1322388" y="235930"/>
+            <a:ext cx="9905998" cy="1478570"/>
+          </a:xfrm>
+        </p:spPr>
         <p:txBody>
-          <a:bodyPr/>
+          <a:bodyPr anchor="ctr">
+            <a:normAutofit/>
+          </a:bodyPr>
           <a:lstStyle/>
           <a:p>
             <a:r>
-              <a:rPr lang="en-US" dirty="0"/>
-              <a:t>BACKUP</a:t>
+              <a:rPr lang="en-US" sz="4400" dirty="0">
+                <a:latin typeface="Rockwell" panose="02060603020205020403" pitchFamily="18" charset="0"/>
+              </a:rPr>
+              <a:t>Random Forest MODEL</a:t>
             </a:r>
           </a:p>
         </p:txBody>
       </p:sp>
+      <p:pic>
+        <p:nvPicPr>
+          <p:cNvPr id="6" name="Picture 5" descr="Text&#10;&#10;Description automatically generated">
+            <a:extLst>
+              <a:ext uri="{FF2B5EF4-FFF2-40B4-BE49-F238E27FC236}">
+                <a16:creationId xmlns:a16="http://schemas.microsoft.com/office/drawing/2014/main" id="{4C6DC59D-F715-4430-9D6A-93E036888EB4}"/>
+              </a:ext>
+            </a:extLst>
+          </p:cNvPr>
+          <p:cNvPicPr>
+            <a:picLocks noChangeAspect="1"/>
+          </p:cNvPicPr>
+          <p:nvPr/>
+        </p:nvPicPr>
+        <p:blipFill>
+          <a:blip r:embed="rId2"/>
+          <a:stretch>
+            <a:fillRect/>
+          </a:stretch>
+        </p:blipFill>
+        <p:spPr>
+          <a:xfrm>
+            <a:off x="1473831" y="1714500"/>
+            <a:ext cx="4275533" cy="4524375"/>
+          </a:xfrm>
+          <a:prstGeom prst="rect">
+            <a:avLst/>
+          </a:prstGeom>
+          <a:noFill/>
+        </p:spPr>
+      </p:pic>
       <p:sp>
         <p:nvSpPr>
           <p:cNvPr id="3" name="Content Placeholder 2">
             <a:extLst>
               <a:ext uri="{FF2B5EF4-FFF2-40B4-BE49-F238E27FC236}">
-                <a16:creationId xmlns:a16="http://schemas.microsoft.com/office/drawing/2014/main" id="{E658C7B0-47D9-488A-9CEC-B71B5309B025}"/>
+                <a16:creationId xmlns:a16="http://schemas.microsoft.com/office/drawing/2014/main" id="{143F5361-68C0-4BF5-80C8-F1E7BF92B2DB}"/>
               </a:ext>
             </a:extLst>
           </p:cNvPr>
@@ -22308,22 +24101,128 @@
             <a:spLocks noGrp="1"/>
           </p:cNvSpPr>
           <p:nvPr>
-            <p:ph idx="1"/>
+            <p:ph sz="half" idx="2"/>
           </p:nvPr>
         </p:nvSpPr>
-        <p:spPr/>
+        <p:spPr>
+          <a:xfrm>
+            <a:off x="6172200" y="2249486"/>
+            <a:ext cx="4875211" cy="3541714"/>
+          </a:xfrm>
+        </p:spPr>
         <p:txBody>
-          <a:bodyPr/>
+          <a:bodyPr>
+            <a:normAutofit/>
+          </a:bodyPr>
           <a:lstStyle/>
           <a:p>
             <a:endParaRPr lang="en-US"/>
+          </a:p>
+          <a:p>
+            <a:pPr marL="457200" lvl="1" indent="0">
+              <a:buNone/>
+            </a:pPr>
+            <a:endParaRPr lang="en-US" sz="2400"/>
+          </a:p>
+          <a:p>
+            <a:pPr lvl="1"/>
+            <a:endParaRPr lang="en-US" sz="2400"/>
+          </a:p>
+          <a:p>
+            <a:pPr lvl="2"/>
+            <a:endParaRPr lang="en-US" sz="2400"/>
+          </a:p>
+        </p:txBody>
+      </p:sp>
+      <p:sp>
+        <p:nvSpPr>
+          <p:cNvPr id="7" name="TextBox 6">
+            <a:extLst>
+              <a:ext uri="{FF2B5EF4-FFF2-40B4-BE49-F238E27FC236}">
+                <a16:creationId xmlns:a16="http://schemas.microsoft.com/office/drawing/2014/main" id="{62E16E35-EFD3-4F41-97E0-BFBBC5B849BD}"/>
+              </a:ext>
+            </a:extLst>
+          </p:cNvPr>
+          <p:cNvSpPr txBox="1"/>
+          <p:nvPr/>
+        </p:nvSpPr>
+        <p:spPr>
+          <a:xfrm>
+            <a:off x="7067550" y="1724024"/>
+            <a:ext cx="4275533" cy="3231654"/>
+          </a:xfrm>
+          <a:prstGeom prst="rect">
+            <a:avLst/>
+          </a:prstGeom>
+          <a:noFill/>
+        </p:spPr>
+        <p:txBody>
+          <a:bodyPr wrap="square" rtlCol="0">
+            <a:spAutoFit/>
+          </a:bodyPr>
+          <a:lstStyle/>
+          <a:p>
+            <a:pPr marL="285750" indent="-285750">
+              <a:buFont typeface="Wingdings" panose="05000000000000000000" pitchFamily="2" charset="2"/>
+              <a:buChar char="§"/>
+            </a:pPr>
+            <a:endParaRPr lang="en-US" dirty="0"/>
+          </a:p>
+          <a:p>
+            <a:pPr marL="285750" indent="-285750">
+              <a:buFont typeface="Wingdings" panose="05000000000000000000" pitchFamily="2" charset="2"/>
+              <a:buChar char="§"/>
+            </a:pPr>
+            <a:r>
+              <a:rPr lang="en-US" sz="2400" dirty="0">
+                <a:latin typeface="Tahoma" panose="020B0604030504040204" pitchFamily="34" charset="0"/>
+                <a:ea typeface="Tahoma" panose="020B0604030504040204" pitchFamily="34" charset="0"/>
+                <a:cs typeface="Tahoma" panose="020B0604030504040204" pitchFamily="34" charset="0"/>
+              </a:rPr>
+              <a:t>Ensemble machine learning algorithm</a:t>
+            </a:r>
+          </a:p>
+          <a:p>
+            <a:pPr marL="285750" indent="-285750">
+              <a:buFont typeface="Wingdings" panose="05000000000000000000" pitchFamily="2" charset="2"/>
+              <a:buChar char="§"/>
+            </a:pPr>
+            <a:r>
+              <a:rPr lang="en-US" sz="2400" dirty="0">
+                <a:latin typeface="Tahoma" panose="020B0604030504040204" pitchFamily="34" charset="0"/>
+                <a:ea typeface="Tahoma" panose="020B0604030504040204" pitchFamily="34" charset="0"/>
+                <a:cs typeface="Tahoma" panose="020B0604030504040204" pitchFamily="34" charset="0"/>
+              </a:rPr>
+              <a:t>Bootstrap Aggregation/Bagging</a:t>
+            </a:r>
+          </a:p>
+          <a:p>
+            <a:pPr marL="285750" indent="-285750">
+              <a:buFont typeface="Wingdings" panose="05000000000000000000" pitchFamily="2" charset="2"/>
+              <a:buChar char="§"/>
+            </a:pPr>
+            <a:r>
+              <a:rPr lang="en-US" sz="2400" dirty="0">
+                <a:latin typeface="Tahoma" panose="020B0604030504040204" pitchFamily="34" charset="0"/>
+                <a:ea typeface="Tahoma" panose="020B0604030504040204" pitchFamily="34" charset="0"/>
+                <a:cs typeface="Tahoma" panose="020B0604030504040204" pitchFamily="34" charset="0"/>
+              </a:rPr>
+              <a:t>Finetuning hyper- parameters to improve overfitting.</a:t>
+            </a:r>
+          </a:p>
+          <a:p>
+            <a:pPr marL="285750" indent="-285750">
+              <a:buFont typeface="Wingdings" panose="05000000000000000000" pitchFamily="2" charset="2"/>
+              <a:buChar char="§"/>
+            </a:pPr>
+            <a:endParaRPr lang="en-US" dirty="0"/>
           </a:p>
         </p:txBody>
       </p:sp>
     </p:spTree>
     <p:extLst>
       <p:ext uri="{BB962C8B-B14F-4D97-AF65-F5344CB8AC3E}">
-        <p14:creationId xmlns:p14="http://schemas.microsoft.com/office/powerpoint/2010/main" val="4140908998"/>
+        <p14:creationId xmlns:p14="http://schemas.microsoft.com/office/powerpoint/2010/main" val="3365853074"/>
       </p:ext>
     </p:extLst>
   </p:cSld>
@@ -23175,15 +25074,6 @@
 </file>
 
 <file path=customXml/item1.xml><?xml version="1.0" encoding="utf-8"?>
-<?mso-contentType ?>
-<FormTemplates xmlns="http://schemas.microsoft.com/sharepoint/v3/contenttype/forms">
-  <Display>DocumentLibraryForm</Display>
-  <Edit>DocumentLibraryForm</Edit>
-  <New>DocumentLibraryForm</New>
-</FormTemplates>
-</file>
-
-<file path=customXml/item2.xml><?xml version="1.0" encoding="utf-8"?>
 <ct:contentTypeSchema xmlns:ct="http://schemas.microsoft.com/office/2006/metadata/contentType" xmlns:ma="http://schemas.microsoft.com/office/2006/metadata/properties/metaAttributes" ct:_="" ma:_="" ma:contentTypeName="Document" ma:contentTypeID="0x01010079F111ED35F8CC479449609E8A0923A6" ma:contentTypeVersion="11" ma:contentTypeDescription="Create a new document." ma:contentTypeScope="" ma:versionID="96291512c1ee715ab617f4c07df79fc1">
   <xsd:schema xmlns:xsd="http://www.w3.org/2001/XMLSchema" xmlns:xs="http://www.w3.org/2001/XMLSchema" xmlns:p="http://schemas.microsoft.com/office/2006/metadata/properties" xmlns:ns2="71af3243-3dd4-4a8d-8c0d-dd76da1f02a5" xmlns:ns3="16c05727-aa75-4e4a-9b5f-8a80a1165891" targetNamespace="http://schemas.microsoft.com/office/2006/metadata/properties" ma:root="true" ma:fieldsID="8256c27c40ca5c40ce1cf6c44f0205df" ns2:_="" ns3:_="">
     <xsd:import namespace="71af3243-3dd4-4a8d-8c0d-dd76da1f02a5"/>
@@ -23394,6 +25284,15 @@
 </ct:contentTypeSchema>
 </file>
 
+<file path=customXml/item2.xml><?xml version="1.0" encoding="utf-8"?>
+<?mso-contentType ?>
+<FormTemplates xmlns="http://schemas.microsoft.com/sharepoint/v3/contenttype/forms">
+  <Display>DocumentLibraryForm</Display>
+  <Edit>DocumentLibraryForm</Edit>
+  <New>DocumentLibraryForm</New>
+</FormTemplates>
+</file>
+
 <file path=customXml/item3.xml><?xml version="1.0" encoding="utf-8"?>
 <p:properties xmlns:p="http://schemas.microsoft.com/office/2006/metadata/properties" xmlns:xsi="http://www.w3.org/2001/XMLSchema-instance" xmlns:pc="http://schemas.microsoft.com/office/infopath/2007/PartnerControls">
   <documentManagement>
@@ -23403,14 +25302,6 @@
 </file>
 
 <file path=customXml/itemProps1.xml><?xml version="1.0" encoding="utf-8"?>
-<ds:datastoreItem xmlns:ds="http://schemas.openxmlformats.org/officeDocument/2006/customXml" ds:itemID="{B579702B-25C7-40D7-9E29-7686B11A9660}">
-  <ds:schemaRefs>
-    <ds:schemaRef ds:uri="http://schemas.microsoft.com/sharepoint/v3/contenttype/forms"/>
-  </ds:schemaRefs>
-</ds:datastoreItem>
-</file>
-
-<file path=customXml/itemProps2.xml><?xml version="1.0" encoding="utf-8"?>
 <ds:datastoreItem xmlns:ds="http://schemas.openxmlformats.org/officeDocument/2006/customXml" ds:itemID="{A7C0B241-13E5-418D-8920-D23491E2D2C0}">
   <ds:schemaRefs>
     <ds:schemaRef ds:uri="http://schemas.microsoft.com/office/2006/metadata/contentType"/>
@@ -23429,6 +25320,14 @@
 </ds:datastoreItem>
 </file>
 
+<file path=customXml/itemProps2.xml><?xml version="1.0" encoding="utf-8"?>
+<ds:datastoreItem xmlns:ds="http://schemas.openxmlformats.org/officeDocument/2006/customXml" ds:itemID="{B579702B-25C7-40D7-9E29-7686B11A9660}">
+  <ds:schemaRefs>
+    <ds:schemaRef ds:uri="http://schemas.microsoft.com/sharepoint/v3/contenttype/forms"/>
+  </ds:schemaRefs>
+</ds:datastoreItem>
+</file>
+
 <file path=customXml/itemProps3.xml><?xml version="1.0" encoding="utf-8"?>
 <ds:datastoreItem xmlns:ds="http://schemas.openxmlformats.org/officeDocument/2006/customXml" ds:itemID="{E7866CFD-F94E-4AE5-ACEA-86FEC0F48A10}">
   <ds:schemaRefs>

</xml_diff>